<commit_message>
Added new data sets for lectures 7 and 8
</commit_message>
<xml_diff>
--- a/bin/survival lecture 6.pptx
+++ b/bin/survival lecture 6.pptx
@@ -5,10 +5,10 @@
     <p:sldMasterId id="2147483664" r:id="rId1"/>
   </p:sldMasterIdLst>
   <p:notesMasterIdLst>
-    <p:notesMasterId r:id="rId43"/>
+    <p:notesMasterId r:id="rId45"/>
   </p:notesMasterIdLst>
   <p:handoutMasterIdLst>
-    <p:handoutMasterId r:id="rId44"/>
+    <p:handoutMasterId r:id="rId46"/>
   </p:handoutMasterIdLst>
   <p:sldIdLst>
     <p:sldId id="256" r:id="rId2"/>
@@ -41,17 +41,19 @@
     <p:sldId id="411" r:id="rId29"/>
     <p:sldId id="412" r:id="rId30"/>
     <p:sldId id="423" r:id="rId31"/>
-    <p:sldId id="413" r:id="rId32"/>
-    <p:sldId id="414" r:id="rId33"/>
-    <p:sldId id="415" r:id="rId34"/>
-    <p:sldId id="416" r:id="rId35"/>
-    <p:sldId id="417" r:id="rId36"/>
-    <p:sldId id="418" r:id="rId37"/>
-    <p:sldId id="419" r:id="rId38"/>
-    <p:sldId id="420" r:id="rId39"/>
-    <p:sldId id="421" r:id="rId40"/>
-    <p:sldId id="422" r:id="rId41"/>
-    <p:sldId id="342" r:id="rId42"/>
+    <p:sldId id="424" r:id="rId32"/>
+    <p:sldId id="413" r:id="rId33"/>
+    <p:sldId id="414" r:id="rId34"/>
+    <p:sldId id="415" r:id="rId35"/>
+    <p:sldId id="416" r:id="rId36"/>
+    <p:sldId id="417" r:id="rId37"/>
+    <p:sldId id="418" r:id="rId38"/>
+    <p:sldId id="419" r:id="rId39"/>
+    <p:sldId id="420" r:id="rId40"/>
+    <p:sldId id="421" r:id="rId41"/>
+    <p:sldId id="422" r:id="rId42"/>
+    <p:sldId id="425" r:id="rId43"/>
+    <p:sldId id="342" r:id="rId44"/>
   </p:sldIdLst>
   <p:sldSz cx="9144000" cy="6858000" type="screen4x3"/>
   <p:notesSz cx="9601200" cy="7315200"/>
@@ -6890,7 +6892,7 @@
           <a:p>
             <a:r>
               <a:rPr lang="en-US" dirty="0"/>
-              <a:t>Stanford heart transplant data</a:t>
+              <a:t>Stanford transplant data</a:t>
             </a:r>
           </a:p>
         </p:txBody>
@@ -7007,7 +7009,7 @@
           <a:p>
             <a:r>
               <a:rPr lang="en-US" dirty="0"/>
-              <a:t>Stanford heart transplant data</a:t>
+              <a:t>Stanford transplant data</a:t>
             </a:r>
           </a:p>
         </p:txBody>
@@ -7331,13 +7333,8 @@
           <a:p>
             <a:r>
               <a:rPr lang="en-US" dirty="0"/>
-              <a:t>Stanford heart transplant data</a:t>
-            </a:r>
-            <a:r>
-              <a:rPr lang="en-US"/>
-              <a:t>, patients 21-30</a:t>
-            </a:r>
-            <a:endParaRPr lang="en-US" dirty="0"/>
+              <a:t>Stanford transplant data, patients 21-30</a:t>
+            </a:r>
           </a:p>
         </p:txBody>
       </p:sp>
@@ -7453,188 +7450,7 @@
           <a:p>
             <a:r>
               <a:rPr lang="en-US" dirty="0"/>
-              <a:t>Stanford heart transplant data</a:t>
-            </a:r>
-          </a:p>
-        </p:txBody>
-      </p:sp>
-      <p:sp>
-        <p:nvSpPr>
-          <p:cNvPr id="3" name="Text Placeholder 2"/>
-          <p:cNvSpPr>
-            <a:spLocks noGrp="1"/>
-          </p:cNvSpPr>
-          <p:nvPr>
-            <p:ph type="body" idx="1"/>
-          </p:nvPr>
-        </p:nvSpPr>
-        <p:spPr/>
-        <p:txBody>
-          <a:bodyPr/>
-          <a:lstStyle/>
-          <a:p>
-            <a:r>
-              <a:rPr lang="en-US" sz="1800" dirty="0">
-                <a:latin typeface="Courier New" panose="02070309020205020404" pitchFamily="49" charset="0"/>
-                <a:cs typeface="Courier New" panose="02070309020205020404" pitchFamily="49" charset="0"/>
-              </a:rPr>
-              <a:t>id  </a:t>
-            </a:r>
-            <a:r>
-              <a:rPr lang="en-US" sz="1800" dirty="0" err="1">
-                <a:latin typeface="Courier New" panose="02070309020205020404" pitchFamily="49" charset="0"/>
-                <a:cs typeface="Courier New" panose="02070309020205020404" pitchFamily="49" charset="0"/>
-              </a:rPr>
-              <a:t>accept.dt</a:t>
-            </a:r>
-            <a:r>
-              <a:rPr lang="en-US" sz="1800" dirty="0">
-                <a:latin typeface="Courier New" panose="02070309020205020404" pitchFamily="49" charset="0"/>
-                <a:cs typeface="Courier New" panose="02070309020205020404" pitchFamily="49" charset="0"/>
-              </a:rPr>
-              <a:t>    </a:t>
-            </a:r>
-            <a:r>
-              <a:rPr lang="en-US" sz="1800" dirty="0" err="1">
-                <a:latin typeface="Courier New" panose="02070309020205020404" pitchFamily="49" charset="0"/>
-                <a:cs typeface="Courier New" panose="02070309020205020404" pitchFamily="49" charset="0"/>
-              </a:rPr>
-              <a:t>tx.date</a:t>
-            </a:r>
-            <a:r>
-              <a:rPr lang="en-US" sz="1800" dirty="0">
-                <a:latin typeface="Courier New" panose="02070309020205020404" pitchFamily="49" charset="0"/>
-                <a:cs typeface="Courier New" panose="02070309020205020404" pitchFamily="49" charset="0"/>
-              </a:rPr>
-              <a:t>    </a:t>
-            </a:r>
-            <a:r>
-              <a:rPr lang="en-US" sz="1800" dirty="0" err="1">
-                <a:latin typeface="Courier New" panose="02070309020205020404" pitchFamily="49" charset="0"/>
-                <a:cs typeface="Courier New" panose="02070309020205020404" pitchFamily="49" charset="0"/>
-              </a:rPr>
-              <a:t>fu.date</a:t>
-            </a:r>
-            <a:r>
-              <a:rPr lang="en-US" sz="1800" dirty="0">
-                <a:latin typeface="Courier New" panose="02070309020205020404" pitchFamily="49" charset="0"/>
-                <a:cs typeface="Courier New" panose="02070309020205020404" pitchFamily="49" charset="0"/>
-              </a:rPr>
-              <a:t> </a:t>
-            </a:r>
-            <a:r>
-              <a:rPr lang="en-US" sz="1800" dirty="0" err="1">
-                <a:latin typeface="Courier New" panose="02070309020205020404" pitchFamily="49" charset="0"/>
-                <a:cs typeface="Courier New" panose="02070309020205020404" pitchFamily="49" charset="0"/>
-              </a:rPr>
-              <a:t>fustat</a:t>
-            </a:r>
-            <a:r>
-              <a:rPr lang="en-US" sz="1800" dirty="0">
-                <a:latin typeface="Courier New" panose="02070309020205020404" pitchFamily="49" charset="0"/>
-                <a:cs typeface="Courier New" panose="02070309020205020404" pitchFamily="49" charset="0"/>
-              </a:rPr>
-              <a:t> transplant</a:t>
-            </a:r>
-          </a:p>
-          <a:p>
-            <a:r>
-              <a:rPr lang="en-US" sz="1800" dirty="0">
-                <a:latin typeface="Courier New" panose="02070309020205020404" pitchFamily="49" charset="0"/>
-                <a:cs typeface="Courier New" panose="02070309020205020404" pitchFamily="49" charset="0"/>
-              </a:rPr>
-              <a:t>21 1969-02-01 1969-02-08 1971-11-29      1          1</a:t>
-            </a:r>
-          </a:p>
-          <a:p>
-            <a:endParaRPr lang="en-US" sz="1800" dirty="0">
-              <a:latin typeface="Courier New" panose="02070309020205020404" pitchFamily="49" charset="0"/>
-              <a:cs typeface="Courier New" panose="02070309020205020404" pitchFamily="49" charset="0"/>
-            </a:endParaRPr>
-          </a:p>
-          <a:p>
-            <a:r>
-              <a:rPr lang="en-US" sz="1800" dirty="0">
-                <a:latin typeface="Courier New" panose="02070309020205020404" pitchFamily="49" charset="0"/>
-                <a:cs typeface="Courier New" panose="02070309020205020404" pitchFamily="49" charset="0"/>
-              </a:rPr>
-              <a:t>id   time1     time2 event transplant</a:t>
-            </a:r>
-          </a:p>
-          <a:p>
-            <a:r>
-              <a:rPr lang="en-US" sz="1800" dirty="0">
-                <a:latin typeface="Courier New" panose="02070309020205020404" pitchFamily="49" charset="0"/>
-                <a:cs typeface="Courier New" panose="02070309020205020404" pitchFamily="49" charset="0"/>
-              </a:rPr>
-              <a:t>21  7 days 1031 days     D          1</a:t>
-            </a:r>
-          </a:p>
-          <a:p>
-            <a:endParaRPr lang="en-US" sz="1800" dirty="0">
-              <a:latin typeface="Courier New" panose="02070309020205020404" pitchFamily="49" charset="0"/>
-              <a:cs typeface="Courier New" panose="02070309020205020404" pitchFamily="49" charset="0"/>
-            </a:endParaRPr>
-          </a:p>
-          <a:p>
-            <a:r>
-              <a:rPr lang="en-US" sz="1800" dirty="0">
-                <a:latin typeface="Courier New" panose="02070309020205020404" pitchFamily="49" charset="0"/>
-                <a:cs typeface="Courier New" panose="02070309020205020404" pitchFamily="49" charset="0"/>
-              </a:rPr>
-              <a:t>id start stop event transplant</a:t>
-            </a:r>
-          </a:p>
-          <a:p>
-            <a:r>
-              <a:rPr lang="en-US" sz="1800" dirty="0">
-                <a:latin typeface="Courier New" panose="02070309020205020404" pitchFamily="49" charset="0"/>
-                <a:cs typeface="Courier New" panose="02070309020205020404" pitchFamily="49" charset="0"/>
-              </a:rPr>
-              <a:t>21     0    7     0          0</a:t>
-            </a:r>
-          </a:p>
-          <a:p>
-            <a:r>
-              <a:rPr lang="en-US" sz="1800" dirty="0">
-                <a:latin typeface="Courier New" panose="02070309020205020404" pitchFamily="49" charset="0"/>
-                <a:cs typeface="Courier New" panose="02070309020205020404" pitchFamily="49" charset="0"/>
-              </a:rPr>
-              <a:t>21     7 1031     1          1</a:t>
-            </a:r>
-          </a:p>
-          <a:p>
-            <a:pPr marL="342900" indent="-342900">
-              <a:buAutoNum type="arabicPlain" startAt="21"/>
-            </a:pPr>
-            <a:endParaRPr lang="en-US" sz="1800" dirty="0">
-              <a:latin typeface="Courier New" panose="02070309020205020404" pitchFamily="49" charset="0"/>
-              <a:cs typeface="Courier New" panose="02070309020205020404" pitchFamily="49" charset="0"/>
-            </a:endParaRPr>
-          </a:p>
-        </p:txBody>
-      </p:sp>
-      <p:sp>
-        <p:nvSpPr>
-          <p:cNvPr id="4" name="Footer Placeholder 3"/>
-          <p:cNvSpPr>
-            <a:spLocks noGrp="1"/>
-          </p:cNvSpPr>
-          <p:nvPr>
-            <p:ph type="ftr" sz="quarter" idx="10"/>
-          </p:nvPr>
-        </p:nvSpPr>
-        <p:spPr/>
-        <p:txBody>
-          <a:bodyPr/>
-          <a:lstStyle/>
-          <a:p>
-            <a:pPr>
-              <a:defRPr/>
-            </a:pPr>
-            <a:r>
-              <a:rPr lang="en-US" altLang="en-US" dirty="0"/>
-              <a:t>©2018 Steve Simon    http://TheAnalysisFactor.com</a:t>
+              <a:t>Stanford transplant data, naive analysis</a:t>
             </a:r>
           </a:p>
         </p:txBody>
@@ -7674,32 +7490,40 @@
           </a:p>
         </p:txBody>
       </p:sp>
-      <p:sp>
-        <p:nvSpPr>
-          <p:cNvPr id="6" name="Text Placeholder 5"/>
-          <p:cNvSpPr>
-            <a:spLocks noGrp="1"/>
-          </p:cNvSpPr>
-          <p:nvPr>
-            <p:ph type="body" sz="quarter" idx="12"/>
-          </p:nvPr>
-        </p:nvSpPr>
-        <p:spPr/>
-        <p:txBody>
-          <a:bodyPr/>
-          <a:lstStyle/>
-          <a:p>
-            <a:r>
-              <a:rPr lang="en-US" dirty="0"/>
-              <a:t>Patient #21</a:t>
-            </a:r>
-          </a:p>
-        </p:txBody>
-      </p:sp>
+      <p:pic>
+        <p:nvPicPr>
+          <p:cNvPr id="6" name="Picture 5">
+            <a:extLst>
+              <a:ext uri="{FF2B5EF4-FFF2-40B4-BE49-F238E27FC236}">
+                <a16:creationId xmlns:a16="http://schemas.microsoft.com/office/drawing/2014/main" id="{6FB0137B-2CAD-4C44-9B5F-DD897BABC5F3}"/>
+              </a:ext>
+            </a:extLst>
+          </p:cNvPr>
+          <p:cNvPicPr>
+            <a:picLocks noChangeAspect="1"/>
+          </p:cNvPicPr>
+          <p:nvPr/>
+        </p:nvPicPr>
+        <p:blipFill>
+          <a:blip r:embed="rId2"/>
+          <a:stretch>
+            <a:fillRect/>
+          </a:stretch>
+        </p:blipFill>
+        <p:spPr>
+          <a:xfrm>
+            <a:off x="447993" y="1143000"/>
+            <a:ext cx="8238095" cy="2095238"/>
+          </a:xfrm>
+          <a:prstGeom prst="rect">
+            <a:avLst/>
+          </a:prstGeom>
+        </p:spPr>
+      </p:pic>
     </p:spTree>
     <p:extLst>
       <p:ext uri="{BB962C8B-B14F-4D97-AF65-F5344CB8AC3E}">
-        <p14:creationId xmlns:p14="http://schemas.microsoft.com/office/powerpoint/2010/main" val="2830790376"/>
+        <p14:creationId xmlns:p14="http://schemas.microsoft.com/office/powerpoint/2010/main" val="2329064681"/>
       </p:ext>
     </p:extLst>
   </p:cSld>
@@ -7743,7 +7567,7 @@
           <a:p>
             <a:r>
               <a:rPr lang="en-US" dirty="0"/>
-              <a:t>Stanford heart transplant data</a:t>
+              <a:t>Stanford transplant data</a:t>
             </a:r>
           </a:p>
         </p:txBody>
@@ -7833,7 +7657,7 @@
                 <a:latin typeface="Courier New" panose="02070309020205020404" pitchFamily="49" charset="0"/>
                 <a:cs typeface="Courier New" panose="02070309020205020404" pitchFamily="49" charset="0"/>
               </a:rPr>
-              <a:t>22 1969-03-18 1969-03-29 1969-05-07      1          1</a:t>
+              <a:t>21 1969-02-01 1969-02-08 1971-11-29      1          1</a:t>
             </a:r>
           </a:p>
           <a:p>
@@ -7857,7 +7681,7 @@
                 <a:latin typeface="Courier New" panose="02070309020205020404" pitchFamily="49" charset="0"/>
                 <a:cs typeface="Courier New" panose="02070309020205020404" pitchFamily="49" charset="0"/>
               </a:rPr>
-              <a:t>22 11 days   50 days     D          1</a:t>
+              <a:t>21  7 days 1031 days     D          1</a:t>
             </a:r>
           </a:p>
           <a:p>
@@ -7881,7 +7705,7 @@
                 <a:latin typeface="Courier New" panose="02070309020205020404" pitchFamily="49" charset="0"/>
                 <a:cs typeface="Courier New" panose="02070309020205020404" pitchFamily="49" charset="0"/>
               </a:rPr>
-              <a:t>22     0   11     0          0</a:t>
+              <a:t>21     0    7     0          0</a:t>
             </a:r>
           </a:p>
           <a:p>
@@ -7890,8 +7714,17 @@
                 <a:latin typeface="Courier New" panose="02070309020205020404" pitchFamily="49" charset="0"/>
                 <a:cs typeface="Courier New" panose="02070309020205020404" pitchFamily="49" charset="0"/>
               </a:rPr>
-              <a:t>22    11   50     1          1</a:t>
-            </a:r>
+              <a:t>21     7 1031     1          1</a:t>
+            </a:r>
+          </a:p>
+          <a:p>
+            <a:pPr marL="342900" indent="-342900">
+              <a:buAutoNum type="arabicPlain" startAt="21"/>
+            </a:pPr>
+            <a:endParaRPr lang="en-US" sz="1800" dirty="0">
+              <a:latin typeface="Courier New" panose="02070309020205020404" pitchFamily="49" charset="0"/>
+              <a:cs typeface="Courier New" panose="02070309020205020404" pitchFamily="49" charset="0"/>
+            </a:endParaRPr>
           </a:p>
         </p:txBody>
       </p:sp>
@@ -7972,7 +7805,7 @@
           <a:p>
             <a:r>
               <a:rPr lang="en-US" dirty="0"/>
-              <a:t>Patient #22</a:t>
+              <a:t>Patient #21</a:t>
             </a:r>
           </a:p>
         </p:txBody>
@@ -7980,7 +7813,7 @@
     </p:spTree>
     <p:extLst>
       <p:ext uri="{BB962C8B-B14F-4D97-AF65-F5344CB8AC3E}">
-        <p14:creationId xmlns:p14="http://schemas.microsoft.com/office/powerpoint/2010/main" val="2452209786"/>
+        <p14:creationId xmlns:p14="http://schemas.microsoft.com/office/powerpoint/2010/main" val="2830790376"/>
       </p:ext>
     </p:extLst>
   </p:cSld>
@@ -8024,7 +7857,7 @@
           <a:p>
             <a:r>
               <a:rPr lang="en-US" dirty="0"/>
-              <a:t>Stanford heart transplant data</a:t>
+              <a:t>Stanford transplant data</a:t>
             </a:r>
           </a:p>
         </p:txBody>
@@ -8114,7 +7947,7 @@
                 <a:latin typeface="Courier New" panose="02070309020205020404" pitchFamily="49" charset="0"/>
                 <a:cs typeface="Courier New" panose="02070309020205020404" pitchFamily="49" charset="0"/>
               </a:rPr>
-              <a:t>23 1969-04-11 1969-04-13 1971-04-13      1          1</a:t>
+              <a:t>22 1969-03-18 1969-03-29 1969-05-07      1          1</a:t>
             </a:r>
           </a:p>
           <a:p>
@@ -8138,7 +7971,7 @@
                 <a:latin typeface="Courier New" panose="02070309020205020404" pitchFamily="49" charset="0"/>
                 <a:cs typeface="Courier New" panose="02070309020205020404" pitchFamily="49" charset="0"/>
               </a:rPr>
-              <a:t>23  2 days  732 days     D          1</a:t>
+              <a:t>22 11 days   50 days     D          1</a:t>
             </a:r>
           </a:p>
           <a:p>
@@ -8162,7 +7995,7 @@
                 <a:latin typeface="Courier New" panose="02070309020205020404" pitchFamily="49" charset="0"/>
                 <a:cs typeface="Courier New" panose="02070309020205020404" pitchFamily="49" charset="0"/>
               </a:rPr>
-              <a:t>23     0    2     0          0</a:t>
+              <a:t>22     0   11     0          0</a:t>
             </a:r>
           </a:p>
           <a:p>
@@ -8171,7 +8004,7 @@
                 <a:latin typeface="Courier New" panose="02070309020205020404" pitchFamily="49" charset="0"/>
                 <a:cs typeface="Courier New" panose="02070309020205020404" pitchFamily="49" charset="0"/>
               </a:rPr>
-              <a:t>23     2  732     1          1</a:t>
+              <a:t>22    11   50     1          1</a:t>
             </a:r>
           </a:p>
         </p:txBody>
@@ -8253,7 +8086,7 @@
           <a:p>
             <a:r>
               <a:rPr lang="en-US" dirty="0"/>
-              <a:t>Patient #23</a:t>
+              <a:t>Patient #22</a:t>
             </a:r>
           </a:p>
         </p:txBody>
@@ -8261,7 +8094,7 @@
     </p:spTree>
     <p:extLst>
       <p:ext uri="{BB962C8B-B14F-4D97-AF65-F5344CB8AC3E}">
-        <p14:creationId xmlns:p14="http://schemas.microsoft.com/office/powerpoint/2010/main" val="1353099458"/>
+        <p14:creationId xmlns:p14="http://schemas.microsoft.com/office/powerpoint/2010/main" val="2452209786"/>
       </p:ext>
     </p:extLst>
   </p:cSld>
@@ -8305,7 +8138,7 @@
           <a:p>
             <a:r>
               <a:rPr lang="en-US" dirty="0"/>
-              <a:t>Stanford heart transplant data</a:t>
+              <a:t>Stanford transplant data</a:t>
             </a:r>
           </a:p>
         </p:txBody>
@@ -8395,7 +8228,7 @@
                 <a:latin typeface="Courier New" panose="02070309020205020404" pitchFamily="49" charset="0"/>
                 <a:cs typeface="Courier New" panose="02070309020205020404" pitchFamily="49" charset="0"/>
               </a:rPr>
-              <a:t>24 1969-04-25 1969-07-16 1969-11-29      1          1</a:t>
+              <a:t>23 1969-04-11 1969-04-13 1971-04-13      1          1</a:t>
             </a:r>
           </a:p>
           <a:p>
@@ -8419,7 +8252,7 @@
                 <a:latin typeface="Courier New" panose="02070309020205020404" pitchFamily="49" charset="0"/>
                 <a:cs typeface="Courier New" panose="02070309020205020404" pitchFamily="49" charset="0"/>
               </a:rPr>
-              <a:t>24 82 days  218 days     D          1</a:t>
+              <a:t>23  2 days  732 days     D          1</a:t>
             </a:r>
           </a:p>
           <a:p>
@@ -8443,7 +8276,7 @@
                 <a:latin typeface="Courier New" panose="02070309020205020404" pitchFamily="49" charset="0"/>
                 <a:cs typeface="Courier New" panose="02070309020205020404" pitchFamily="49" charset="0"/>
               </a:rPr>
-              <a:t>24     0   82     0          0</a:t>
+              <a:t>23     0    2     0          0</a:t>
             </a:r>
           </a:p>
           <a:p>
@@ -8452,7 +8285,7 @@
                 <a:latin typeface="Courier New" panose="02070309020205020404" pitchFamily="49" charset="0"/>
                 <a:cs typeface="Courier New" panose="02070309020205020404" pitchFamily="49" charset="0"/>
               </a:rPr>
-              <a:t>24    82  218     1          1</a:t>
+              <a:t>23     2  732     1          1</a:t>
             </a:r>
           </a:p>
         </p:txBody>
@@ -8534,7 +8367,7 @@
           <a:p>
             <a:r>
               <a:rPr lang="en-US" dirty="0"/>
-              <a:t>Patient #24</a:t>
+              <a:t>Patient #23</a:t>
             </a:r>
           </a:p>
         </p:txBody>
@@ -8542,7 +8375,7 @@
     </p:spTree>
     <p:extLst>
       <p:ext uri="{BB962C8B-B14F-4D97-AF65-F5344CB8AC3E}">
-        <p14:creationId xmlns:p14="http://schemas.microsoft.com/office/powerpoint/2010/main" val="1815124891"/>
+        <p14:creationId xmlns:p14="http://schemas.microsoft.com/office/powerpoint/2010/main" val="1353099458"/>
       </p:ext>
     </p:extLst>
   </p:cSld>
@@ -8586,7 +8419,7 @@
           <a:p>
             <a:r>
               <a:rPr lang="en-US" dirty="0"/>
-              <a:t>Stanford heart transplant data</a:t>
+              <a:t>Stanford transplant data</a:t>
             </a:r>
           </a:p>
         </p:txBody>
@@ -8676,7 +8509,7 @@
                 <a:latin typeface="Courier New" panose="02070309020205020404" pitchFamily="49" charset="0"/>
                 <a:cs typeface="Courier New" panose="02070309020205020404" pitchFamily="49" charset="0"/>
               </a:rPr>
-              <a:t>25 1969-04-28 1969-05-22 1974-04-01      0          1</a:t>
+              <a:t>24 1969-04-25 1969-07-16 1969-11-29      1          1</a:t>
             </a:r>
           </a:p>
           <a:p>
@@ -8700,7 +8533,7 @@
                 <a:latin typeface="Courier New" panose="02070309020205020404" pitchFamily="49" charset="0"/>
                 <a:cs typeface="Courier New" panose="02070309020205020404" pitchFamily="49" charset="0"/>
               </a:rPr>
-              <a:t>25 24 days 1799 days     C          1</a:t>
+              <a:t>24 82 days  218 days     D          1</a:t>
             </a:r>
           </a:p>
           <a:p>
@@ -8724,7 +8557,7 @@
                 <a:latin typeface="Courier New" panose="02070309020205020404" pitchFamily="49" charset="0"/>
                 <a:cs typeface="Courier New" panose="02070309020205020404" pitchFamily="49" charset="0"/>
               </a:rPr>
-              <a:t>25     0   24     0          0</a:t>
+              <a:t>24     0   82     0          0</a:t>
             </a:r>
           </a:p>
           <a:p>
@@ -8733,7 +8566,7 @@
                 <a:latin typeface="Courier New" panose="02070309020205020404" pitchFamily="49" charset="0"/>
                 <a:cs typeface="Courier New" panose="02070309020205020404" pitchFamily="49" charset="0"/>
               </a:rPr>
-              <a:t>25    24 1799     0          1</a:t>
+              <a:t>24    82  218     1          1</a:t>
             </a:r>
           </a:p>
         </p:txBody>
@@ -8815,7 +8648,7 @@
           <a:p>
             <a:r>
               <a:rPr lang="en-US" dirty="0"/>
-              <a:t>Patient #25</a:t>
+              <a:t>Patient #24</a:t>
             </a:r>
           </a:p>
         </p:txBody>
@@ -8823,7 +8656,7 @@
     </p:spTree>
     <p:extLst>
       <p:ext uri="{BB962C8B-B14F-4D97-AF65-F5344CB8AC3E}">
-        <p14:creationId xmlns:p14="http://schemas.microsoft.com/office/powerpoint/2010/main" val="2244761302"/>
+        <p14:creationId xmlns:p14="http://schemas.microsoft.com/office/powerpoint/2010/main" val="1815124891"/>
       </p:ext>
     </p:extLst>
   </p:cSld>
@@ -8867,7 +8700,7 @@
           <a:p>
             <a:r>
               <a:rPr lang="en-US" dirty="0"/>
-              <a:t>Stanford heart transplant data</a:t>
+              <a:t>Stanford transplant data</a:t>
             </a:r>
           </a:p>
         </p:txBody>
@@ -8957,7 +8790,7 @@
                 <a:latin typeface="Courier New" panose="02070309020205020404" pitchFamily="49" charset="0"/>
                 <a:cs typeface="Courier New" panose="02070309020205020404" pitchFamily="49" charset="0"/>
               </a:rPr>
-              <a:t>26 1969-05-01       &lt;NA&gt; 1973-03-01      0          0</a:t>
+              <a:t>25 1969-04-28 1969-05-22 1974-04-01      0          1</a:t>
             </a:r>
           </a:p>
           <a:p>
@@ -8981,7 +8814,7 @@
                 <a:latin typeface="Courier New" panose="02070309020205020404" pitchFamily="49" charset="0"/>
                 <a:cs typeface="Courier New" panose="02070309020205020404" pitchFamily="49" charset="0"/>
               </a:rPr>
-              <a:t>26 NA days 1400 days     C          0</a:t>
+              <a:t>25 24 days 1799 days     C          1</a:t>
             </a:r>
           </a:p>
           <a:p>
@@ -9005,7 +8838,16 @@
                 <a:latin typeface="Courier New" panose="02070309020205020404" pitchFamily="49" charset="0"/>
                 <a:cs typeface="Courier New" panose="02070309020205020404" pitchFamily="49" charset="0"/>
               </a:rPr>
-              <a:t>26     0 1400     0          0</a:t>
+              <a:t>25     0   24     0          0</a:t>
+            </a:r>
+          </a:p>
+          <a:p>
+            <a:r>
+              <a:rPr lang="en-US" sz="1800" dirty="0">
+                <a:latin typeface="Courier New" panose="02070309020205020404" pitchFamily="49" charset="0"/>
+                <a:cs typeface="Courier New" panose="02070309020205020404" pitchFamily="49" charset="0"/>
+              </a:rPr>
+              <a:t>25    24 1799     0          1</a:t>
             </a:r>
           </a:p>
         </p:txBody>
@@ -9087,7 +8929,7 @@
           <a:p>
             <a:r>
               <a:rPr lang="en-US" dirty="0"/>
-              <a:t>Patient #26</a:t>
+              <a:t>Patient #25</a:t>
             </a:r>
           </a:p>
         </p:txBody>
@@ -9095,7 +8937,7 @@
     </p:spTree>
     <p:extLst>
       <p:ext uri="{BB962C8B-B14F-4D97-AF65-F5344CB8AC3E}">
-        <p14:creationId xmlns:p14="http://schemas.microsoft.com/office/powerpoint/2010/main" val="185560491"/>
+        <p14:creationId xmlns:p14="http://schemas.microsoft.com/office/powerpoint/2010/main" val="2244761302"/>
       </p:ext>
     </p:extLst>
   </p:cSld>
@@ -9139,7 +8981,7 @@
           <a:p>
             <a:r>
               <a:rPr lang="en-US" dirty="0"/>
-              <a:t>Stanford heart transplant data</a:t>
+              <a:t>Stanford transplant data</a:t>
             </a:r>
           </a:p>
         </p:txBody>
@@ -9229,7 +9071,7 @@
                 <a:latin typeface="Courier New" panose="02070309020205020404" pitchFamily="49" charset="0"/>
                 <a:cs typeface="Courier New" panose="02070309020205020404" pitchFamily="49" charset="0"/>
               </a:rPr>
-              <a:t>27 1969-05-04       &lt;NA&gt; 1970-01-21      1          0</a:t>
+              <a:t>26 1969-05-01       &lt;NA&gt; 1973-03-01      0          0</a:t>
             </a:r>
           </a:p>
           <a:p>
@@ -9253,7 +9095,7 @@
                 <a:latin typeface="Courier New" panose="02070309020205020404" pitchFamily="49" charset="0"/>
                 <a:cs typeface="Courier New" panose="02070309020205020404" pitchFamily="49" charset="0"/>
               </a:rPr>
-              <a:t>27 NA days  262 days     D          0</a:t>
+              <a:t>26 NA days 1400 days     C          0</a:t>
             </a:r>
           </a:p>
           <a:p>
@@ -9277,7 +9119,7 @@
                 <a:latin typeface="Courier New" panose="02070309020205020404" pitchFamily="49" charset="0"/>
                 <a:cs typeface="Courier New" panose="02070309020205020404" pitchFamily="49" charset="0"/>
               </a:rPr>
-              <a:t>27     0  262     1          0</a:t>
+              <a:t>26     0 1400     0          0</a:t>
             </a:r>
           </a:p>
         </p:txBody>
@@ -9359,7 +9201,7 @@
           <a:p>
             <a:r>
               <a:rPr lang="en-US" dirty="0"/>
-              <a:t>Patient #27</a:t>
+              <a:t>Patient #26</a:t>
             </a:r>
           </a:p>
         </p:txBody>
@@ -9367,7 +9209,7 @@
     </p:spTree>
     <p:extLst>
       <p:ext uri="{BB962C8B-B14F-4D97-AF65-F5344CB8AC3E}">
-        <p14:creationId xmlns:p14="http://schemas.microsoft.com/office/powerpoint/2010/main" val="1134118722"/>
+        <p14:creationId xmlns:p14="http://schemas.microsoft.com/office/powerpoint/2010/main" val="185560491"/>
       </p:ext>
     </p:extLst>
   </p:cSld>
@@ -9411,7 +9253,7 @@
           <a:p>
             <a:r>
               <a:rPr lang="en-US" dirty="0"/>
-              <a:t>Stanford heart transplant data</a:t>
+              <a:t>Stanford transplant data</a:t>
             </a:r>
           </a:p>
         </p:txBody>
@@ -9501,7 +9343,7 @@
                 <a:latin typeface="Courier New" panose="02070309020205020404" pitchFamily="49" charset="0"/>
                 <a:cs typeface="Courier New" panose="02070309020205020404" pitchFamily="49" charset="0"/>
               </a:rPr>
-              <a:t>28 1969-06-07 1969-08-16 1969-08-17      1          1</a:t>
+              <a:t>27 1969-05-04       &lt;NA&gt; 1970-01-21      1          0</a:t>
             </a:r>
           </a:p>
           <a:p>
@@ -9525,7 +9367,7 @@
                 <a:latin typeface="Courier New" panose="02070309020205020404" pitchFamily="49" charset="0"/>
                 <a:cs typeface="Courier New" panose="02070309020205020404" pitchFamily="49" charset="0"/>
               </a:rPr>
-              <a:t>28 70 days   71 days     D          1</a:t>
+              <a:t>27 NA days  262 days     D          0</a:t>
             </a:r>
           </a:p>
           <a:p>
@@ -9549,16 +9391,7 @@
                 <a:latin typeface="Courier New" panose="02070309020205020404" pitchFamily="49" charset="0"/>
                 <a:cs typeface="Courier New" panose="02070309020205020404" pitchFamily="49" charset="0"/>
               </a:rPr>
-              <a:t>28     0   70     0          0</a:t>
-            </a:r>
-          </a:p>
-          <a:p>
-            <a:r>
-              <a:rPr lang="en-US" sz="1800" dirty="0">
-                <a:latin typeface="Courier New" panose="02070309020205020404" pitchFamily="49" charset="0"/>
-                <a:cs typeface="Courier New" panose="02070309020205020404" pitchFamily="49" charset="0"/>
-              </a:rPr>
-              <a:t>28    70   71     1          1</a:t>
+              <a:t>27     0  262     1          0</a:t>
             </a:r>
           </a:p>
         </p:txBody>
@@ -9640,7 +9473,7 @@
           <a:p>
             <a:r>
               <a:rPr lang="en-US" dirty="0"/>
-              <a:t>Patient #28</a:t>
+              <a:t>Patient #27</a:t>
             </a:r>
           </a:p>
         </p:txBody>
@@ -9648,7 +9481,7 @@
     </p:spTree>
     <p:extLst>
       <p:ext uri="{BB962C8B-B14F-4D97-AF65-F5344CB8AC3E}">
-        <p14:creationId xmlns:p14="http://schemas.microsoft.com/office/powerpoint/2010/main" val="1099184777"/>
+        <p14:creationId xmlns:p14="http://schemas.microsoft.com/office/powerpoint/2010/main" val="1134118722"/>
       </p:ext>
     </p:extLst>
   </p:cSld>
@@ -9692,7 +9525,7 @@
           <a:p>
             <a:r>
               <a:rPr lang="en-US" dirty="0"/>
-              <a:t>Stanford heart transplant data</a:t>
+              <a:t>Stanford transplant data</a:t>
             </a:r>
           </a:p>
         </p:txBody>
@@ -9782,7 +9615,7 @@
                 <a:latin typeface="Courier New" panose="02070309020205020404" pitchFamily="49" charset="0"/>
                 <a:cs typeface="Courier New" panose="02070309020205020404" pitchFamily="49" charset="0"/>
               </a:rPr>
-              <a:t>29 1969-07-14       &lt;NA&gt; 1969-08-17      1          0</a:t>
+              <a:t>28 1969-06-07 1969-08-16 1969-08-17      1          1</a:t>
             </a:r>
           </a:p>
           <a:p>
@@ -9806,7 +9639,7 @@
                 <a:latin typeface="Courier New" panose="02070309020205020404" pitchFamily="49" charset="0"/>
                 <a:cs typeface="Courier New" panose="02070309020205020404" pitchFamily="49" charset="0"/>
               </a:rPr>
-              <a:t>29 NA days   34 days     D          0</a:t>
+              <a:t>28 70 days   71 days     D          1</a:t>
             </a:r>
           </a:p>
           <a:p>
@@ -9830,7 +9663,16 @@
                 <a:latin typeface="Courier New" panose="02070309020205020404" pitchFamily="49" charset="0"/>
                 <a:cs typeface="Courier New" panose="02070309020205020404" pitchFamily="49" charset="0"/>
               </a:rPr>
-              <a:t>29     0   34     1          0</a:t>
+              <a:t>28     0   70     0          0</a:t>
+            </a:r>
+          </a:p>
+          <a:p>
+            <a:r>
+              <a:rPr lang="en-US" sz="1800" dirty="0">
+                <a:latin typeface="Courier New" panose="02070309020205020404" pitchFamily="49" charset="0"/>
+                <a:cs typeface="Courier New" panose="02070309020205020404" pitchFamily="49" charset="0"/>
+              </a:rPr>
+              <a:t>28    70   71     1          1</a:t>
             </a:r>
           </a:p>
         </p:txBody>
@@ -9912,7 +9754,7 @@
           <a:p>
             <a:r>
               <a:rPr lang="en-US" dirty="0"/>
-              <a:t>Patient #29</a:t>
+              <a:t>Patient #28</a:t>
             </a:r>
           </a:p>
         </p:txBody>
@@ -9920,7 +9762,7 @@
     </p:spTree>
     <p:extLst>
       <p:ext uri="{BB962C8B-B14F-4D97-AF65-F5344CB8AC3E}">
-        <p14:creationId xmlns:p14="http://schemas.microsoft.com/office/powerpoint/2010/main" val="2485784403"/>
+        <p14:creationId xmlns:p14="http://schemas.microsoft.com/office/powerpoint/2010/main" val="1099184777"/>
       </p:ext>
     </p:extLst>
   </p:cSld>
@@ -10106,7 +9948,7 @@
           <a:p>
             <a:r>
               <a:rPr lang="en-US" dirty="0"/>
-              <a:t>Stanford heart transplant data</a:t>
+              <a:t>Stanford transplant data</a:t>
             </a:r>
           </a:p>
         </p:txBody>
@@ -10196,7 +10038,7 @@
                 <a:latin typeface="Courier New" panose="02070309020205020404" pitchFamily="49" charset="0"/>
                 <a:cs typeface="Courier New" panose="02070309020205020404" pitchFamily="49" charset="0"/>
               </a:rPr>
-              <a:t>30 1969-08-19 1969-09-03 1971-12-18      1          1</a:t>
+              <a:t>29 1969-07-14       &lt;NA&gt; 1969-08-17      1          0</a:t>
             </a:r>
           </a:p>
           <a:p>
@@ -10220,7 +10062,7 @@
                 <a:latin typeface="Courier New" panose="02070309020205020404" pitchFamily="49" charset="0"/>
                 <a:cs typeface="Courier New" panose="02070309020205020404" pitchFamily="49" charset="0"/>
               </a:rPr>
-              <a:t>30 15 days  851 days     D          1</a:t>
+              <a:t>29 NA days   34 days     D          0</a:t>
             </a:r>
           </a:p>
           <a:p>
@@ -10244,16 +10086,7 @@
                 <a:latin typeface="Courier New" panose="02070309020205020404" pitchFamily="49" charset="0"/>
                 <a:cs typeface="Courier New" panose="02070309020205020404" pitchFamily="49" charset="0"/>
               </a:rPr>
-              <a:t>30     0   15     0          0</a:t>
-            </a:r>
-          </a:p>
-          <a:p>
-            <a:r>
-              <a:rPr lang="en-US" sz="1800" dirty="0">
-                <a:latin typeface="Courier New" panose="02070309020205020404" pitchFamily="49" charset="0"/>
-                <a:cs typeface="Courier New" panose="02070309020205020404" pitchFamily="49" charset="0"/>
-              </a:rPr>
-              <a:t>30    15  851     1          1</a:t>
+              <a:t>29     0   34     1          0</a:t>
             </a:r>
           </a:p>
         </p:txBody>
@@ -10335,7 +10168,7 @@
           <a:p>
             <a:r>
               <a:rPr lang="en-US" dirty="0"/>
-              <a:t>Patient #30</a:t>
+              <a:t>Patient #29</a:t>
             </a:r>
           </a:p>
         </p:txBody>
@@ -10343,7 +10176,7 @@
     </p:spTree>
     <p:extLst>
       <p:ext uri="{BB962C8B-B14F-4D97-AF65-F5344CB8AC3E}">
-        <p14:creationId xmlns:p14="http://schemas.microsoft.com/office/powerpoint/2010/main" val="461925367"/>
+        <p14:creationId xmlns:p14="http://schemas.microsoft.com/office/powerpoint/2010/main" val="2485784403"/>
       </p:ext>
     </p:extLst>
   </p:cSld>
@@ -10387,7 +10220,7 @@
           <a:p>
             <a:r>
               <a:rPr lang="en-US" dirty="0"/>
-              <a:t>Conclusion</a:t>
+              <a:t>Stanford transplant data</a:t>
             </a:r>
           </a:p>
         </p:txBody>
@@ -10407,20 +10240,135 @@
           <a:bodyPr/>
           <a:lstStyle/>
           <a:p>
-            <a:pPr marL="457200" indent="-457200">
-              <a:buFont typeface="+mj-lt"/>
-              <a:buAutoNum type="arabicPeriod"/>
-            </a:pPr>
-            <a:r>
-              <a:rPr lang="en-US" dirty="0">
-                <a:latin typeface="+mj-lt"/>
-                <a:cs typeface="Courier New" panose="02070309020205020404" pitchFamily="49" charset="0"/>
-              </a:rPr>
-              <a:t>The</a:t>
-            </a:r>
-            <a:endParaRPr lang="en-US" dirty="0">
-              <a:latin typeface="+mj-lt"/>
+            <a:r>
+              <a:rPr lang="en-US" sz="1800" dirty="0">
+                <a:latin typeface="Courier New" panose="02070309020205020404" pitchFamily="49" charset="0"/>
+                <a:cs typeface="Courier New" panose="02070309020205020404" pitchFamily="49" charset="0"/>
+              </a:rPr>
+              <a:t>id  </a:t>
+            </a:r>
+            <a:r>
+              <a:rPr lang="en-US" sz="1800" dirty="0" err="1">
+                <a:latin typeface="Courier New" panose="02070309020205020404" pitchFamily="49" charset="0"/>
+                <a:cs typeface="Courier New" panose="02070309020205020404" pitchFamily="49" charset="0"/>
+              </a:rPr>
+              <a:t>accept.dt</a:t>
+            </a:r>
+            <a:r>
+              <a:rPr lang="en-US" sz="1800" dirty="0">
+                <a:latin typeface="Courier New" panose="02070309020205020404" pitchFamily="49" charset="0"/>
+                <a:cs typeface="Courier New" panose="02070309020205020404" pitchFamily="49" charset="0"/>
+              </a:rPr>
+              <a:t>    </a:t>
+            </a:r>
+            <a:r>
+              <a:rPr lang="en-US" sz="1800" dirty="0" err="1">
+                <a:latin typeface="Courier New" panose="02070309020205020404" pitchFamily="49" charset="0"/>
+                <a:cs typeface="Courier New" panose="02070309020205020404" pitchFamily="49" charset="0"/>
+              </a:rPr>
+              <a:t>tx.date</a:t>
+            </a:r>
+            <a:r>
+              <a:rPr lang="en-US" sz="1800" dirty="0">
+                <a:latin typeface="Courier New" panose="02070309020205020404" pitchFamily="49" charset="0"/>
+                <a:cs typeface="Courier New" panose="02070309020205020404" pitchFamily="49" charset="0"/>
+              </a:rPr>
+              <a:t>    </a:t>
+            </a:r>
+            <a:r>
+              <a:rPr lang="en-US" sz="1800" dirty="0" err="1">
+                <a:latin typeface="Courier New" panose="02070309020205020404" pitchFamily="49" charset="0"/>
+                <a:cs typeface="Courier New" panose="02070309020205020404" pitchFamily="49" charset="0"/>
+              </a:rPr>
+              <a:t>fu.date</a:t>
+            </a:r>
+            <a:r>
+              <a:rPr lang="en-US" sz="1800" dirty="0">
+                <a:latin typeface="Courier New" panose="02070309020205020404" pitchFamily="49" charset="0"/>
+                <a:cs typeface="Courier New" panose="02070309020205020404" pitchFamily="49" charset="0"/>
+              </a:rPr>
+              <a:t> </a:t>
+            </a:r>
+            <a:r>
+              <a:rPr lang="en-US" sz="1800" dirty="0" err="1">
+                <a:latin typeface="Courier New" panose="02070309020205020404" pitchFamily="49" charset="0"/>
+                <a:cs typeface="Courier New" panose="02070309020205020404" pitchFamily="49" charset="0"/>
+              </a:rPr>
+              <a:t>fustat</a:t>
+            </a:r>
+            <a:r>
+              <a:rPr lang="en-US" sz="1800" dirty="0">
+                <a:latin typeface="Courier New" panose="02070309020205020404" pitchFamily="49" charset="0"/>
+                <a:cs typeface="Courier New" panose="02070309020205020404" pitchFamily="49" charset="0"/>
+              </a:rPr>
+              <a:t> transplant</a:t>
+            </a:r>
+          </a:p>
+          <a:p>
+            <a:r>
+              <a:rPr lang="en-US" sz="1800" dirty="0">
+                <a:latin typeface="Courier New" panose="02070309020205020404" pitchFamily="49" charset="0"/>
+                <a:cs typeface="Courier New" panose="02070309020205020404" pitchFamily="49" charset="0"/>
+              </a:rPr>
+              <a:t>30 1969-08-19 1969-09-03 1971-12-18      1          1</a:t>
+            </a:r>
+          </a:p>
+          <a:p>
+            <a:endParaRPr lang="en-US" sz="1800" dirty="0">
+              <a:latin typeface="Courier New" panose="02070309020205020404" pitchFamily="49" charset="0"/>
+              <a:cs typeface="Courier New" panose="02070309020205020404" pitchFamily="49" charset="0"/>
             </a:endParaRPr>
+          </a:p>
+          <a:p>
+            <a:r>
+              <a:rPr lang="en-US" sz="1800" dirty="0">
+                <a:latin typeface="Courier New" panose="02070309020205020404" pitchFamily="49" charset="0"/>
+                <a:cs typeface="Courier New" panose="02070309020205020404" pitchFamily="49" charset="0"/>
+              </a:rPr>
+              <a:t>id   time1     time2 event transplant</a:t>
+            </a:r>
+          </a:p>
+          <a:p>
+            <a:r>
+              <a:rPr lang="en-US" sz="1800" dirty="0">
+                <a:latin typeface="Courier New" panose="02070309020205020404" pitchFamily="49" charset="0"/>
+                <a:cs typeface="Courier New" panose="02070309020205020404" pitchFamily="49" charset="0"/>
+              </a:rPr>
+              <a:t>30 15 days  851 days     D          1</a:t>
+            </a:r>
+          </a:p>
+          <a:p>
+            <a:endParaRPr lang="en-US" sz="1800" dirty="0">
+              <a:latin typeface="Courier New" panose="02070309020205020404" pitchFamily="49" charset="0"/>
+              <a:cs typeface="Courier New" panose="02070309020205020404" pitchFamily="49" charset="0"/>
+            </a:endParaRPr>
+          </a:p>
+          <a:p>
+            <a:r>
+              <a:rPr lang="en-US" sz="1800" dirty="0">
+                <a:latin typeface="Courier New" panose="02070309020205020404" pitchFamily="49" charset="0"/>
+                <a:cs typeface="Courier New" panose="02070309020205020404" pitchFamily="49" charset="0"/>
+              </a:rPr>
+              <a:t>id start stop event transplant</a:t>
+            </a:r>
+          </a:p>
+          <a:p>
+            <a:r>
+              <a:rPr lang="en-US" sz="1800" dirty="0">
+                <a:latin typeface="Courier New" panose="02070309020205020404" pitchFamily="49" charset="0"/>
+                <a:cs typeface="Courier New" panose="02070309020205020404" pitchFamily="49" charset="0"/>
+              </a:rPr>
+              <a:t>30     0   15     0          0</a:t>
+            </a:r>
+          </a:p>
+          <a:p>
+            <a:r>
+              <a:rPr lang="en-US" sz="1800" dirty="0">
+                <a:latin typeface="Courier New" panose="02070309020205020404" pitchFamily="49" charset="0"/>
+                <a:cs typeface="Courier New" panose="02070309020205020404" pitchFamily="49" charset="0"/>
+              </a:rPr>
+              <a:t>30    15  851     1          1</a:t>
+            </a:r>
           </a:p>
         </p:txBody>
       </p:sp>
@@ -10479,6 +10427,289 @@
                 <a:defRPr/>
               </a:pPr>
               <a:t>41</a:t>
+            </a:fld>
+            <a:endParaRPr lang="en-US"/>
+          </a:p>
+        </p:txBody>
+      </p:sp>
+      <p:sp>
+        <p:nvSpPr>
+          <p:cNvPr id="6" name="Text Placeholder 5"/>
+          <p:cNvSpPr>
+            <a:spLocks noGrp="1"/>
+          </p:cNvSpPr>
+          <p:nvPr>
+            <p:ph type="body" sz="quarter" idx="12"/>
+          </p:nvPr>
+        </p:nvSpPr>
+        <p:spPr/>
+        <p:txBody>
+          <a:bodyPr/>
+          <a:lstStyle/>
+          <a:p>
+            <a:r>
+              <a:rPr lang="en-US" dirty="0"/>
+              <a:t>Patient #30</a:t>
+            </a:r>
+          </a:p>
+        </p:txBody>
+      </p:sp>
+    </p:spTree>
+    <p:extLst>
+      <p:ext uri="{BB962C8B-B14F-4D97-AF65-F5344CB8AC3E}">
+        <p14:creationId xmlns:p14="http://schemas.microsoft.com/office/powerpoint/2010/main" val="461925367"/>
+      </p:ext>
+    </p:extLst>
+  </p:cSld>
+  <p:clrMapOvr>
+    <a:masterClrMapping/>
+  </p:clrMapOvr>
+</p:sld>
+</file>
+
+<file path=ppt/slides/slide42.xml><?xml version="1.0" encoding="utf-8"?>
+<p:sld xmlns:a="http://schemas.openxmlformats.org/drawingml/2006/main" xmlns:r="http://schemas.openxmlformats.org/officeDocument/2006/relationships" xmlns:p="http://schemas.openxmlformats.org/presentationml/2006/main">
+  <p:cSld>
+    <p:spTree>
+      <p:nvGrpSpPr>
+        <p:cNvPr id="1" name=""/>
+        <p:cNvGrpSpPr/>
+        <p:nvPr/>
+      </p:nvGrpSpPr>
+      <p:grpSpPr>
+        <a:xfrm>
+          <a:off x="0" y="0"/>
+          <a:ext cx="0" cy="0"/>
+          <a:chOff x="0" y="0"/>
+          <a:chExt cx="0" cy="0"/>
+        </a:xfrm>
+      </p:grpSpPr>
+      <p:sp>
+        <p:nvSpPr>
+          <p:cNvPr id="2" name="Title 1"/>
+          <p:cNvSpPr>
+            <a:spLocks noGrp="1"/>
+          </p:cNvSpPr>
+          <p:nvPr>
+            <p:ph type="title"/>
+          </p:nvPr>
+        </p:nvSpPr>
+        <p:spPr/>
+        <p:txBody>
+          <a:bodyPr/>
+          <a:lstStyle/>
+          <a:p>
+            <a:r>
+              <a:rPr lang="en-US" dirty="0"/>
+              <a:t>Stanford transplant data, time-varying model</a:t>
+            </a:r>
+          </a:p>
+        </p:txBody>
+      </p:sp>
+      <p:sp>
+        <p:nvSpPr>
+          <p:cNvPr id="5" name="Slide Number Placeholder 4"/>
+          <p:cNvSpPr>
+            <a:spLocks noGrp="1"/>
+          </p:cNvSpPr>
+          <p:nvPr>
+            <p:ph type="sldNum" sz="quarter" idx="11"/>
+          </p:nvPr>
+        </p:nvSpPr>
+        <p:spPr/>
+        <p:txBody>
+          <a:bodyPr/>
+          <a:lstStyle/>
+          <a:p>
+            <a:pPr>
+              <a:defRPr/>
+            </a:pPr>
+            <a:endParaRPr lang="en-US"/>
+          </a:p>
+          <a:p>
+            <a:pPr>
+              <a:defRPr/>
+            </a:pPr>
+            <a:fld id="{E9A8CBA3-AA2B-46A6-BFA3-DCEBEAAB3F0A}" type="slidenum">
+              <a:rPr lang="en-US" smtClean="0"/>
+              <a:pPr>
+                <a:defRPr/>
+              </a:pPr>
+              <a:t>42</a:t>
+            </a:fld>
+            <a:endParaRPr lang="en-US"/>
+          </a:p>
+        </p:txBody>
+      </p:sp>
+      <p:pic>
+        <p:nvPicPr>
+          <p:cNvPr id="3" name="Picture 2">
+            <a:extLst>
+              <a:ext uri="{FF2B5EF4-FFF2-40B4-BE49-F238E27FC236}">
+                <a16:creationId xmlns:a16="http://schemas.microsoft.com/office/drawing/2014/main" id="{23E150EA-D399-4620-B8ED-FA79690F2C06}"/>
+              </a:ext>
+            </a:extLst>
+          </p:cNvPr>
+          <p:cNvPicPr>
+            <a:picLocks noChangeAspect="1"/>
+          </p:cNvPicPr>
+          <p:nvPr/>
+        </p:nvPicPr>
+        <p:blipFill>
+          <a:blip r:embed="rId2"/>
+          <a:stretch>
+            <a:fillRect/>
+          </a:stretch>
+        </p:blipFill>
+        <p:spPr>
+          <a:xfrm>
+            <a:off x="426362" y="1219200"/>
+            <a:ext cx="8247619" cy="2095238"/>
+          </a:xfrm>
+          <a:prstGeom prst="rect">
+            <a:avLst/>
+          </a:prstGeom>
+        </p:spPr>
+      </p:pic>
+    </p:spTree>
+    <p:extLst>
+      <p:ext uri="{BB962C8B-B14F-4D97-AF65-F5344CB8AC3E}">
+        <p14:creationId xmlns:p14="http://schemas.microsoft.com/office/powerpoint/2010/main" val="2566188297"/>
+      </p:ext>
+    </p:extLst>
+  </p:cSld>
+  <p:clrMapOvr>
+    <a:masterClrMapping/>
+  </p:clrMapOvr>
+</p:sld>
+</file>
+
+<file path=ppt/slides/slide43.xml><?xml version="1.0" encoding="utf-8"?>
+<p:sld xmlns:a="http://schemas.openxmlformats.org/drawingml/2006/main" xmlns:r="http://schemas.openxmlformats.org/officeDocument/2006/relationships" xmlns:p="http://schemas.openxmlformats.org/presentationml/2006/main">
+  <p:cSld>
+    <p:spTree>
+      <p:nvGrpSpPr>
+        <p:cNvPr id="1" name=""/>
+        <p:cNvGrpSpPr/>
+        <p:nvPr/>
+      </p:nvGrpSpPr>
+      <p:grpSpPr>
+        <a:xfrm>
+          <a:off x="0" y="0"/>
+          <a:ext cx="0" cy="0"/>
+          <a:chOff x="0" y="0"/>
+          <a:chExt cx="0" cy="0"/>
+        </a:xfrm>
+      </p:grpSpPr>
+      <p:sp>
+        <p:nvSpPr>
+          <p:cNvPr id="2" name="Title 1"/>
+          <p:cNvSpPr>
+            <a:spLocks noGrp="1"/>
+          </p:cNvSpPr>
+          <p:nvPr>
+            <p:ph type="title"/>
+          </p:nvPr>
+        </p:nvSpPr>
+        <p:spPr/>
+        <p:txBody>
+          <a:bodyPr/>
+          <a:lstStyle/>
+          <a:p>
+            <a:r>
+              <a:rPr lang="en-US" dirty="0"/>
+              <a:t>Conclusion</a:t>
+            </a:r>
+          </a:p>
+        </p:txBody>
+      </p:sp>
+      <p:sp>
+        <p:nvSpPr>
+          <p:cNvPr id="3" name="Text Placeholder 2"/>
+          <p:cNvSpPr>
+            <a:spLocks noGrp="1"/>
+          </p:cNvSpPr>
+          <p:nvPr>
+            <p:ph type="body" idx="1"/>
+          </p:nvPr>
+        </p:nvSpPr>
+        <p:spPr/>
+        <p:txBody>
+          <a:bodyPr/>
+          <a:lstStyle/>
+          <a:p>
+            <a:pPr marL="457200" indent="-457200">
+              <a:buFont typeface="+mj-lt"/>
+              <a:buAutoNum type="arabicPeriod"/>
+            </a:pPr>
+            <a:r>
+              <a:rPr lang="en-US" dirty="0">
+                <a:latin typeface="+mj-lt"/>
+                <a:cs typeface="Courier New" panose="02070309020205020404" pitchFamily="49" charset="0"/>
+              </a:rPr>
+              <a:t>The</a:t>
+            </a:r>
+            <a:endParaRPr lang="en-US" dirty="0">
+              <a:latin typeface="+mj-lt"/>
+            </a:endParaRPr>
+          </a:p>
+        </p:txBody>
+      </p:sp>
+      <p:sp>
+        <p:nvSpPr>
+          <p:cNvPr id="4" name="Footer Placeholder 3"/>
+          <p:cNvSpPr>
+            <a:spLocks noGrp="1"/>
+          </p:cNvSpPr>
+          <p:nvPr>
+            <p:ph type="ftr" sz="quarter" idx="10"/>
+          </p:nvPr>
+        </p:nvSpPr>
+        <p:spPr/>
+        <p:txBody>
+          <a:bodyPr/>
+          <a:lstStyle/>
+          <a:p>
+            <a:pPr>
+              <a:defRPr/>
+            </a:pPr>
+            <a:r>
+              <a:rPr lang="en-US" altLang="en-US" dirty="0"/>
+              <a:t>©2018 Steve Simon    http://TheAnalysisFactor.com</a:t>
+            </a:r>
+          </a:p>
+        </p:txBody>
+      </p:sp>
+      <p:sp>
+        <p:nvSpPr>
+          <p:cNvPr id="5" name="Slide Number Placeholder 4"/>
+          <p:cNvSpPr>
+            <a:spLocks noGrp="1"/>
+          </p:cNvSpPr>
+          <p:nvPr>
+            <p:ph type="sldNum" sz="quarter" idx="11"/>
+          </p:nvPr>
+        </p:nvSpPr>
+        <p:spPr/>
+        <p:txBody>
+          <a:bodyPr/>
+          <a:lstStyle/>
+          <a:p>
+            <a:pPr>
+              <a:defRPr/>
+            </a:pPr>
+            <a:endParaRPr lang="en-US"/>
+          </a:p>
+          <a:p>
+            <a:pPr>
+              <a:defRPr/>
+            </a:pPr>
+            <a:fld id="{E9A8CBA3-AA2B-46A6-BFA3-DCEBEAAB3F0A}" type="slidenum">
+              <a:rPr lang="en-US" smtClean="0"/>
+              <a:pPr>
+                <a:defRPr/>
+              </a:pPr>
+              <a:t>43</a:t>
             </a:fld>
             <a:endParaRPr lang="en-US"/>
           </a:p>

</xml_diff>

<commit_message>
Refined time-transfer in lecture 6.
</commit_message>
<xml_diff>
--- a/bin/survival lecture 6.pptx
+++ b/bin/survival lecture 6.pptx
@@ -5,10 +5,10 @@
     <p:sldMasterId id="2147483664" r:id="rId1"/>
   </p:sldMasterIdLst>
   <p:notesMasterIdLst>
-    <p:notesMasterId r:id="rId45"/>
+    <p:notesMasterId r:id="rId49"/>
   </p:notesMasterIdLst>
   <p:handoutMasterIdLst>
-    <p:handoutMasterId r:id="rId46"/>
+    <p:handoutMasterId r:id="rId50"/>
   </p:handoutMasterIdLst>
   <p:sldIdLst>
     <p:sldId id="256" r:id="rId2"/>
@@ -38,22 +38,26 @@
     <p:sldId id="402" r:id="rId26"/>
     <p:sldId id="403" r:id="rId27"/>
     <p:sldId id="404" r:id="rId28"/>
-    <p:sldId id="411" r:id="rId29"/>
-    <p:sldId id="412" r:id="rId30"/>
-    <p:sldId id="423" r:id="rId31"/>
-    <p:sldId id="424" r:id="rId32"/>
-    <p:sldId id="413" r:id="rId33"/>
-    <p:sldId id="414" r:id="rId34"/>
-    <p:sldId id="415" r:id="rId35"/>
-    <p:sldId id="416" r:id="rId36"/>
-    <p:sldId id="417" r:id="rId37"/>
-    <p:sldId id="418" r:id="rId38"/>
-    <p:sldId id="419" r:id="rId39"/>
-    <p:sldId id="420" r:id="rId40"/>
-    <p:sldId id="421" r:id="rId41"/>
-    <p:sldId id="422" r:id="rId42"/>
-    <p:sldId id="425" r:id="rId43"/>
-    <p:sldId id="342" r:id="rId44"/>
+    <p:sldId id="426" r:id="rId29"/>
+    <p:sldId id="428" r:id="rId30"/>
+    <p:sldId id="429" r:id="rId31"/>
+    <p:sldId id="411" r:id="rId32"/>
+    <p:sldId id="427" r:id="rId33"/>
+    <p:sldId id="412" r:id="rId34"/>
+    <p:sldId id="423" r:id="rId35"/>
+    <p:sldId id="424" r:id="rId36"/>
+    <p:sldId id="413" r:id="rId37"/>
+    <p:sldId id="414" r:id="rId38"/>
+    <p:sldId id="415" r:id="rId39"/>
+    <p:sldId id="416" r:id="rId40"/>
+    <p:sldId id="417" r:id="rId41"/>
+    <p:sldId id="418" r:id="rId42"/>
+    <p:sldId id="419" r:id="rId43"/>
+    <p:sldId id="420" r:id="rId44"/>
+    <p:sldId id="421" r:id="rId45"/>
+    <p:sldId id="422" r:id="rId46"/>
+    <p:sldId id="425" r:id="rId47"/>
+    <p:sldId id="342" r:id="rId48"/>
   </p:sldIdLst>
   <p:sldSz cx="9144000" cy="6858000" type="screen4x3"/>
   <p:notesSz cx="9601200" cy="7315200"/>
@@ -370,7 +374,7 @@
               <a:pPr>
                 <a:defRPr/>
               </a:pPr>
-              <a:t>6/1/2018</a:t>
+              <a:t>6/11/2018</a:t>
             </a:fld>
             <a:endParaRPr lang="en-US" altLang="en-US"/>
           </a:p>
@@ -678,7 +682,7 @@
               <a:pPr>
                 <a:defRPr/>
               </a:pPr>
-              <a:t>6/1/2018</a:t>
+              <a:t>6/11/2018</a:t>
             </a:fld>
             <a:endParaRPr lang="en-US" altLang="en-US"/>
           </a:p>
@@ -6892,7 +6896,64 @@
           <a:p>
             <a:r>
               <a:rPr lang="en-US" dirty="0"/>
-              <a:t>Stanford transplant data</a:t>
+              <a:t>Time-varying covariates</a:t>
+            </a:r>
+          </a:p>
+        </p:txBody>
+      </p:sp>
+      <p:sp>
+        <p:nvSpPr>
+          <p:cNvPr id="3" name="Text Placeholder 2"/>
+          <p:cNvSpPr>
+            <a:spLocks noGrp="1"/>
+          </p:cNvSpPr>
+          <p:nvPr>
+            <p:ph type="body" idx="1"/>
+          </p:nvPr>
+        </p:nvSpPr>
+        <p:spPr/>
+        <p:txBody>
+          <a:bodyPr/>
+          <a:lstStyle/>
+          <a:p>
+            <a:r>
+              <a:rPr lang="en-US" dirty="0"/>
+              <a:t>You can address problems with non-proportional hazards by creating an interaction involving time. </a:t>
+            </a:r>
+          </a:p>
+          <a:p>
+            <a:pPr marL="342900" indent="-342900">
+              <a:buFont typeface="Arial" panose="020B0604020202020204" pitchFamily="34" charset="0"/>
+              <a:buChar char="•"/>
+            </a:pPr>
+            <a:r>
+              <a:rPr lang="en-US" dirty="0"/>
+              <a:t>Also consider interactions involving log(time).</a:t>
+            </a:r>
+          </a:p>
+        </p:txBody>
+      </p:sp>
+      <p:sp>
+        <p:nvSpPr>
+          <p:cNvPr id="4" name="Footer Placeholder 3"/>
+          <p:cNvSpPr>
+            <a:spLocks noGrp="1"/>
+          </p:cNvSpPr>
+          <p:nvPr>
+            <p:ph type="ftr" sz="quarter" idx="10"/>
+          </p:nvPr>
+        </p:nvSpPr>
+        <p:spPr/>
+        <p:txBody>
+          <a:bodyPr/>
+          <a:lstStyle/>
+          <a:p>
+            <a:pPr>
+              <a:defRPr/>
+            </a:pPr>
+            <a:r>
+              <a:rPr lang="en-US" altLang="en-US" dirty="0"/>
+              <a:t>©2018 Steve Simon    http://TheAnalysisFactor.com</a:t>
             </a:r>
           </a:p>
         </p:txBody>
@@ -6927,6 +6988,987 @@
                 <a:defRPr/>
               </a:pPr>
               <a:t>28</a:t>
+            </a:fld>
+            <a:endParaRPr lang="en-US"/>
+          </a:p>
+        </p:txBody>
+      </p:sp>
+      <p:sp>
+        <p:nvSpPr>
+          <p:cNvPr id="6" name="Text Placeholder 5"/>
+          <p:cNvSpPr>
+            <a:spLocks noGrp="1"/>
+          </p:cNvSpPr>
+          <p:nvPr>
+            <p:ph type="body" sz="quarter" idx="12"/>
+          </p:nvPr>
+        </p:nvSpPr>
+        <p:spPr/>
+        <p:txBody>
+          <a:bodyPr/>
+          <a:lstStyle/>
+          <a:p>
+            <a:r>
+              <a:rPr lang="en-US" dirty="0"/>
+              <a:t>Interaction with time</a:t>
+            </a:r>
+          </a:p>
+        </p:txBody>
+      </p:sp>
+    </p:spTree>
+    <p:extLst>
+      <p:ext uri="{BB962C8B-B14F-4D97-AF65-F5344CB8AC3E}">
+        <p14:creationId xmlns:p14="http://schemas.microsoft.com/office/powerpoint/2010/main" val="1445232808"/>
+      </p:ext>
+    </p:extLst>
+  </p:cSld>
+  <p:clrMapOvr>
+    <a:masterClrMapping/>
+  </p:clrMapOvr>
+</p:sld>
+</file>
+
+<file path=ppt/slides/slide29.xml><?xml version="1.0" encoding="utf-8"?>
+<p:sld xmlns:a="http://schemas.openxmlformats.org/drawingml/2006/main" xmlns:r="http://schemas.openxmlformats.org/officeDocument/2006/relationships" xmlns:p="http://schemas.openxmlformats.org/presentationml/2006/main">
+  <p:cSld>
+    <p:spTree>
+      <p:nvGrpSpPr>
+        <p:cNvPr id="1" name=""/>
+        <p:cNvGrpSpPr/>
+        <p:nvPr/>
+      </p:nvGrpSpPr>
+      <p:grpSpPr>
+        <a:xfrm>
+          <a:off x="0" y="0"/>
+          <a:ext cx="0" cy="0"/>
+          <a:chOff x="0" y="0"/>
+          <a:chExt cx="0" cy="0"/>
+        </a:xfrm>
+      </p:grpSpPr>
+      <p:sp>
+        <p:nvSpPr>
+          <p:cNvPr id="2" name="Title 1"/>
+          <p:cNvSpPr>
+            <a:spLocks noGrp="1"/>
+          </p:cNvSpPr>
+          <p:nvPr>
+            <p:ph type="title"/>
+          </p:nvPr>
+        </p:nvSpPr>
+        <p:spPr/>
+        <p:txBody>
+          <a:bodyPr/>
+          <a:lstStyle/>
+          <a:p>
+            <a:r>
+              <a:rPr lang="en-US" dirty="0"/>
+              <a:t>Time-varying covariates</a:t>
+            </a:r>
+          </a:p>
+        </p:txBody>
+      </p:sp>
+      <p:sp>
+        <p:nvSpPr>
+          <p:cNvPr id="3" name="Text Placeholder 2"/>
+          <p:cNvSpPr>
+            <a:spLocks noGrp="1"/>
+          </p:cNvSpPr>
+          <p:nvPr>
+            <p:ph type="body" idx="1"/>
+          </p:nvPr>
+        </p:nvSpPr>
+        <p:spPr/>
+        <p:txBody>
+          <a:bodyPr/>
+          <a:lstStyle/>
+          <a:p>
+            <a:r>
+              <a:rPr lang="en-US" sz="1800" dirty="0">
+                <a:latin typeface="Courier New" panose="02070309020205020404" pitchFamily="49" charset="0"/>
+                <a:cs typeface="Courier New" panose="02070309020205020404" pitchFamily="49" charset="0"/>
+              </a:rPr>
+              <a:t>                   </a:t>
+            </a:r>
+            <a:r>
+              <a:rPr lang="en-US" sz="1800" dirty="0" err="1">
+                <a:latin typeface="Courier New" panose="02070309020205020404" pitchFamily="49" charset="0"/>
+                <a:cs typeface="Courier New" panose="02070309020205020404" pitchFamily="49" charset="0"/>
+              </a:rPr>
+              <a:t>coef</a:t>
+            </a:r>
+            <a:r>
+              <a:rPr lang="en-US" sz="1800" dirty="0">
+                <a:latin typeface="Courier New" panose="02070309020205020404" pitchFamily="49" charset="0"/>
+                <a:cs typeface="Courier New" panose="02070309020205020404" pitchFamily="49" charset="0"/>
+              </a:rPr>
+              <a:t> exp(</a:t>
+            </a:r>
+            <a:r>
+              <a:rPr lang="en-US" sz="1800" dirty="0" err="1">
+                <a:latin typeface="Courier New" panose="02070309020205020404" pitchFamily="49" charset="0"/>
+                <a:cs typeface="Courier New" panose="02070309020205020404" pitchFamily="49" charset="0"/>
+              </a:rPr>
+              <a:t>coef</a:t>
+            </a:r>
+            <a:r>
+              <a:rPr lang="en-US" sz="1800" dirty="0">
+                <a:latin typeface="Courier New" panose="02070309020205020404" pitchFamily="49" charset="0"/>
+                <a:cs typeface="Courier New" panose="02070309020205020404" pitchFamily="49" charset="0"/>
+              </a:rPr>
+              <a:t>) se(</a:t>
+            </a:r>
+            <a:r>
+              <a:rPr lang="en-US" sz="1800" dirty="0" err="1">
+                <a:latin typeface="Courier New" panose="02070309020205020404" pitchFamily="49" charset="0"/>
+                <a:cs typeface="Courier New" panose="02070309020205020404" pitchFamily="49" charset="0"/>
+              </a:rPr>
+              <a:t>coef</a:t>
+            </a:r>
+            <a:r>
+              <a:rPr lang="en-US" sz="1800" dirty="0">
+                <a:latin typeface="Courier New" panose="02070309020205020404" pitchFamily="49" charset="0"/>
+                <a:cs typeface="Courier New" panose="02070309020205020404" pitchFamily="49" charset="0"/>
+              </a:rPr>
+              <a:t>)     z       p</a:t>
+            </a:r>
+          </a:p>
+          <a:p>
+            <a:r>
+              <a:rPr lang="en-US" sz="1800" dirty="0">
+                <a:latin typeface="Courier New" panose="02070309020205020404" pitchFamily="49" charset="0"/>
+                <a:cs typeface="Courier New" panose="02070309020205020404" pitchFamily="49" charset="0"/>
+              </a:rPr>
+              <a:t>clinic          0.01940   1.01958  0.34717  0.06  0.9554</a:t>
+            </a:r>
+          </a:p>
+          <a:p>
+            <a:r>
+              <a:rPr lang="en-US" sz="1800" dirty="0" err="1">
+                <a:latin typeface="Courier New" panose="02070309020205020404" pitchFamily="49" charset="0"/>
+                <a:cs typeface="Courier New" panose="02070309020205020404" pitchFamily="49" charset="0"/>
+              </a:rPr>
+              <a:t>tt</a:t>
+            </a:r>
+            <a:r>
+              <a:rPr lang="en-US" sz="1800" dirty="0">
+                <a:latin typeface="Courier New" panose="02070309020205020404" pitchFamily="49" charset="0"/>
+                <a:cs typeface="Courier New" panose="02070309020205020404" pitchFamily="49" charset="0"/>
+              </a:rPr>
+              <a:t>(clinic)     -1.10331   0.33177  0.34528 -3.20  0.0014</a:t>
+            </a:r>
+          </a:p>
+          <a:p>
+            <a:r>
+              <a:rPr lang="en-US" sz="1800" dirty="0" err="1">
+                <a:latin typeface="Courier New" panose="02070309020205020404" pitchFamily="49" charset="0"/>
+                <a:cs typeface="Courier New" panose="02070309020205020404" pitchFamily="49" charset="0"/>
+              </a:rPr>
+              <a:t>i_prison</a:t>
+            </a:r>
+            <a:r>
+              <a:rPr lang="en-US" sz="1800" dirty="0">
+                <a:latin typeface="Courier New" panose="02070309020205020404" pitchFamily="49" charset="0"/>
+                <a:cs typeface="Courier New" panose="02070309020205020404" pitchFamily="49" charset="0"/>
+              </a:rPr>
+              <a:t>        0.38997   1.47693  0.16889  2.31  0.0209</a:t>
+            </a:r>
+          </a:p>
+          <a:p>
+            <a:r>
+              <a:rPr lang="en-US" sz="1800" dirty="0" err="1">
+                <a:latin typeface="Courier New" panose="02070309020205020404" pitchFamily="49" charset="0"/>
+                <a:cs typeface="Courier New" panose="02070309020205020404" pitchFamily="49" charset="0"/>
+              </a:rPr>
+              <a:t>methadone_dose</a:t>
+            </a:r>
+            <a:r>
+              <a:rPr lang="en-US" sz="1800" dirty="0">
+                <a:latin typeface="Courier New" panose="02070309020205020404" pitchFamily="49" charset="0"/>
+                <a:cs typeface="Courier New" panose="02070309020205020404" pitchFamily="49" charset="0"/>
+              </a:rPr>
+              <a:t> -0.03519   0.96543  0.00644 -5.46 4.7e-08</a:t>
+            </a:r>
+          </a:p>
+          <a:p>
+            <a:endParaRPr lang="en-US" sz="1800" dirty="0">
+              <a:latin typeface="Courier New" panose="02070309020205020404" pitchFamily="49" charset="0"/>
+              <a:cs typeface="Courier New" panose="02070309020205020404" pitchFamily="49" charset="0"/>
+            </a:endParaRPr>
+          </a:p>
+          <a:p>
+            <a:r>
+              <a:rPr lang="en-US" sz="1800" dirty="0">
+                <a:latin typeface="Courier New" panose="02070309020205020404" pitchFamily="49" charset="0"/>
+                <a:cs typeface="Courier New" panose="02070309020205020404" pitchFamily="49" charset="0"/>
+              </a:rPr>
+              <a:t>Likelihood ratio test=76.1  on 4 df, p=1.11e-15</a:t>
+            </a:r>
+          </a:p>
+          <a:p>
+            <a:r>
+              <a:rPr lang="en-US" sz="1800" dirty="0">
+                <a:latin typeface="Courier New" panose="02070309020205020404" pitchFamily="49" charset="0"/>
+                <a:cs typeface="Courier New" panose="02070309020205020404" pitchFamily="49" charset="0"/>
+              </a:rPr>
+              <a:t>n= 238, number of events= 150</a:t>
+            </a:r>
+          </a:p>
+        </p:txBody>
+      </p:sp>
+      <p:sp>
+        <p:nvSpPr>
+          <p:cNvPr id="4" name="Footer Placeholder 3"/>
+          <p:cNvSpPr>
+            <a:spLocks noGrp="1"/>
+          </p:cNvSpPr>
+          <p:nvPr>
+            <p:ph type="ftr" sz="quarter" idx="10"/>
+          </p:nvPr>
+        </p:nvSpPr>
+        <p:spPr/>
+        <p:txBody>
+          <a:bodyPr/>
+          <a:lstStyle/>
+          <a:p>
+            <a:pPr>
+              <a:defRPr/>
+            </a:pPr>
+            <a:r>
+              <a:rPr lang="en-US" altLang="en-US" dirty="0"/>
+              <a:t>©2018 Steve Simon    http://TheAnalysisFactor.com</a:t>
+            </a:r>
+          </a:p>
+        </p:txBody>
+      </p:sp>
+      <p:sp>
+        <p:nvSpPr>
+          <p:cNvPr id="5" name="Slide Number Placeholder 4"/>
+          <p:cNvSpPr>
+            <a:spLocks noGrp="1"/>
+          </p:cNvSpPr>
+          <p:nvPr>
+            <p:ph type="sldNum" sz="quarter" idx="11"/>
+          </p:nvPr>
+        </p:nvSpPr>
+        <p:spPr/>
+        <p:txBody>
+          <a:bodyPr/>
+          <a:lstStyle/>
+          <a:p>
+            <a:pPr>
+              <a:defRPr/>
+            </a:pPr>
+            <a:endParaRPr lang="en-US"/>
+          </a:p>
+          <a:p>
+            <a:pPr>
+              <a:defRPr/>
+            </a:pPr>
+            <a:fld id="{E9A8CBA3-AA2B-46A6-BFA3-DCEBEAAB3F0A}" type="slidenum">
+              <a:rPr lang="en-US" smtClean="0"/>
+              <a:pPr>
+                <a:defRPr/>
+              </a:pPr>
+              <a:t>29</a:t>
+            </a:fld>
+            <a:endParaRPr lang="en-US"/>
+          </a:p>
+        </p:txBody>
+      </p:sp>
+      <p:sp>
+        <p:nvSpPr>
+          <p:cNvPr id="6" name="Text Placeholder 5"/>
+          <p:cNvSpPr>
+            <a:spLocks noGrp="1"/>
+          </p:cNvSpPr>
+          <p:nvPr>
+            <p:ph type="body" sz="quarter" idx="12"/>
+          </p:nvPr>
+        </p:nvSpPr>
+        <p:spPr/>
+        <p:txBody>
+          <a:bodyPr/>
+          <a:lstStyle/>
+          <a:p>
+            <a:r>
+              <a:rPr lang="en-US" dirty="0"/>
+              <a:t>Interaction with time, heroin dataset</a:t>
+            </a:r>
+          </a:p>
+        </p:txBody>
+      </p:sp>
+    </p:spTree>
+    <p:extLst>
+      <p:ext uri="{BB962C8B-B14F-4D97-AF65-F5344CB8AC3E}">
+        <p14:creationId xmlns:p14="http://schemas.microsoft.com/office/powerpoint/2010/main" val="2906842275"/>
+      </p:ext>
+    </p:extLst>
+  </p:cSld>
+  <p:clrMapOvr>
+    <a:masterClrMapping/>
+  </p:clrMapOvr>
+</p:sld>
+</file>
+
+<file path=ppt/slides/slide3.xml><?xml version="1.0" encoding="utf-8"?>
+<p:sld xmlns:a="http://schemas.openxmlformats.org/drawingml/2006/main" xmlns:r="http://schemas.openxmlformats.org/officeDocument/2006/relationships" xmlns:p="http://schemas.openxmlformats.org/presentationml/2006/main">
+  <p:cSld>
+    <p:spTree>
+      <p:nvGrpSpPr>
+        <p:cNvPr id="1" name=""/>
+        <p:cNvGrpSpPr/>
+        <p:nvPr/>
+      </p:nvGrpSpPr>
+      <p:grpSpPr>
+        <a:xfrm>
+          <a:off x="0" y="0"/>
+          <a:ext cx="0" cy="0"/>
+          <a:chOff x="0" y="0"/>
+          <a:chExt cx="0" cy="0"/>
+        </a:xfrm>
+      </p:grpSpPr>
+      <p:sp>
+        <p:nvSpPr>
+          <p:cNvPr id="2" name="Title 1"/>
+          <p:cNvSpPr>
+            <a:spLocks noGrp="1"/>
+          </p:cNvSpPr>
+          <p:nvPr>
+            <p:ph type="title"/>
+          </p:nvPr>
+        </p:nvSpPr>
+        <p:spPr/>
+        <p:txBody>
+          <a:bodyPr/>
+          <a:lstStyle/>
+          <a:p>
+            <a:r>
+              <a:rPr lang="en-US" dirty="0"/>
+              <a:t>Testing the proportional hazards assumption</a:t>
+            </a:r>
+          </a:p>
+        </p:txBody>
+      </p:sp>
+      <p:sp>
+        <p:nvSpPr>
+          <p:cNvPr id="3" name="Text Placeholder 2"/>
+          <p:cNvSpPr>
+            <a:spLocks noGrp="1"/>
+          </p:cNvSpPr>
+          <p:nvPr>
+            <p:ph type="body" idx="1"/>
+          </p:nvPr>
+        </p:nvSpPr>
+        <p:spPr/>
+        <p:txBody>
+          <a:bodyPr/>
+          <a:lstStyle/>
+          <a:p>
+            <a:pPr marL="342900" indent="-342900">
+              <a:buFont typeface="+mj-lt"/>
+              <a:buAutoNum type="arabicPeriod"/>
+            </a:pPr>
+            <a:r>
+              <a:rPr lang="en-US" sz="1800" dirty="0"/>
+              <a:t>Patterns in Kaplan-Meier curves</a:t>
+            </a:r>
+          </a:p>
+          <a:p>
+            <a:pPr marL="342900" indent="-342900">
+              <a:buFont typeface="+mj-lt"/>
+              <a:buAutoNum type="arabicPeriod"/>
+            </a:pPr>
+            <a:r>
+              <a:rPr lang="en-US" sz="1800" dirty="0"/>
+              <a:t>Complementary log-log plot</a:t>
+            </a:r>
+          </a:p>
+          <a:p>
+            <a:pPr marL="342900" indent="-342900">
+              <a:buFont typeface="+mj-lt"/>
+              <a:buAutoNum type="arabicPeriod"/>
+            </a:pPr>
+            <a:r>
+              <a:rPr lang="en-US" sz="1800" dirty="0"/>
+              <a:t>Schoenfeld Residuals</a:t>
+            </a:r>
+          </a:p>
+          <a:p>
+            <a:pPr marL="342900" indent="-342900">
+              <a:buFont typeface="+mj-lt"/>
+              <a:buAutoNum type="arabicPeriod"/>
+            </a:pPr>
+            <a:r>
+              <a:rPr lang="en-US" sz="1800" dirty="0"/>
+              <a:t>Fit time varying covariates</a:t>
+            </a:r>
+          </a:p>
+          <a:p>
+            <a:pPr marL="342900" indent="-342900">
+              <a:buFont typeface="+mj-lt"/>
+              <a:buAutoNum type="arabicPeriod"/>
+            </a:pPr>
+            <a:endParaRPr lang="en-US" sz="1800" dirty="0"/>
+          </a:p>
+          <a:p>
+            <a:r>
+              <a:rPr lang="en-US" sz="1800" dirty="0"/>
+              <a:t>Save this for another day</a:t>
+            </a:r>
+            <a:endParaRPr lang="en-US" sz="1800" b="1" dirty="0">
+              <a:latin typeface="Courier New" panose="02070309020205020404" pitchFamily="49" charset="0"/>
+              <a:cs typeface="Courier New" panose="02070309020205020404" pitchFamily="49" charset="0"/>
+            </a:endParaRPr>
+          </a:p>
+        </p:txBody>
+      </p:sp>
+      <p:sp>
+        <p:nvSpPr>
+          <p:cNvPr id="4" name="Footer Placeholder 3"/>
+          <p:cNvSpPr>
+            <a:spLocks noGrp="1"/>
+          </p:cNvSpPr>
+          <p:nvPr>
+            <p:ph type="ftr" sz="quarter" idx="10"/>
+          </p:nvPr>
+        </p:nvSpPr>
+        <p:spPr/>
+        <p:txBody>
+          <a:bodyPr/>
+          <a:lstStyle/>
+          <a:p>
+            <a:pPr>
+              <a:defRPr/>
+            </a:pPr>
+            <a:r>
+              <a:rPr lang="en-US" altLang="en-US" dirty="0"/>
+              <a:t>©2018 Steve Simon    http://TheAnalysisFactor.com</a:t>
+            </a:r>
+          </a:p>
+        </p:txBody>
+      </p:sp>
+      <p:sp>
+        <p:nvSpPr>
+          <p:cNvPr id="5" name="Slide Number Placeholder 4"/>
+          <p:cNvSpPr>
+            <a:spLocks noGrp="1"/>
+          </p:cNvSpPr>
+          <p:nvPr>
+            <p:ph type="sldNum" sz="quarter" idx="11"/>
+          </p:nvPr>
+        </p:nvSpPr>
+        <p:spPr/>
+        <p:txBody>
+          <a:bodyPr/>
+          <a:lstStyle/>
+          <a:p>
+            <a:pPr>
+              <a:defRPr/>
+            </a:pPr>
+            <a:endParaRPr lang="en-US"/>
+          </a:p>
+          <a:p>
+            <a:pPr>
+              <a:defRPr/>
+            </a:pPr>
+            <a:fld id="{E9A8CBA3-AA2B-46A6-BFA3-DCEBEAAB3F0A}" type="slidenum">
+              <a:rPr lang="en-US" smtClean="0"/>
+              <a:pPr>
+                <a:defRPr/>
+              </a:pPr>
+              <a:t>3</a:t>
+            </a:fld>
+            <a:endParaRPr lang="en-US"/>
+          </a:p>
+        </p:txBody>
+      </p:sp>
+      <p:sp>
+        <p:nvSpPr>
+          <p:cNvPr id="6" name="Text Placeholder 5"/>
+          <p:cNvSpPr>
+            <a:spLocks noGrp="1"/>
+          </p:cNvSpPr>
+          <p:nvPr>
+            <p:ph type="body" sz="quarter" idx="12"/>
+          </p:nvPr>
+        </p:nvSpPr>
+        <p:spPr/>
+        <p:txBody>
+          <a:bodyPr/>
+          <a:lstStyle/>
+          <a:p>
+            <a:r>
+              <a:rPr lang="en-US" dirty="0"/>
+              <a:t>Several approaches</a:t>
+            </a:r>
+          </a:p>
+        </p:txBody>
+      </p:sp>
+    </p:spTree>
+    <p:extLst>
+      <p:ext uri="{BB962C8B-B14F-4D97-AF65-F5344CB8AC3E}">
+        <p14:creationId xmlns:p14="http://schemas.microsoft.com/office/powerpoint/2010/main" val="2692073544"/>
+      </p:ext>
+    </p:extLst>
+  </p:cSld>
+  <p:clrMapOvr>
+    <a:masterClrMapping/>
+  </p:clrMapOvr>
+</p:sld>
+</file>
+
+<file path=ppt/slides/slide30.xml><?xml version="1.0" encoding="utf-8"?>
+<p:sld xmlns:a="http://schemas.openxmlformats.org/drawingml/2006/main" xmlns:r="http://schemas.openxmlformats.org/officeDocument/2006/relationships" xmlns:p="http://schemas.openxmlformats.org/presentationml/2006/main">
+  <p:cSld>
+    <p:spTree>
+      <p:nvGrpSpPr>
+        <p:cNvPr id="1" name=""/>
+        <p:cNvGrpSpPr/>
+        <p:nvPr/>
+      </p:nvGrpSpPr>
+      <p:grpSpPr>
+        <a:xfrm>
+          <a:off x="0" y="0"/>
+          <a:ext cx="0" cy="0"/>
+          <a:chOff x="0" y="0"/>
+          <a:chExt cx="0" cy="0"/>
+        </a:xfrm>
+      </p:grpSpPr>
+      <p:sp>
+        <p:nvSpPr>
+          <p:cNvPr id="2" name="Title 1"/>
+          <p:cNvSpPr>
+            <a:spLocks noGrp="1"/>
+          </p:cNvSpPr>
+          <p:nvPr>
+            <p:ph type="title"/>
+          </p:nvPr>
+        </p:nvSpPr>
+        <p:spPr/>
+        <p:txBody>
+          <a:bodyPr/>
+          <a:lstStyle/>
+          <a:p>
+            <a:r>
+              <a:rPr lang="en-US" dirty="0"/>
+              <a:t>Time-varying covariates</a:t>
+            </a:r>
+          </a:p>
+        </p:txBody>
+      </p:sp>
+      <p:sp>
+        <p:nvSpPr>
+          <p:cNvPr id="3" name="Text Placeholder 2"/>
+          <p:cNvSpPr>
+            <a:spLocks noGrp="1"/>
+          </p:cNvSpPr>
+          <p:nvPr>
+            <p:ph type="body" idx="1"/>
+          </p:nvPr>
+        </p:nvSpPr>
+        <p:spPr/>
+        <p:txBody>
+          <a:bodyPr/>
+          <a:lstStyle/>
+          <a:p>
+            <a:r>
+              <a:rPr lang="en-US" sz="1800" dirty="0">
+                <a:latin typeface="Courier New" panose="02070309020205020404" pitchFamily="49" charset="0"/>
+                <a:cs typeface="Courier New" panose="02070309020205020404" pitchFamily="49" charset="0"/>
+              </a:rPr>
+              <a:t>  </a:t>
+            </a:r>
+            <a:r>
+              <a:rPr lang="en-US" sz="1800" dirty="0" err="1">
+                <a:latin typeface="Courier New" panose="02070309020205020404" pitchFamily="49" charset="0"/>
+                <a:cs typeface="Courier New" panose="02070309020205020404" pitchFamily="49" charset="0"/>
+              </a:rPr>
+              <a:t>beta_clinic</a:t>
+            </a:r>
+            <a:r>
+              <a:rPr lang="en-US" sz="1800" dirty="0">
+                <a:latin typeface="Courier New" panose="02070309020205020404" pitchFamily="49" charset="0"/>
+                <a:cs typeface="Courier New" panose="02070309020205020404" pitchFamily="49" charset="0"/>
+              </a:rPr>
+              <a:t> </a:t>
+            </a:r>
+            <a:r>
+              <a:rPr lang="en-US" sz="1800" dirty="0" err="1">
+                <a:latin typeface="Courier New" panose="02070309020205020404" pitchFamily="49" charset="0"/>
+                <a:cs typeface="Courier New" panose="02070309020205020404" pitchFamily="49" charset="0"/>
+              </a:rPr>
+              <a:t>beta_interaction</a:t>
+            </a:r>
+            <a:r>
+              <a:rPr lang="en-US" sz="1800" dirty="0">
+                <a:latin typeface="Courier New" panose="02070309020205020404" pitchFamily="49" charset="0"/>
+                <a:cs typeface="Courier New" panose="02070309020205020404" pitchFamily="49" charset="0"/>
+              </a:rPr>
+              <a:t>   t </a:t>
+            </a:r>
+            <a:r>
+              <a:rPr lang="en-US" sz="1800" dirty="0" err="1">
+                <a:latin typeface="Courier New" panose="02070309020205020404" pitchFamily="49" charset="0"/>
+                <a:cs typeface="Courier New" panose="02070309020205020404" pitchFamily="49" charset="0"/>
+              </a:rPr>
+              <a:t>log_hr</a:t>
+            </a:r>
+            <a:r>
+              <a:rPr lang="en-US" sz="1800" dirty="0">
+                <a:latin typeface="Courier New" panose="02070309020205020404" pitchFamily="49" charset="0"/>
+                <a:cs typeface="Courier New" panose="02070309020205020404" pitchFamily="49" charset="0"/>
+              </a:rPr>
+              <a:t>    </a:t>
+            </a:r>
+            <a:r>
+              <a:rPr lang="en-US" sz="1800" dirty="0" err="1">
+                <a:latin typeface="Courier New" panose="02070309020205020404" pitchFamily="49" charset="0"/>
+                <a:cs typeface="Courier New" panose="02070309020205020404" pitchFamily="49" charset="0"/>
+              </a:rPr>
+              <a:t>hr</a:t>
+            </a:r>
+            <a:endParaRPr lang="en-US" sz="1800" dirty="0">
+              <a:latin typeface="Courier New" panose="02070309020205020404" pitchFamily="49" charset="0"/>
+              <a:cs typeface="Courier New" panose="02070309020205020404" pitchFamily="49" charset="0"/>
+            </a:endParaRPr>
+          </a:p>
+          <a:p>
+            <a:r>
+              <a:rPr lang="en-US" sz="1800" dirty="0">
+                <a:latin typeface="Courier New" panose="02070309020205020404" pitchFamily="49" charset="0"/>
+                <a:cs typeface="Courier New" panose="02070309020205020404" pitchFamily="49" charset="0"/>
+              </a:rPr>
+              <a:t>1       0.019           -1.103 0.0  0.019 1.020</a:t>
+            </a:r>
+          </a:p>
+          <a:p>
+            <a:r>
+              <a:rPr lang="en-US" sz="1800" dirty="0">
+                <a:latin typeface="Courier New" panose="02070309020205020404" pitchFamily="49" charset="0"/>
+                <a:cs typeface="Courier New" panose="02070309020205020404" pitchFamily="49" charset="0"/>
+              </a:rPr>
+              <a:t>2       0.019           -1.103 0.5 -0.532 0.587</a:t>
+            </a:r>
+          </a:p>
+          <a:p>
+            <a:r>
+              <a:rPr lang="en-US" sz="1800" dirty="0">
+                <a:latin typeface="Courier New" panose="02070309020205020404" pitchFamily="49" charset="0"/>
+                <a:cs typeface="Courier New" panose="02070309020205020404" pitchFamily="49" charset="0"/>
+              </a:rPr>
+              <a:t>3       0.019           -1.103 1.0 -1.084 0.338</a:t>
+            </a:r>
+          </a:p>
+          <a:p>
+            <a:r>
+              <a:rPr lang="en-US" sz="1800" dirty="0">
+                <a:latin typeface="Courier New" panose="02070309020205020404" pitchFamily="49" charset="0"/>
+                <a:cs typeface="Courier New" panose="02070309020205020404" pitchFamily="49" charset="0"/>
+              </a:rPr>
+              <a:t>4       0.019           -1.103 1.5 -1.636 0.195</a:t>
+            </a:r>
+          </a:p>
+          <a:p>
+            <a:r>
+              <a:rPr lang="en-US" sz="1800" dirty="0">
+                <a:latin typeface="Courier New" panose="02070309020205020404" pitchFamily="49" charset="0"/>
+                <a:cs typeface="Courier New" panose="02070309020205020404" pitchFamily="49" charset="0"/>
+              </a:rPr>
+              <a:t>5       0.019           -1.103 2.0 -2.187 0.112</a:t>
+            </a:r>
+          </a:p>
+          <a:p>
+            <a:r>
+              <a:rPr lang="en-US" sz="1800" dirty="0">
+                <a:latin typeface="Courier New" panose="02070309020205020404" pitchFamily="49" charset="0"/>
+                <a:cs typeface="Courier New" panose="02070309020205020404" pitchFamily="49" charset="0"/>
+              </a:rPr>
+              <a:t>6       0.019           -1.103 2.5 -2.739 0.065</a:t>
+            </a:r>
+          </a:p>
+        </p:txBody>
+      </p:sp>
+      <p:sp>
+        <p:nvSpPr>
+          <p:cNvPr id="4" name="Footer Placeholder 3"/>
+          <p:cNvSpPr>
+            <a:spLocks noGrp="1"/>
+          </p:cNvSpPr>
+          <p:nvPr>
+            <p:ph type="ftr" sz="quarter" idx="10"/>
+          </p:nvPr>
+        </p:nvSpPr>
+        <p:spPr/>
+        <p:txBody>
+          <a:bodyPr/>
+          <a:lstStyle/>
+          <a:p>
+            <a:pPr>
+              <a:defRPr/>
+            </a:pPr>
+            <a:r>
+              <a:rPr lang="en-US" altLang="en-US" dirty="0"/>
+              <a:t>©2018 Steve Simon    http://TheAnalysisFactor.com</a:t>
+            </a:r>
+          </a:p>
+        </p:txBody>
+      </p:sp>
+      <p:sp>
+        <p:nvSpPr>
+          <p:cNvPr id="5" name="Slide Number Placeholder 4"/>
+          <p:cNvSpPr>
+            <a:spLocks noGrp="1"/>
+          </p:cNvSpPr>
+          <p:nvPr>
+            <p:ph type="sldNum" sz="quarter" idx="11"/>
+          </p:nvPr>
+        </p:nvSpPr>
+        <p:spPr/>
+        <p:txBody>
+          <a:bodyPr/>
+          <a:lstStyle/>
+          <a:p>
+            <a:pPr>
+              <a:defRPr/>
+            </a:pPr>
+            <a:endParaRPr lang="en-US"/>
+          </a:p>
+          <a:p>
+            <a:pPr>
+              <a:defRPr/>
+            </a:pPr>
+            <a:fld id="{E9A8CBA3-AA2B-46A6-BFA3-DCEBEAAB3F0A}" type="slidenum">
+              <a:rPr lang="en-US" smtClean="0"/>
+              <a:pPr>
+                <a:defRPr/>
+              </a:pPr>
+              <a:t>30</a:t>
+            </a:fld>
+            <a:endParaRPr lang="en-US"/>
+          </a:p>
+        </p:txBody>
+      </p:sp>
+      <p:sp>
+        <p:nvSpPr>
+          <p:cNvPr id="6" name="Text Placeholder 5"/>
+          <p:cNvSpPr>
+            <a:spLocks noGrp="1"/>
+          </p:cNvSpPr>
+          <p:nvPr>
+            <p:ph type="body" sz="quarter" idx="12"/>
+          </p:nvPr>
+        </p:nvSpPr>
+        <p:spPr/>
+        <p:txBody>
+          <a:bodyPr/>
+          <a:lstStyle/>
+          <a:p>
+            <a:r>
+              <a:rPr lang="en-US" dirty="0"/>
+              <a:t>Interaction with time, heroin dataset</a:t>
+            </a:r>
+          </a:p>
+        </p:txBody>
+      </p:sp>
+    </p:spTree>
+    <p:extLst>
+      <p:ext uri="{BB962C8B-B14F-4D97-AF65-F5344CB8AC3E}">
+        <p14:creationId xmlns:p14="http://schemas.microsoft.com/office/powerpoint/2010/main" val="2222040552"/>
+      </p:ext>
+    </p:extLst>
+  </p:cSld>
+  <p:clrMapOvr>
+    <a:masterClrMapping/>
+  </p:clrMapOvr>
+</p:sld>
+</file>
+
+<file path=ppt/slides/slide31.xml><?xml version="1.0" encoding="utf-8"?>
+<p:sld xmlns:a="http://schemas.openxmlformats.org/drawingml/2006/main" xmlns:r="http://schemas.openxmlformats.org/officeDocument/2006/relationships" xmlns:p="http://schemas.openxmlformats.org/presentationml/2006/main">
+  <p:cSld>
+    <p:spTree>
+      <p:nvGrpSpPr>
+        <p:cNvPr id="1" name=""/>
+        <p:cNvGrpSpPr/>
+        <p:nvPr/>
+      </p:nvGrpSpPr>
+      <p:grpSpPr>
+        <a:xfrm>
+          <a:off x="0" y="0"/>
+          <a:ext cx="0" cy="0"/>
+          <a:chOff x="0" y="0"/>
+          <a:chExt cx="0" cy="0"/>
+        </a:xfrm>
+      </p:grpSpPr>
+      <p:sp>
+        <p:nvSpPr>
+          <p:cNvPr id="2" name="Title 1"/>
+          <p:cNvSpPr>
+            <a:spLocks noGrp="1"/>
+          </p:cNvSpPr>
+          <p:nvPr>
+            <p:ph type="title"/>
+          </p:nvPr>
+        </p:nvSpPr>
+        <p:spPr/>
+        <p:txBody>
+          <a:bodyPr/>
+          <a:lstStyle/>
+          <a:p>
+            <a:r>
+              <a:rPr lang="en-US" dirty="0"/>
+              <a:t>Time-varying covariates</a:t>
+            </a:r>
+          </a:p>
+        </p:txBody>
+      </p:sp>
+      <p:sp>
+        <p:nvSpPr>
+          <p:cNvPr id="5" name="Slide Number Placeholder 4"/>
+          <p:cNvSpPr>
+            <a:spLocks noGrp="1"/>
+          </p:cNvSpPr>
+          <p:nvPr>
+            <p:ph type="sldNum" sz="quarter" idx="11"/>
+          </p:nvPr>
+        </p:nvSpPr>
+        <p:spPr/>
+        <p:txBody>
+          <a:bodyPr/>
+          <a:lstStyle/>
+          <a:p>
+            <a:pPr>
+              <a:defRPr/>
+            </a:pPr>
+            <a:endParaRPr lang="en-US"/>
+          </a:p>
+          <a:p>
+            <a:pPr>
+              <a:defRPr/>
+            </a:pPr>
+            <a:fld id="{E9A8CBA3-AA2B-46A6-BFA3-DCEBEAAB3F0A}" type="slidenum">
+              <a:rPr lang="en-US" smtClean="0"/>
+              <a:pPr>
+                <a:defRPr/>
+              </a:pPr>
+              <a:t>31</a:t>
+            </a:fld>
+            <a:endParaRPr lang="en-US"/>
+          </a:p>
+        </p:txBody>
+      </p:sp>
+      <p:pic>
+        <p:nvPicPr>
+          <p:cNvPr id="4" name="Picture 3">
+            <a:extLst>
+              <a:ext uri="{FF2B5EF4-FFF2-40B4-BE49-F238E27FC236}">
+                <a16:creationId xmlns:a16="http://schemas.microsoft.com/office/drawing/2014/main" id="{8789CD76-B159-40A0-9790-D7307574D59F}"/>
+              </a:ext>
+            </a:extLst>
+          </p:cNvPr>
+          <p:cNvPicPr>
+            <a:picLocks noChangeAspect="1"/>
+          </p:cNvPicPr>
+          <p:nvPr/>
+        </p:nvPicPr>
+        <p:blipFill>
+          <a:blip r:embed="rId2"/>
+          <a:stretch>
+            <a:fillRect/>
+          </a:stretch>
+        </p:blipFill>
+        <p:spPr>
+          <a:xfrm>
+            <a:off x="457714" y="1143285"/>
+            <a:ext cx="8228571" cy="4571429"/>
+          </a:xfrm>
+          <a:prstGeom prst="rect">
+            <a:avLst/>
+          </a:prstGeom>
+        </p:spPr>
+      </p:pic>
+    </p:spTree>
+    <p:extLst>
+      <p:ext uri="{BB962C8B-B14F-4D97-AF65-F5344CB8AC3E}">
+        <p14:creationId xmlns:p14="http://schemas.microsoft.com/office/powerpoint/2010/main" val="1113131820"/>
+      </p:ext>
+    </p:extLst>
+  </p:cSld>
+  <p:clrMapOvr>
+    <a:masterClrMapping/>
+  </p:clrMapOvr>
+</p:sld>
+</file>
+
+<file path=ppt/slides/slide32.xml><?xml version="1.0" encoding="utf-8"?>
+<p:sld xmlns:a="http://schemas.openxmlformats.org/drawingml/2006/main" xmlns:r="http://schemas.openxmlformats.org/officeDocument/2006/relationships" xmlns:p="http://schemas.openxmlformats.org/presentationml/2006/main">
+  <p:cSld>
+    <p:spTree>
+      <p:nvGrpSpPr>
+        <p:cNvPr id="1" name=""/>
+        <p:cNvGrpSpPr/>
+        <p:nvPr/>
+      </p:nvGrpSpPr>
+      <p:grpSpPr>
+        <a:xfrm>
+          <a:off x="0" y="0"/>
+          <a:ext cx="0" cy="0"/>
+          <a:chOff x="0" y="0"/>
+          <a:chExt cx="0" cy="0"/>
+        </a:xfrm>
+      </p:grpSpPr>
+      <p:sp>
+        <p:nvSpPr>
+          <p:cNvPr id="2" name="Title 1"/>
+          <p:cNvSpPr>
+            <a:spLocks noGrp="1"/>
+          </p:cNvSpPr>
+          <p:nvPr>
+            <p:ph type="title"/>
+          </p:nvPr>
+        </p:nvSpPr>
+        <p:spPr/>
+        <p:txBody>
+          <a:bodyPr/>
+          <a:lstStyle/>
+          <a:p>
+            <a:r>
+              <a:rPr lang="en-US" dirty="0"/>
+              <a:t>Stanford transplant data</a:t>
+            </a:r>
+          </a:p>
+        </p:txBody>
+      </p:sp>
+      <p:sp>
+        <p:nvSpPr>
+          <p:cNvPr id="5" name="Slide Number Placeholder 4"/>
+          <p:cNvSpPr>
+            <a:spLocks noGrp="1"/>
+          </p:cNvSpPr>
+          <p:nvPr>
+            <p:ph type="sldNum" sz="quarter" idx="11"/>
+          </p:nvPr>
+        </p:nvSpPr>
+        <p:spPr/>
+        <p:txBody>
+          <a:bodyPr/>
+          <a:lstStyle/>
+          <a:p>
+            <a:pPr>
+              <a:defRPr/>
+            </a:pPr>
+            <a:endParaRPr lang="en-US"/>
+          </a:p>
+          <a:p>
+            <a:pPr>
+              <a:defRPr/>
+            </a:pPr>
+            <a:fld id="{E9A8CBA3-AA2B-46A6-BFA3-DCEBEAAB3F0A}" type="slidenum">
+              <a:rPr lang="en-US" smtClean="0"/>
+              <a:pPr>
+                <a:defRPr/>
+              </a:pPr>
+              <a:t>32</a:t>
             </a:fld>
             <a:endParaRPr lang="en-US"/>
           </a:p>
@@ -6965,7 +8007,7 @@
     </p:spTree>
     <p:extLst>
       <p:ext uri="{BB962C8B-B14F-4D97-AF65-F5344CB8AC3E}">
-        <p14:creationId xmlns:p14="http://schemas.microsoft.com/office/powerpoint/2010/main" val="1113131820"/>
+        <p14:creationId xmlns:p14="http://schemas.microsoft.com/office/powerpoint/2010/main" val="1293506578"/>
       </p:ext>
     </p:extLst>
   </p:cSld>
@@ -6975,7 +8017,7 @@
 </p:sld>
 </file>
 
-<file path=ppt/slides/slide29.xml><?xml version="1.0" encoding="utf-8"?>
+<file path=ppt/slides/slide33.xml><?xml version="1.0" encoding="utf-8"?>
 <p:sld xmlns:a="http://schemas.openxmlformats.org/drawingml/2006/main" xmlns:r="http://schemas.openxmlformats.org/officeDocument/2006/relationships" xmlns:p="http://schemas.openxmlformats.org/presentationml/2006/main">
   <p:cSld>
     <p:spTree>
@@ -7043,7 +8085,7 @@
               <a:pPr>
                 <a:defRPr/>
               </a:pPr>
-              <a:t>29</a:t>
+              <a:t>33</a:t>
             </a:fld>
             <a:endParaRPr lang="en-US"/>
           </a:p>
@@ -7092,7 +8134,7 @@
 </p:sld>
 </file>
 
-<file path=ppt/slides/slide3.xml><?xml version="1.0" encoding="utf-8"?>
+<file path=ppt/slides/slide34.xml><?xml version="1.0" encoding="utf-8"?>
 <p:sld xmlns:a="http://schemas.openxmlformats.org/drawingml/2006/main" xmlns:r="http://schemas.openxmlformats.org/officeDocument/2006/relationships" xmlns:p="http://schemas.openxmlformats.org/presentationml/2006/main">
   <p:cSld>
     <p:spTree>
@@ -7126,105 +8168,7 @@
           <a:p>
             <a:r>
               <a:rPr lang="en-US" dirty="0"/>
-              <a:t>Testing the proportional hazards assumption</a:t>
-            </a:r>
-          </a:p>
-        </p:txBody>
-      </p:sp>
-      <p:sp>
-        <p:nvSpPr>
-          <p:cNvPr id="3" name="Text Placeholder 2"/>
-          <p:cNvSpPr>
-            <a:spLocks noGrp="1"/>
-          </p:cNvSpPr>
-          <p:nvPr>
-            <p:ph type="body" idx="1"/>
-          </p:nvPr>
-        </p:nvSpPr>
-        <p:spPr/>
-        <p:txBody>
-          <a:bodyPr/>
-          <a:lstStyle/>
-          <a:p>
-            <a:pPr marL="342900" indent="-342900">
-              <a:buFont typeface="+mj-lt"/>
-              <a:buAutoNum type="arabicPeriod"/>
-            </a:pPr>
-            <a:r>
-              <a:rPr lang="en-US" sz="1800" dirty="0"/>
-              <a:t>Patterns in Kaplan-Meier curves</a:t>
-            </a:r>
-          </a:p>
-          <a:p>
-            <a:pPr marL="342900" indent="-342900">
-              <a:buFont typeface="+mj-lt"/>
-              <a:buAutoNum type="arabicPeriod"/>
-            </a:pPr>
-            <a:r>
-              <a:rPr lang="en-US" sz="1800" dirty="0"/>
-              <a:t>Complementary log-log plot</a:t>
-            </a:r>
-          </a:p>
-          <a:p>
-            <a:pPr marL="342900" indent="-342900">
-              <a:buFont typeface="+mj-lt"/>
-              <a:buAutoNum type="arabicPeriod"/>
-            </a:pPr>
-            <a:r>
-              <a:rPr lang="en-US" sz="1800" dirty="0"/>
-              <a:t>Schoenfeld Residuals</a:t>
-            </a:r>
-          </a:p>
-          <a:p>
-            <a:pPr marL="342900" indent="-342900">
-              <a:buFont typeface="+mj-lt"/>
-              <a:buAutoNum type="arabicPeriod"/>
-            </a:pPr>
-            <a:r>
-              <a:rPr lang="en-US" sz="1800" dirty="0"/>
-              <a:t>Fit time varying covariates</a:t>
-            </a:r>
-          </a:p>
-          <a:p>
-            <a:pPr marL="342900" indent="-342900">
-              <a:buFont typeface="+mj-lt"/>
-              <a:buAutoNum type="arabicPeriod"/>
-            </a:pPr>
-            <a:endParaRPr lang="en-US" sz="1800" dirty="0"/>
-          </a:p>
-          <a:p>
-            <a:r>
-              <a:rPr lang="en-US" sz="1800" dirty="0"/>
-              <a:t>Save this for another day</a:t>
-            </a:r>
-            <a:endParaRPr lang="en-US" sz="1800" b="1" dirty="0">
-              <a:latin typeface="Courier New" panose="02070309020205020404" pitchFamily="49" charset="0"/>
-              <a:cs typeface="Courier New" panose="02070309020205020404" pitchFamily="49" charset="0"/>
-            </a:endParaRPr>
-          </a:p>
-        </p:txBody>
-      </p:sp>
-      <p:sp>
-        <p:nvSpPr>
-          <p:cNvPr id="4" name="Footer Placeholder 3"/>
-          <p:cNvSpPr>
-            <a:spLocks noGrp="1"/>
-          </p:cNvSpPr>
-          <p:nvPr>
-            <p:ph type="ftr" sz="quarter" idx="10"/>
-          </p:nvPr>
-        </p:nvSpPr>
-        <p:spPr/>
-        <p:txBody>
-          <a:bodyPr/>
-          <a:lstStyle/>
-          <a:p>
-            <a:pPr>
-              <a:defRPr/>
-            </a:pPr>
-            <a:r>
-              <a:rPr lang="en-US" altLang="en-US" dirty="0"/>
-              <a:t>©2018 Steve Simon    http://TheAnalysisFactor.com</a:t>
+              <a:t>Stanford transplant data, patients 21-30</a:t>
             </a:r>
           </a:p>
         </p:txBody>
@@ -7258,116 +8202,7 @@
               <a:pPr>
                 <a:defRPr/>
               </a:pPr>
-              <a:t>3</a:t>
-            </a:fld>
-            <a:endParaRPr lang="en-US"/>
-          </a:p>
-        </p:txBody>
-      </p:sp>
-      <p:sp>
-        <p:nvSpPr>
-          <p:cNvPr id="6" name="Text Placeholder 5"/>
-          <p:cNvSpPr>
-            <a:spLocks noGrp="1"/>
-          </p:cNvSpPr>
-          <p:nvPr>
-            <p:ph type="body" sz="quarter" idx="12"/>
-          </p:nvPr>
-        </p:nvSpPr>
-        <p:spPr/>
-        <p:txBody>
-          <a:bodyPr/>
-          <a:lstStyle/>
-          <a:p>
-            <a:r>
-              <a:rPr lang="en-US" dirty="0"/>
-              <a:t>Several approaches</a:t>
-            </a:r>
-          </a:p>
-        </p:txBody>
-      </p:sp>
-    </p:spTree>
-    <p:extLst>
-      <p:ext uri="{BB962C8B-B14F-4D97-AF65-F5344CB8AC3E}">
-        <p14:creationId xmlns:p14="http://schemas.microsoft.com/office/powerpoint/2010/main" val="2692073544"/>
-      </p:ext>
-    </p:extLst>
-  </p:cSld>
-  <p:clrMapOvr>
-    <a:masterClrMapping/>
-  </p:clrMapOvr>
-</p:sld>
-</file>
-
-<file path=ppt/slides/slide30.xml><?xml version="1.0" encoding="utf-8"?>
-<p:sld xmlns:a="http://schemas.openxmlformats.org/drawingml/2006/main" xmlns:r="http://schemas.openxmlformats.org/officeDocument/2006/relationships" xmlns:p="http://schemas.openxmlformats.org/presentationml/2006/main">
-  <p:cSld>
-    <p:spTree>
-      <p:nvGrpSpPr>
-        <p:cNvPr id="1" name=""/>
-        <p:cNvGrpSpPr/>
-        <p:nvPr/>
-      </p:nvGrpSpPr>
-      <p:grpSpPr>
-        <a:xfrm>
-          <a:off x="0" y="0"/>
-          <a:ext cx="0" cy="0"/>
-          <a:chOff x="0" y="0"/>
-          <a:chExt cx="0" cy="0"/>
-        </a:xfrm>
-      </p:grpSpPr>
-      <p:sp>
-        <p:nvSpPr>
-          <p:cNvPr id="2" name="Title 1"/>
-          <p:cNvSpPr>
-            <a:spLocks noGrp="1"/>
-          </p:cNvSpPr>
-          <p:nvPr>
-            <p:ph type="title"/>
-          </p:nvPr>
-        </p:nvSpPr>
-        <p:spPr/>
-        <p:txBody>
-          <a:bodyPr/>
-          <a:lstStyle/>
-          <a:p>
-            <a:r>
-              <a:rPr lang="en-US" dirty="0"/>
-              <a:t>Stanford transplant data, patients 21-30</a:t>
-            </a:r>
-          </a:p>
-        </p:txBody>
-      </p:sp>
-      <p:sp>
-        <p:nvSpPr>
-          <p:cNvPr id="5" name="Slide Number Placeholder 4"/>
-          <p:cNvSpPr>
-            <a:spLocks noGrp="1"/>
-          </p:cNvSpPr>
-          <p:nvPr>
-            <p:ph type="sldNum" sz="quarter" idx="11"/>
-          </p:nvPr>
-        </p:nvSpPr>
-        <p:spPr/>
-        <p:txBody>
-          <a:bodyPr/>
-          <a:lstStyle/>
-          <a:p>
-            <a:pPr>
-              <a:defRPr/>
-            </a:pPr>
-            <a:endParaRPr lang="en-US"/>
-          </a:p>
-          <a:p>
-            <a:pPr>
-              <a:defRPr/>
-            </a:pPr>
-            <a:fld id="{E9A8CBA3-AA2B-46A6-BFA3-DCEBEAAB3F0A}" type="slidenum">
-              <a:rPr lang="en-US" smtClean="0"/>
-              <a:pPr>
-                <a:defRPr/>
-              </a:pPr>
-              <a:t>30</a:t>
+              <a:t>34</a:t>
             </a:fld>
             <a:endParaRPr lang="en-US"/>
           </a:p>
@@ -7416,7 +8251,7 @@
 </p:sld>
 </file>
 
-<file path=ppt/slides/slide31.xml><?xml version="1.0" encoding="utf-8"?>
+<file path=ppt/slides/slide35.xml><?xml version="1.0" encoding="utf-8"?>
 <p:sld xmlns:a="http://schemas.openxmlformats.org/drawingml/2006/main" xmlns:r="http://schemas.openxmlformats.org/officeDocument/2006/relationships" xmlns:p="http://schemas.openxmlformats.org/presentationml/2006/main">
   <p:cSld>
     <p:spTree>
@@ -7484,7 +8319,7 @@
               <a:pPr>
                 <a:defRPr/>
               </a:pPr>
-              <a:t>31</a:t>
+              <a:t>35</a:t>
             </a:fld>
             <a:endParaRPr lang="en-US"/>
           </a:p>
@@ -7533,1139 +8368,6 @@
 </p:sld>
 </file>
 
-<file path=ppt/slides/slide32.xml><?xml version="1.0" encoding="utf-8"?>
-<p:sld xmlns:a="http://schemas.openxmlformats.org/drawingml/2006/main" xmlns:r="http://schemas.openxmlformats.org/officeDocument/2006/relationships" xmlns:p="http://schemas.openxmlformats.org/presentationml/2006/main">
-  <p:cSld>
-    <p:spTree>
-      <p:nvGrpSpPr>
-        <p:cNvPr id="1" name=""/>
-        <p:cNvGrpSpPr/>
-        <p:nvPr/>
-      </p:nvGrpSpPr>
-      <p:grpSpPr>
-        <a:xfrm>
-          <a:off x="0" y="0"/>
-          <a:ext cx="0" cy="0"/>
-          <a:chOff x="0" y="0"/>
-          <a:chExt cx="0" cy="0"/>
-        </a:xfrm>
-      </p:grpSpPr>
-      <p:sp>
-        <p:nvSpPr>
-          <p:cNvPr id="2" name="Title 1"/>
-          <p:cNvSpPr>
-            <a:spLocks noGrp="1"/>
-          </p:cNvSpPr>
-          <p:nvPr>
-            <p:ph type="title"/>
-          </p:nvPr>
-        </p:nvSpPr>
-        <p:spPr/>
-        <p:txBody>
-          <a:bodyPr/>
-          <a:lstStyle/>
-          <a:p>
-            <a:r>
-              <a:rPr lang="en-US" dirty="0"/>
-              <a:t>Stanford transplant data</a:t>
-            </a:r>
-          </a:p>
-        </p:txBody>
-      </p:sp>
-      <p:sp>
-        <p:nvSpPr>
-          <p:cNvPr id="3" name="Text Placeholder 2"/>
-          <p:cNvSpPr>
-            <a:spLocks noGrp="1"/>
-          </p:cNvSpPr>
-          <p:nvPr>
-            <p:ph type="body" idx="1"/>
-          </p:nvPr>
-        </p:nvSpPr>
-        <p:spPr/>
-        <p:txBody>
-          <a:bodyPr/>
-          <a:lstStyle/>
-          <a:p>
-            <a:r>
-              <a:rPr lang="en-US" sz="1800" dirty="0">
-                <a:latin typeface="Courier New" panose="02070309020205020404" pitchFamily="49" charset="0"/>
-                <a:cs typeface="Courier New" panose="02070309020205020404" pitchFamily="49" charset="0"/>
-              </a:rPr>
-              <a:t>id  </a:t>
-            </a:r>
-            <a:r>
-              <a:rPr lang="en-US" sz="1800" dirty="0" err="1">
-                <a:latin typeface="Courier New" panose="02070309020205020404" pitchFamily="49" charset="0"/>
-                <a:cs typeface="Courier New" panose="02070309020205020404" pitchFamily="49" charset="0"/>
-              </a:rPr>
-              <a:t>accept.dt</a:t>
-            </a:r>
-            <a:r>
-              <a:rPr lang="en-US" sz="1800" dirty="0">
-                <a:latin typeface="Courier New" panose="02070309020205020404" pitchFamily="49" charset="0"/>
-                <a:cs typeface="Courier New" panose="02070309020205020404" pitchFamily="49" charset="0"/>
-              </a:rPr>
-              <a:t>    </a:t>
-            </a:r>
-            <a:r>
-              <a:rPr lang="en-US" sz="1800" dirty="0" err="1">
-                <a:latin typeface="Courier New" panose="02070309020205020404" pitchFamily="49" charset="0"/>
-                <a:cs typeface="Courier New" panose="02070309020205020404" pitchFamily="49" charset="0"/>
-              </a:rPr>
-              <a:t>tx.date</a:t>
-            </a:r>
-            <a:r>
-              <a:rPr lang="en-US" sz="1800" dirty="0">
-                <a:latin typeface="Courier New" panose="02070309020205020404" pitchFamily="49" charset="0"/>
-                <a:cs typeface="Courier New" panose="02070309020205020404" pitchFamily="49" charset="0"/>
-              </a:rPr>
-              <a:t>    </a:t>
-            </a:r>
-            <a:r>
-              <a:rPr lang="en-US" sz="1800" dirty="0" err="1">
-                <a:latin typeface="Courier New" panose="02070309020205020404" pitchFamily="49" charset="0"/>
-                <a:cs typeface="Courier New" panose="02070309020205020404" pitchFamily="49" charset="0"/>
-              </a:rPr>
-              <a:t>fu.date</a:t>
-            </a:r>
-            <a:r>
-              <a:rPr lang="en-US" sz="1800" dirty="0">
-                <a:latin typeface="Courier New" panose="02070309020205020404" pitchFamily="49" charset="0"/>
-                <a:cs typeface="Courier New" panose="02070309020205020404" pitchFamily="49" charset="0"/>
-              </a:rPr>
-              <a:t> </a:t>
-            </a:r>
-            <a:r>
-              <a:rPr lang="en-US" sz="1800" dirty="0" err="1">
-                <a:latin typeface="Courier New" panose="02070309020205020404" pitchFamily="49" charset="0"/>
-                <a:cs typeface="Courier New" panose="02070309020205020404" pitchFamily="49" charset="0"/>
-              </a:rPr>
-              <a:t>fustat</a:t>
-            </a:r>
-            <a:r>
-              <a:rPr lang="en-US" sz="1800" dirty="0">
-                <a:latin typeface="Courier New" panose="02070309020205020404" pitchFamily="49" charset="0"/>
-                <a:cs typeface="Courier New" panose="02070309020205020404" pitchFamily="49" charset="0"/>
-              </a:rPr>
-              <a:t> transplant</a:t>
-            </a:r>
-          </a:p>
-          <a:p>
-            <a:r>
-              <a:rPr lang="en-US" sz="1800" dirty="0">
-                <a:latin typeface="Courier New" panose="02070309020205020404" pitchFamily="49" charset="0"/>
-                <a:cs typeface="Courier New" panose="02070309020205020404" pitchFamily="49" charset="0"/>
-              </a:rPr>
-              <a:t>21 1969-02-01 1969-02-08 1971-11-29      1          1</a:t>
-            </a:r>
-          </a:p>
-          <a:p>
-            <a:endParaRPr lang="en-US" sz="1800" dirty="0">
-              <a:latin typeface="Courier New" panose="02070309020205020404" pitchFamily="49" charset="0"/>
-              <a:cs typeface="Courier New" panose="02070309020205020404" pitchFamily="49" charset="0"/>
-            </a:endParaRPr>
-          </a:p>
-          <a:p>
-            <a:r>
-              <a:rPr lang="en-US" sz="1800" dirty="0">
-                <a:latin typeface="Courier New" panose="02070309020205020404" pitchFamily="49" charset="0"/>
-                <a:cs typeface="Courier New" panose="02070309020205020404" pitchFamily="49" charset="0"/>
-              </a:rPr>
-              <a:t>id   time1     time2 event transplant</a:t>
-            </a:r>
-          </a:p>
-          <a:p>
-            <a:r>
-              <a:rPr lang="en-US" sz="1800" dirty="0">
-                <a:latin typeface="Courier New" panose="02070309020205020404" pitchFamily="49" charset="0"/>
-                <a:cs typeface="Courier New" panose="02070309020205020404" pitchFamily="49" charset="0"/>
-              </a:rPr>
-              <a:t>21  7 days 1031 days     D          1</a:t>
-            </a:r>
-          </a:p>
-          <a:p>
-            <a:endParaRPr lang="en-US" sz="1800" dirty="0">
-              <a:latin typeface="Courier New" panose="02070309020205020404" pitchFamily="49" charset="0"/>
-              <a:cs typeface="Courier New" panose="02070309020205020404" pitchFamily="49" charset="0"/>
-            </a:endParaRPr>
-          </a:p>
-          <a:p>
-            <a:r>
-              <a:rPr lang="en-US" sz="1800" dirty="0">
-                <a:latin typeface="Courier New" panose="02070309020205020404" pitchFamily="49" charset="0"/>
-                <a:cs typeface="Courier New" panose="02070309020205020404" pitchFamily="49" charset="0"/>
-              </a:rPr>
-              <a:t>id start stop event transplant</a:t>
-            </a:r>
-          </a:p>
-          <a:p>
-            <a:r>
-              <a:rPr lang="en-US" sz="1800" dirty="0">
-                <a:latin typeface="Courier New" panose="02070309020205020404" pitchFamily="49" charset="0"/>
-                <a:cs typeface="Courier New" panose="02070309020205020404" pitchFamily="49" charset="0"/>
-              </a:rPr>
-              <a:t>21     0    7     0          0</a:t>
-            </a:r>
-          </a:p>
-          <a:p>
-            <a:r>
-              <a:rPr lang="en-US" sz="1800" dirty="0">
-                <a:latin typeface="Courier New" panose="02070309020205020404" pitchFamily="49" charset="0"/>
-                <a:cs typeface="Courier New" panose="02070309020205020404" pitchFamily="49" charset="0"/>
-              </a:rPr>
-              <a:t>21     7 1031     1          1</a:t>
-            </a:r>
-          </a:p>
-          <a:p>
-            <a:pPr marL="342900" indent="-342900">
-              <a:buAutoNum type="arabicPlain" startAt="21"/>
-            </a:pPr>
-            <a:endParaRPr lang="en-US" sz="1800" dirty="0">
-              <a:latin typeface="Courier New" panose="02070309020205020404" pitchFamily="49" charset="0"/>
-              <a:cs typeface="Courier New" panose="02070309020205020404" pitchFamily="49" charset="0"/>
-            </a:endParaRPr>
-          </a:p>
-        </p:txBody>
-      </p:sp>
-      <p:sp>
-        <p:nvSpPr>
-          <p:cNvPr id="4" name="Footer Placeholder 3"/>
-          <p:cNvSpPr>
-            <a:spLocks noGrp="1"/>
-          </p:cNvSpPr>
-          <p:nvPr>
-            <p:ph type="ftr" sz="quarter" idx="10"/>
-          </p:nvPr>
-        </p:nvSpPr>
-        <p:spPr/>
-        <p:txBody>
-          <a:bodyPr/>
-          <a:lstStyle/>
-          <a:p>
-            <a:pPr>
-              <a:defRPr/>
-            </a:pPr>
-            <a:r>
-              <a:rPr lang="en-US" altLang="en-US" dirty="0"/>
-              <a:t>©2018 Steve Simon    http://TheAnalysisFactor.com</a:t>
-            </a:r>
-          </a:p>
-        </p:txBody>
-      </p:sp>
-      <p:sp>
-        <p:nvSpPr>
-          <p:cNvPr id="5" name="Slide Number Placeholder 4"/>
-          <p:cNvSpPr>
-            <a:spLocks noGrp="1"/>
-          </p:cNvSpPr>
-          <p:nvPr>
-            <p:ph type="sldNum" sz="quarter" idx="11"/>
-          </p:nvPr>
-        </p:nvSpPr>
-        <p:spPr/>
-        <p:txBody>
-          <a:bodyPr/>
-          <a:lstStyle/>
-          <a:p>
-            <a:pPr>
-              <a:defRPr/>
-            </a:pPr>
-            <a:endParaRPr lang="en-US"/>
-          </a:p>
-          <a:p>
-            <a:pPr>
-              <a:defRPr/>
-            </a:pPr>
-            <a:fld id="{E9A8CBA3-AA2B-46A6-BFA3-DCEBEAAB3F0A}" type="slidenum">
-              <a:rPr lang="en-US" smtClean="0"/>
-              <a:pPr>
-                <a:defRPr/>
-              </a:pPr>
-              <a:t>32</a:t>
-            </a:fld>
-            <a:endParaRPr lang="en-US"/>
-          </a:p>
-        </p:txBody>
-      </p:sp>
-      <p:sp>
-        <p:nvSpPr>
-          <p:cNvPr id="6" name="Text Placeholder 5"/>
-          <p:cNvSpPr>
-            <a:spLocks noGrp="1"/>
-          </p:cNvSpPr>
-          <p:nvPr>
-            <p:ph type="body" sz="quarter" idx="12"/>
-          </p:nvPr>
-        </p:nvSpPr>
-        <p:spPr/>
-        <p:txBody>
-          <a:bodyPr/>
-          <a:lstStyle/>
-          <a:p>
-            <a:r>
-              <a:rPr lang="en-US" dirty="0"/>
-              <a:t>Patient #21</a:t>
-            </a:r>
-          </a:p>
-        </p:txBody>
-      </p:sp>
-    </p:spTree>
-    <p:extLst>
-      <p:ext uri="{BB962C8B-B14F-4D97-AF65-F5344CB8AC3E}">
-        <p14:creationId xmlns:p14="http://schemas.microsoft.com/office/powerpoint/2010/main" val="2830790376"/>
-      </p:ext>
-    </p:extLst>
-  </p:cSld>
-  <p:clrMapOvr>
-    <a:masterClrMapping/>
-  </p:clrMapOvr>
-</p:sld>
-</file>
-
-<file path=ppt/slides/slide33.xml><?xml version="1.0" encoding="utf-8"?>
-<p:sld xmlns:a="http://schemas.openxmlformats.org/drawingml/2006/main" xmlns:r="http://schemas.openxmlformats.org/officeDocument/2006/relationships" xmlns:p="http://schemas.openxmlformats.org/presentationml/2006/main">
-  <p:cSld>
-    <p:spTree>
-      <p:nvGrpSpPr>
-        <p:cNvPr id="1" name=""/>
-        <p:cNvGrpSpPr/>
-        <p:nvPr/>
-      </p:nvGrpSpPr>
-      <p:grpSpPr>
-        <a:xfrm>
-          <a:off x="0" y="0"/>
-          <a:ext cx="0" cy="0"/>
-          <a:chOff x="0" y="0"/>
-          <a:chExt cx="0" cy="0"/>
-        </a:xfrm>
-      </p:grpSpPr>
-      <p:sp>
-        <p:nvSpPr>
-          <p:cNvPr id="2" name="Title 1"/>
-          <p:cNvSpPr>
-            <a:spLocks noGrp="1"/>
-          </p:cNvSpPr>
-          <p:nvPr>
-            <p:ph type="title"/>
-          </p:nvPr>
-        </p:nvSpPr>
-        <p:spPr/>
-        <p:txBody>
-          <a:bodyPr/>
-          <a:lstStyle/>
-          <a:p>
-            <a:r>
-              <a:rPr lang="en-US" dirty="0"/>
-              <a:t>Stanford transplant data</a:t>
-            </a:r>
-          </a:p>
-        </p:txBody>
-      </p:sp>
-      <p:sp>
-        <p:nvSpPr>
-          <p:cNvPr id="3" name="Text Placeholder 2"/>
-          <p:cNvSpPr>
-            <a:spLocks noGrp="1"/>
-          </p:cNvSpPr>
-          <p:nvPr>
-            <p:ph type="body" idx="1"/>
-          </p:nvPr>
-        </p:nvSpPr>
-        <p:spPr/>
-        <p:txBody>
-          <a:bodyPr/>
-          <a:lstStyle/>
-          <a:p>
-            <a:r>
-              <a:rPr lang="en-US" sz="1800" dirty="0">
-                <a:latin typeface="Courier New" panose="02070309020205020404" pitchFamily="49" charset="0"/>
-                <a:cs typeface="Courier New" panose="02070309020205020404" pitchFamily="49" charset="0"/>
-              </a:rPr>
-              <a:t>id  </a:t>
-            </a:r>
-            <a:r>
-              <a:rPr lang="en-US" sz="1800" dirty="0" err="1">
-                <a:latin typeface="Courier New" panose="02070309020205020404" pitchFamily="49" charset="0"/>
-                <a:cs typeface="Courier New" panose="02070309020205020404" pitchFamily="49" charset="0"/>
-              </a:rPr>
-              <a:t>accept.dt</a:t>
-            </a:r>
-            <a:r>
-              <a:rPr lang="en-US" sz="1800" dirty="0">
-                <a:latin typeface="Courier New" panose="02070309020205020404" pitchFamily="49" charset="0"/>
-                <a:cs typeface="Courier New" panose="02070309020205020404" pitchFamily="49" charset="0"/>
-              </a:rPr>
-              <a:t>    </a:t>
-            </a:r>
-            <a:r>
-              <a:rPr lang="en-US" sz="1800" dirty="0" err="1">
-                <a:latin typeface="Courier New" panose="02070309020205020404" pitchFamily="49" charset="0"/>
-                <a:cs typeface="Courier New" panose="02070309020205020404" pitchFamily="49" charset="0"/>
-              </a:rPr>
-              <a:t>tx.date</a:t>
-            </a:r>
-            <a:r>
-              <a:rPr lang="en-US" sz="1800" dirty="0">
-                <a:latin typeface="Courier New" panose="02070309020205020404" pitchFamily="49" charset="0"/>
-                <a:cs typeface="Courier New" panose="02070309020205020404" pitchFamily="49" charset="0"/>
-              </a:rPr>
-              <a:t>    </a:t>
-            </a:r>
-            <a:r>
-              <a:rPr lang="en-US" sz="1800" dirty="0" err="1">
-                <a:latin typeface="Courier New" panose="02070309020205020404" pitchFamily="49" charset="0"/>
-                <a:cs typeface="Courier New" panose="02070309020205020404" pitchFamily="49" charset="0"/>
-              </a:rPr>
-              <a:t>fu.date</a:t>
-            </a:r>
-            <a:r>
-              <a:rPr lang="en-US" sz="1800" dirty="0">
-                <a:latin typeface="Courier New" panose="02070309020205020404" pitchFamily="49" charset="0"/>
-                <a:cs typeface="Courier New" panose="02070309020205020404" pitchFamily="49" charset="0"/>
-              </a:rPr>
-              <a:t> </a:t>
-            </a:r>
-            <a:r>
-              <a:rPr lang="en-US" sz="1800" dirty="0" err="1">
-                <a:latin typeface="Courier New" panose="02070309020205020404" pitchFamily="49" charset="0"/>
-                <a:cs typeface="Courier New" panose="02070309020205020404" pitchFamily="49" charset="0"/>
-              </a:rPr>
-              <a:t>fustat</a:t>
-            </a:r>
-            <a:r>
-              <a:rPr lang="en-US" sz="1800" dirty="0">
-                <a:latin typeface="Courier New" panose="02070309020205020404" pitchFamily="49" charset="0"/>
-                <a:cs typeface="Courier New" panose="02070309020205020404" pitchFamily="49" charset="0"/>
-              </a:rPr>
-              <a:t> transplant</a:t>
-            </a:r>
-          </a:p>
-          <a:p>
-            <a:r>
-              <a:rPr lang="en-US" sz="1800" dirty="0">
-                <a:latin typeface="Courier New" panose="02070309020205020404" pitchFamily="49" charset="0"/>
-                <a:cs typeface="Courier New" panose="02070309020205020404" pitchFamily="49" charset="0"/>
-              </a:rPr>
-              <a:t>22 1969-03-18 1969-03-29 1969-05-07      1          1</a:t>
-            </a:r>
-          </a:p>
-          <a:p>
-            <a:endParaRPr lang="en-US" sz="1800" dirty="0">
-              <a:latin typeface="Courier New" panose="02070309020205020404" pitchFamily="49" charset="0"/>
-              <a:cs typeface="Courier New" panose="02070309020205020404" pitchFamily="49" charset="0"/>
-            </a:endParaRPr>
-          </a:p>
-          <a:p>
-            <a:r>
-              <a:rPr lang="en-US" sz="1800" dirty="0">
-                <a:latin typeface="Courier New" panose="02070309020205020404" pitchFamily="49" charset="0"/>
-                <a:cs typeface="Courier New" panose="02070309020205020404" pitchFamily="49" charset="0"/>
-              </a:rPr>
-              <a:t>id   time1     time2 event transplant</a:t>
-            </a:r>
-          </a:p>
-          <a:p>
-            <a:r>
-              <a:rPr lang="en-US" sz="1800" dirty="0">
-                <a:latin typeface="Courier New" panose="02070309020205020404" pitchFamily="49" charset="0"/>
-                <a:cs typeface="Courier New" panose="02070309020205020404" pitchFamily="49" charset="0"/>
-              </a:rPr>
-              <a:t>22 11 days   50 days     D          1</a:t>
-            </a:r>
-          </a:p>
-          <a:p>
-            <a:endParaRPr lang="en-US" sz="1800" dirty="0">
-              <a:latin typeface="Courier New" panose="02070309020205020404" pitchFamily="49" charset="0"/>
-              <a:cs typeface="Courier New" panose="02070309020205020404" pitchFamily="49" charset="0"/>
-            </a:endParaRPr>
-          </a:p>
-          <a:p>
-            <a:r>
-              <a:rPr lang="en-US" sz="1800" dirty="0">
-                <a:latin typeface="Courier New" panose="02070309020205020404" pitchFamily="49" charset="0"/>
-                <a:cs typeface="Courier New" panose="02070309020205020404" pitchFamily="49" charset="0"/>
-              </a:rPr>
-              <a:t>id start stop event transplant</a:t>
-            </a:r>
-          </a:p>
-          <a:p>
-            <a:r>
-              <a:rPr lang="en-US" sz="1800" dirty="0">
-                <a:latin typeface="Courier New" panose="02070309020205020404" pitchFamily="49" charset="0"/>
-                <a:cs typeface="Courier New" panose="02070309020205020404" pitchFamily="49" charset="0"/>
-              </a:rPr>
-              <a:t>22     0   11     0          0</a:t>
-            </a:r>
-          </a:p>
-          <a:p>
-            <a:r>
-              <a:rPr lang="en-US" sz="1800" dirty="0">
-                <a:latin typeface="Courier New" panose="02070309020205020404" pitchFamily="49" charset="0"/>
-                <a:cs typeface="Courier New" panose="02070309020205020404" pitchFamily="49" charset="0"/>
-              </a:rPr>
-              <a:t>22    11   50     1          1</a:t>
-            </a:r>
-          </a:p>
-        </p:txBody>
-      </p:sp>
-      <p:sp>
-        <p:nvSpPr>
-          <p:cNvPr id="4" name="Footer Placeholder 3"/>
-          <p:cNvSpPr>
-            <a:spLocks noGrp="1"/>
-          </p:cNvSpPr>
-          <p:nvPr>
-            <p:ph type="ftr" sz="quarter" idx="10"/>
-          </p:nvPr>
-        </p:nvSpPr>
-        <p:spPr/>
-        <p:txBody>
-          <a:bodyPr/>
-          <a:lstStyle/>
-          <a:p>
-            <a:pPr>
-              <a:defRPr/>
-            </a:pPr>
-            <a:r>
-              <a:rPr lang="en-US" altLang="en-US" dirty="0"/>
-              <a:t>©2018 Steve Simon    http://TheAnalysisFactor.com</a:t>
-            </a:r>
-          </a:p>
-        </p:txBody>
-      </p:sp>
-      <p:sp>
-        <p:nvSpPr>
-          <p:cNvPr id="5" name="Slide Number Placeholder 4"/>
-          <p:cNvSpPr>
-            <a:spLocks noGrp="1"/>
-          </p:cNvSpPr>
-          <p:nvPr>
-            <p:ph type="sldNum" sz="quarter" idx="11"/>
-          </p:nvPr>
-        </p:nvSpPr>
-        <p:spPr/>
-        <p:txBody>
-          <a:bodyPr/>
-          <a:lstStyle/>
-          <a:p>
-            <a:pPr>
-              <a:defRPr/>
-            </a:pPr>
-            <a:endParaRPr lang="en-US"/>
-          </a:p>
-          <a:p>
-            <a:pPr>
-              <a:defRPr/>
-            </a:pPr>
-            <a:fld id="{E9A8CBA3-AA2B-46A6-BFA3-DCEBEAAB3F0A}" type="slidenum">
-              <a:rPr lang="en-US" smtClean="0"/>
-              <a:pPr>
-                <a:defRPr/>
-              </a:pPr>
-              <a:t>33</a:t>
-            </a:fld>
-            <a:endParaRPr lang="en-US"/>
-          </a:p>
-        </p:txBody>
-      </p:sp>
-      <p:sp>
-        <p:nvSpPr>
-          <p:cNvPr id="6" name="Text Placeholder 5"/>
-          <p:cNvSpPr>
-            <a:spLocks noGrp="1"/>
-          </p:cNvSpPr>
-          <p:nvPr>
-            <p:ph type="body" sz="quarter" idx="12"/>
-          </p:nvPr>
-        </p:nvSpPr>
-        <p:spPr/>
-        <p:txBody>
-          <a:bodyPr/>
-          <a:lstStyle/>
-          <a:p>
-            <a:r>
-              <a:rPr lang="en-US" dirty="0"/>
-              <a:t>Patient #22</a:t>
-            </a:r>
-          </a:p>
-        </p:txBody>
-      </p:sp>
-    </p:spTree>
-    <p:extLst>
-      <p:ext uri="{BB962C8B-B14F-4D97-AF65-F5344CB8AC3E}">
-        <p14:creationId xmlns:p14="http://schemas.microsoft.com/office/powerpoint/2010/main" val="2452209786"/>
-      </p:ext>
-    </p:extLst>
-  </p:cSld>
-  <p:clrMapOvr>
-    <a:masterClrMapping/>
-  </p:clrMapOvr>
-</p:sld>
-</file>
-
-<file path=ppt/slides/slide34.xml><?xml version="1.0" encoding="utf-8"?>
-<p:sld xmlns:a="http://schemas.openxmlformats.org/drawingml/2006/main" xmlns:r="http://schemas.openxmlformats.org/officeDocument/2006/relationships" xmlns:p="http://schemas.openxmlformats.org/presentationml/2006/main">
-  <p:cSld>
-    <p:spTree>
-      <p:nvGrpSpPr>
-        <p:cNvPr id="1" name=""/>
-        <p:cNvGrpSpPr/>
-        <p:nvPr/>
-      </p:nvGrpSpPr>
-      <p:grpSpPr>
-        <a:xfrm>
-          <a:off x="0" y="0"/>
-          <a:ext cx="0" cy="0"/>
-          <a:chOff x="0" y="0"/>
-          <a:chExt cx="0" cy="0"/>
-        </a:xfrm>
-      </p:grpSpPr>
-      <p:sp>
-        <p:nvSpPr>
-          <p:cNvPr id="2" name="Title 1"/>
-          <p:cNvSpPr>
-            <a:spLocks noGrp="1"/>
-          </p:cNvSpPr>
-          <p:nvPr>
-            <p:ph type="title"/>
-          </p:nvPr>
-        </p:nvSpPr>
-        <p:spPr/>
-        <p:txBody>
-          <a:bodyPr/>
-          <a:lstStyle/>
-          <a:p>
-            <a:r>
-              <a:rPr lang="en-US" dirty="0"/>
-              <a:t>Stanford transplant data</a:t>
-            </a:r>
-          </a:p>
-        </p:txBody>
-      </p:sp>
-      <p:sp>
-        <p:nvSpPr>
-          <p:cNvPr id="3" name="Text Placeholder 2"/>
-          <p:cNvSpPr>
-            <a:spLocks noGrp="1"/>
-          </p:cNvSpPr>
-          <p:nvPr>
-            <p:ph type="body" idx="1"/>
-          </p:nvPr>
-        </p:nvSpPr>
-        <p:spPr/>
-        <p:txBody>
-          <a:bodyPr/>
-          <a:lstStyle/>
-          <a:p>
-            <a:r>
-              <a:rPr lang="en-US" sz="1800" dirty="0">
-                <a:latin typeface="Courier New" panose="02070309020205020404" pitchFamily="49" charset="0"/>
-                <a:cs typeface="Courier New" panose="02070309020205020404" pitchFamily="49" charset="0"/>
-              </a:rPr>
-              <a:t>id  </a:t>
-            </a:r>
-            <a:r>
-              <a:rPr lang="en-US" sz="1800" dirty="0" err="1">
-                <a:latin typeface="Courier New" panose="02070309020205020404" pitchFamily="49" charset="0"/>
-                <a:cs typeface="Courier New" panose="02070309020205020404" pitchFamily="49" charset="0"/>
-              </a:rPr>
-              <a:t>accept.dt</a:t>
-            </a:r>
-            <a:r>
-              <a:rPr lang="en-US" sz="1800" dirty="0">
-                <a:latin typeface="Courier New" panose="02070309020205020404" pitchFamily="49" charset="0"/>
-                <a:cs typeface="Courier New" panose="02070309020205020404" pitchFamily="49" charset="0"/>
-              </a:rPr>
-              <a:t>    </a:t>
-            </a:r>
-            <a:r>
-              <a:rPr lang="en-US" sz="1800" dirty="0" err="1">
-                <a:latin typeface="Courier New" panose="02070309020205020404" pitchFamily="49" charset="0"/>
-                <a:cs typeface="Courier New" panose="02070309020205020404" pitchFamily="49" charset="0"/>
-              </a:rPr>
-              <a:t>tx.date</a:t>
-            </a:r>
-            <a:r>
-              <a:rPr lang="en-US" sz="1800" dirty="0">
-                <a:latin typeface="Courier New" panose="02070309020205020404" pitchFamily="49" charset="0"/>
-                <a:cs typeface="Courier New" panose="02070309020205020404" pitchFamily="49" charset="0"/>
-              </a:rPr>
-              <a:t>    </a:t>
-            </a:r>
-            <a:r>
-              <a:rPr lang="en-US" sz="1800" dirty="0" err="1">
-                <a:latin typeface="Courier New" panose="02070309020205020404" pitchFamily="49" charset="0"/>
-                <a:cs typeface="Courier New" panose="02070309020205020404" pitchFamily="49" charset="0"/>
-              </a:rPr>
-              <a:t>fu.date</a:t>
-            </a:r>
-            <a:r>
-              <a:rPr lang="en-US" sz="1800" dirty="0">
-                <a:latin typeface="Courier New" panose="02070309020205020404" pitchFamily="49" charset="0"/>
-                <a:cs typeface="Courier New" panose="02070309020205020404" pitchFamily="49" charset="0"/>
-              </a:rPr>
-              <a:t> </a:t>
-            </a:r>
-            <a:r>
-              <a:rPr lang="en-US" sz="1800" dirty="0" err="1">
-                <a:latin typeface="Courier New" panose="02070309020205020404" pitchFamily="49" charset="0"/>
-                <a:cs typeface="Courier New" panose="02070309020205020404" pitchFamily="49" charset="0"/>
-              </a:rPr>
-              <a:t>fustat</a:t>
-            </a:r>
-            <a:r>
-              <a:rPr lang="en-US" sz="1800" dirty="0">
-                <a:latin typeface="Courier New" panose="02070309020205020404" pitchFamily="49" charset="0"/>
-                <a:cs typeface="Courier New" panose="02070309020205020404" pitchFamily="49" charset="0"/>
-              </a:rPr>
-              <a:t> transplant</a:t>
-            </a:r>
-          </a:p>
-          <a:p>
-            <a:r>
-              <a:rPr lang="en-US" sz="1800" dirty="0">
-                <a:latin typeface="Courier New" panose="02070309020205020404" pitchFamily="49" charset="0"/>
-                <a:cs typeface="Courier New" panose="02070309020205020404" pitchFamily="49" charset="0"/>
-              </a:rPr>
-              <a:t>23 1969-04-11 1969-04-13 1971-04-13      1          1</a:t>
-            </a:r>
-          </a:p>
-          <a:p>
-            <a:endParaRPr lang="en-US" sz="1800" dirty="0">
-              <a:latin typeface="Courier New" panose="02070309020205020404" pitchFamily="49" charset="0"/>
-              <a:cs typeface="Courier New" panose="02070309020205020404" pitchFamily="49" charset="0"/>
-            </a:endParaRPr>
-          </a:p>
-          <a:p>
-            <a:r>
-              <a:rPr lang="en-US" sz="1800" dirty="0">
-                <a:latin typeface="Courier New" panose="02070309020205020404" pitchFamily="49" charset="0"/>
-                <a:cs typeface="Courier New" panose="02070309020205020404" pitchFamily="49" charset="0"/>
-              </a:rPr>
-              <a:t>id   time1     time2 event transplant</a:t>
-            </a:r>
-          </a:p>
-          <a:p>
-            <a:r>
-              <a:rPr lang="en-US" sz="1800" dirty="0">
-                <a:latin typeface="Courier New" panose="02070309020205020404" pitchFamily="49" charset="0"/>
-                <a:cs typeface="Courier New" panose="02070309020205020404" pitchFamily="49" charset="0"/>
-              </a:rPr>
-              <a:t>23  2 days  732 days     D          1</a:t>
-            </a:r>
-          </a:p>
-          <a:p>
-            <a:endParaRPr lang="en-US" sz="1800" dirty="0">
-              <a:latin typeface="Courier New" panose="02070309020205020404" pitchFamily="49" charset="0"/>
-              <a:cs typeface="Courier New" panose="02070309020205020404" pitchFamily="49" charset="0"/>
-            </a:endParaRPr>
-          </a:p>
-          <a:p>
-            <a:r>
-              <a:rPr lang="en-US" sz="1800" dirty="0">
-                <a:latin typeface="Courier New" panose="02070309020205020404" pitchFamily="49" charset="0"/>
-                <a:cs typeface="Courier New" panose="02070309020205020404" pitchFamily="49" charset="0"/>
-              </a:rPr>
-              <a:t>id start stop event transplant</a:t>
-            </a:r>
-          </a:p>
-          <a:p>
-            <a:r>
-              <a:rPr lang="en-US" sz="1800" dirty="0">
-                <a:latin typeface="Courier New" panose="02070309020205020404" pitchFamily="49" charset="0"/>
-                <a:cs typeface="Courier New" panose="02070309020205020404" pitchFamily="49" charset="0"/>
-              </a:rPr>
-              <a:t>23     0    2     0          0</a:t>
-            </a:r>
-          </a:p>
-          <a:p>
-            <a:r>
-              <a:rPr lang="en-US" sz="1800" dirty="0">
-                <a:latin typeface="Courier New" panose="02070309020205020404" pitchFamily="49" charset="0"/>
-                <a:cs typeface="Courier New" panose="02070309020205020404" pitchFamily="49" charset="0"/>
-              </a:rPr>
-              <a:t>23     2  732     1          1</a:t>
-            </a:r>
-          </a:p>
-        </p:txBody>
-      </p:sp>
-      <p:sp>
-        <p:nvSpPr>
-          <p:cNvPr id="4" name="Footer Placeholder 3"/>
-          <p:cNvSpPr>
-            <a:spLocks noGrp="1"/>
-          </p:cNvSpPr>
-          <p:nvPr>
-            <p:ph type="ftr" sz="quarter" idx="10"/>
-          </p:nvPr>
-        </p:nvSpPr>
-        <p:spPr/>
-        <p:txBody>
-          <a:bodyPr/>
-          <a:lstStyle/>
-          <a:p>
-            <a:pPr>
-              <a:defRPr/>
-            </a:pPr>
-            <a:r>
-              <a:rPr lang="en-US" altLang="en-US" dirty="0"/>
-              <a:t>©2018 Steve Simon    http://TheAnalysisFactor.com</a:t>
-            </a:r>
-          </a:p>
-        </p:txBody>
-      </p:sp>
-      <p:sp>
-        <p:nvSpPr>
-          <p:cNvPr id="5" name="Slide Number Placeholder 4"/>
-          <p:cNvSpPr>
-            <a:spLocks noGrp="1"/>
-          </p:cNvSpPr>
-          <p:nvPr>
-            <p:ph type="sldNum" sz="quarter" idx="11"/>
-          </p:nvPr>
-        </p:nvSpPr>
-        <p:spPr/>
-        <p:txBody>
-          <a:bodyPr/>
-          <a:lstStyle/>
-          <a:p>
-            <a:pPr>
-              <a:defRPr/>
-            </a:pPr>
-            <a:endParaRPr lang="en-US"/>
-          </a:p>
-          <a:p>
-            <a:pPr>
-              <a:defRPr/>
-            </a:pPr>
-            <a:fld id="{E9A8CBA3-AA2B-46A6-BFA3-DCEBEAAB3F0A}" type="slidenum">
-              <a:rPr lang="en-US" smtClean="0"/>
-              <a:pPr>
-                <a:defRPr/>
-              </a:pPr>
-              <a:t>34</a:t>
-            </a:fld>
-            <a:endParaRPr lang="en-US"/>
-          </a:p>
-        </p:txBody>
-      </p:sp>
-      <p:sp>
-        <p:nvSpPr>
-          <p:cNvPr id="6" name="Text Placeholder 5"/>
-          <p:cNvSpPr>
-            <a:spLocks noGrp="1"/>
-          </p:cNvSpPr>
-          <p:nvPr>
-            <p:ph type="body" sz="quarter" idx="12"/>
-          </p:nvPr>
-        </p:nvSpPr>
-        <p:spPr/>
-        <p:txBody>
-          <a:bodyPr/>
-          <a:lstStyle/>
-          <a:p>
-            <a:r>
-              <a:rPr lang="en-US" dirty="0"/>
-              <a:t>Patient #23</a:t>
-            </a:r>
-          </a:p>
-        </p:txBody>
-      </p:sp>
-    </p:spTree>
-    <p:extLst>
-      <p:ext uri="{BB962C8B-B14F-4D97-AF65-F5344CB8AC3E}">
-        <p14:creationId xmlns:p14="http://schemas.microsoft.com/office/powerpoint/2010/main" val="1353099458"/>
-      </p:ext>
-    </p:extLst>
-  </p:cSld>
-  <p:clrMapOvr>
-    <a:masterClrMapping/>
-  </p:clrMapOvr>
-</p:sld>
-</file>
-
-<file path=ppt/slides/slide35.xml><?xml version="1.0" encoding="utf-8"?>
-<p:sld xmlns:a="http://schemas.openxmlformats.org/drawingml/2006/main" xmlns:r="http://schemas.openxmlformats.org/officeDocument/2006/relationships" xmlns:p="http://schemas.openxmlformats.org/presentationml/2006/main">
-  <p:cSld>
-    <p:spTree>
-      <p:nvGrpSpPr>
-        <p:cNvPr id="1" name=""/>
-        <p:cNvGrpSpPr/>
-        <p:nvPr/>
-      </p:nvGrpSpPr>
-      <p:grpSpPr>
-        <a:xfrm>
-          <a:off x="0" y="0"/>
-          <a:ext cx="0" cy="0"/>
-          <a:chOff x="0" y="0"/>
-          <a:chExt cx="0" cy="0"/>
-        </a:xfrm>
-      </p:grpSpPr>
-      <p:sp>
-        <p:nvSpPr>
-          <p:cNvPr id="2" name="Title 1"/>
-          <p:cNvSpPr>
-            <a:spLocks noGrp="1"/>
-          </p:cNvSpPr>
-          <p:nvPr>
-            <p:ph type="title"/>
-          </p:nvPr>
-        </p:nvSpPr>
-        <p:spPr/>
-        <p:txBody>
-          <a:bodyPr/>
-          <a:lstStyle/>
-          <a:p>
-            <a:r>
-              <a:rPr lang="en-US" dirty="0"/>
-              <a:t>Stanford transplant data</a:t>
-            </a:r>
-          </a:p>
-        </p:txBody>
-      </p:sp>
-      <p:sp>
-        <p:nvSpPr>
-          <p:cNvPr id="3" name="Text Placeholder 2"/>
-          <p:cNvSpPr>
-            <a:spLocks noGrp="1"/>
-          </p:cNvSpPr>
-          <p:nvPr>
-            <p:ph type="body" idx="1"/>
-          </p:nvPr>
-        </p:nvSpPr>
-        <p:spPr/>
-        <p:txBody>
-          <a:bodyPr/>
-          <a:lstStyle/>
-          <a:p>
-            <a:r>
-              <a:rPr lang="en-US" sz="1800" dirty="0">
-                <a:latin typeface="Courier New" panose="02070309020205020404" pitchFamily="49" charset="0"/>
-                <a:cs typeface="Courier New" panose="02070309020205020404" pitchFamily="49" charset="0"/>
-              </a:rPr>
-              <a:t>id  </a:t>
-            </a:r>
-            <a:r>
-              <a:rPr lang="en-US" sz="1800" dirty="0" err="1">
-                <a:latin typeface="Courier New" panose="02070309020205020404" pitchFamily="49" charset="0"/>
-                <a:cs typeface="Courier New" panose="02070309020205020404" pitchFamily="49" charset="0"/>
-              </a:rPr>
-              <a:t>accept.dt</a:t>
-            </a:r>
-            <a:r>
-              <a:rPr lang="en-US" sz="1800" dirty="0">
-                <a:latin typeface="Courier New" panose="02070309020205020404" pitchFamily="49" charset="0"/>
-                <a:cs typeface="Courier New" panose="02070309020205020404" pitchFamily="49" charset="0"/>
-              </a:rPr>
-              <a:t>    </a:t>
-            </a:r>
-            <a:r>
-              <a:rPr lang="en-US" sz="1800" dirty="0" err="1">
-                <a:latin typeface="Courier New" panose="02070309020205020404" pitchFamily="49" charset="0"/>
-                <a:cs typeface="Courier New" panose="02070309020205020404" pitchFamily="49" charset="0"/>
-              </a:rPr>
-              <a:t>tx.date</a:t>
-            </a:r>
-            <a:r>
-              <a:rPr lang="en-US" sz="1800" dirty="0">
-                <a:latin typeface="Courier New" panose="02070309020205020404" pitchFamily="49" charset="0"/>
-                <a:cs typeface="Courier New" panose="02070309020205020404" pitchFamily="49" charset="0"/>
-              </a:rPr>
-              <a:t>    </a:t>
-            </a:r>
-            <a:r>
-              <a:rPr lang="en-US" sz="1800" dirty="0" err="1">
-                <a:latin typeface="Courier New" panose="02070309020205020404" pitchFamily="49" charset="0"/>
-                <a:cs typeface="Courier New" panose="02070309020205020404" pitchFamily="49" charset="0"/>
-              </a:rPr>
-              <a:t>fu.date</a:t>
-            </a:r>
-            <a:r>
-              <a:rPr lang="en-US" sz="1800" dirty="0">
-                <a:latin typeface="Courier New" panose="02070309020205020404" pitchFamily="49" charset="0"/>
-                <a:cs typeface="Courier New" panose="02070309020205020404" pitchFamily="49" charset="0"/>
-              </a:rPr>
-              <a:t> </a:t>
-            </a:r>
-            <a:r>
-              <a:rPr lang="en-US" sz="1800" dirty="0" err="1">
-                <a:latin typeface="Courier New" panose="02070309020205020404" pitchFamily="49" charset="0"/>
-                <a:cs typeface="Courier New" panose="02070309020205020404" pitchFamily="49" charset="0"/>
-              </a:rPr>
-              <a:t>fustat</a:t>
-            </a:r>
-            <a:r>
-              <a:rPr lang="en-US" sz="1800" dirty="0">
-                <a:latin typeface="Courier New" panose="02070309020205020404" pitchFamily="49" charset="0"/>
-                <a:cs typeface="Courier New" panose="02070309020205020404" pitchFamily="49" charset="0"/>
-              </a:rPr>
-              <a:t> transplant</a:t>
-            </a:r>
-          </a:p>
-          <a:p>
-            <a:r>
-              <a:rPr lang="en-US" sz="1800" dirty="0">
-                <a:latin typeface="Courier New" panose="02070309020205020404" pitchFamily="49" charset="0"/>
-                <a:cs typeface="Courier New" panose="02070309020205020404" pitchFamily="49" charset="0"/>
-              </a:rPr>
-              <a:t>24 1969-04-25 1969-07-16 1969-11-29      1          1</a:t>
-            </a:r>
-          </a:p>
-          <a:p>
-            <a:endParaRPr lang="en-US" sz="1800" dirty="0">
-              <a:latin typeface="Courier New" panose="02070309020205020404" pitchFamily="49" charset="0"/>
-              <a:cs typeface="Courier New" panose="02070309020205020404" pitchFamily="49" charset="0"/>
-            </a:endParaRPr>
-          </a:p>
-          <a:p>
-            <a:r>
-              <a:rPr lang="en-US" sz="1800" dirty="0">
-                <a:latin typeface="Courier New" panose="02070309020205020404" pitchFamily="49" charset="0"/>
-                <a:cs typeface="Courier New" panose="02070309020205020404" pitchFamily="49" charset="0"/>
-              </a:rPr>
-              <a:t>id   time1     time2 event transplant</a:t>
-            </a:r>
-          </a:p>
-          <a:p>
-            <a:r>
-              <a:rPr lang="en-US" sz="1800" dirty="0">
-                <a:latin typeface="Courier New" panose="02070309020205020404" pitchFamily="49" charset="0"/>
-                <a:cs typeface="Courier New" panose="02070309020205020404" pitchFamily="49" charset="0"/>
-              </a:rPr>
-              <a:t>24 82 days  218 days     D          1</a:t>
-            </a:r>
-          </a:p>
-          <a:p>
-            <a:endParaRPr lang="en-US" sz="1800" dirty="0">
-              <a:latin typeface="Courier New" panose="02070309020205020404" pitchFamily="49" charset="0"/>
-              <a:cs typeface="Courier New" panose="02070309020205020404" pitchFamily="49" charset="0"/>
-            </a:endParaRPr>
-          </a:p>
-          <a:p>
-            <a:r>
-              <a:rPr lang="en-US" sz="1800" dirty="0">
-                <a:latin typeface="Courier New" panose="02070309020205020404" pitchFamily="49" charset="0"/>
-                <a:cs typeface="Courier New" panose="02070309020205020404" pitchFamily="49" charset="0"/>
-              </a:rPr>
-              <a:t>id start stop event transplant</a:t>
-            </a:r>
-          </a:p>
-          <a:p>
-            <a:r>
-              <a:rPr lang="en-US" sz="1800" dirty="0">
-                <a:latin typeface="Courier New" panose="02070309020205020404" pitchFamily="49" charset="0"/>
-                <a:cs typeface="Courier New" panose="02070309020205020404" pitchFamily="49" charset="0"/>
-              </a:rPr>
-              <a:t>24     0   82     0          0</a:t>
-            </a:r>
-          </a:p>
-          <a:p>
-            <a:r>
-              <a:rPr lang="en-US" sz="1800" dirty="0">
-                <a:latin typeface="Courier New" panose="02070309020205020404" pitchFamily="49" charset="0"/>
-                <a:cs typeface="Courier New" panose="02070309020205020404" pitchFamily="49" charset="0"/>
-              </a:rPr>
-              <a:t>24    82  218     1          1</a:t>
-            </a:r>
-          </a:p>
-        </p:txBody>
-      </p:sp>
-      <p:sp>
-        <p:nvSpPr>
-          <p:cNvPr id="4" name="Footer Placeholder 3"/>
-          <p:cNvSpPr>
-            <a:spLocks noGrp="1"/>
-          </p:cNvSpPr>
-          <p:nvPr>
-            <p:ph type="ftr" sz="quarter" idx="10"/>
-          </p:nvPr>
-        </p:nvSpPr>
-        <p:spPr/>
-        <p:txBody>
-          <a:bodyPr/>
-          <a:lstStyle/>
-          <a:p>
-            <a:pPr>
-              <a:defRPr/>
-            </a:pPr>
-            <a:r>
-              <a:rPr lang="en-US" altLang="en-US" dirty="0"/>
-              <a:t>©2018 Steve Simon    http://TheAnalysisFactor.com</a:t>
-            </a:r>
-          </a:p>
-        </p:txBody>
-      </p:sp>
-      <p:sp>
-        <p:nvSpPr>
-          <p:cNvPr id="5" name="Slide Number Placeholder 4"/>
-          <p:cNvSpPr>
-            <a:spLocks noGrp="1"/>
-          </p:cNvSpPr>
-          <p:nvPr>
-            <p:ph type="sldNum" sz="quarter" idx="11"/>
-          </p:nvPr>
-        </p:nvSpPr>
-        <p:spPr/>
-        <p:txBody>
-          <a:bodyPr/>
-          <a:lstStyle/>
-          <a:p>
-            <a:pPr>
-              <a:defRPr/>
-            </a:pPr>
-            <a:endParaRPr lang="en-US"/>
-          </a:p>
-          <a:p>
-            <a:pPr>
-              <a:defRPr/>
-            </a:pPr>
-            <a:fld id="{E9A8CBA3-AA2B-46A6-BFA3-DCEBEAAB3F0A}" type="slidenum">
-              <a:rPr lang="en-US" smtClean="0"/>
-              <a:pPr>
-                <a:defRPr/>
-              </a:pPr>
-              <a:t>35</a:t>
-            </a:fld>
-            <a:endParaRPr lang="en-US"/>
-          </a:p>
-        </p:txBody>
-      </p:sp>
-      <p:sp>
-        <p:nvSpPr>
-          <p:cNvPr id="6" name="Text Placeholder 5"/>
-          <p:cNvSpPr>
-            <a:spLocks noGrp="1"/>
-          </p:cNvSpPr>
-          <p:nvPr>
-            <p:ph type="body" sz="quarter" idx="12"/>
-          </p:nvPr>
-        </p:nvSpPr>
-        <p:spPr/>
-        <p:txBody>
-          <a:bodyPr/>
-          <a:lstStyle/>
-          <a:p>
-            <a:r>
-              <a:rPr lang="en-US" dirty="0"/>
-              <a:t>Patient #24</a:t>
-            </a:r>
-          </a:p>
-        </p:txBody>
-      </p:sp>
-    </p:spTree>
-    <p:extLst>
-      <p:ext uri="{BB962C8B-B14F-4D97-AF65-F5344CB8AC3E}">
-        <p14:creationId xmlns:p14="http://schemas.microsoft.com/office/powerpoint/2010/main" val="1815124891"/>
-      </p:ext>
-    </p:extLst>
-  </p:cSld>
-  <p:clrMapOvr>
-    <a:masterClrMapping/>
-  </p:clrMapOvr>
-</p:sld>
-</file>
-
 <file path=ppt/slides/slide36.xml><?xml version="1.0" encoding="utf-8"?>
 <p:sld xmlns:a="http://schemas.openxmlformats.org/drawingml/2006/main" xmlns:r="http://schemas.openxmlformats.org/officeDocument/2006/relationships" xmlns:p="http://schemas.openxmlformats.org/presentationml/2006/main">
   <p:cSld>
@@ -8790,7 +8492,7 @@
                 <a:latin typeface="Courier New" panose="02070309020205020404" pitchFamily="49" charset="0"/>
                 <a:cs typeface="Courier New" panose="02070309020205020404" pitchFamily="49" charset="0"/>
               </a:rPr>
-              <a:t>25 1969-04-28 1969-05-22 1974-04-01      0          1</a:t>
+              <a:t>21 1969-02-01 1969-02-08 1971-11-29      1          1</a:t>
             </a:r>
           </a:p>
           <a:p>
@@ -8814,7 +8516,7 @@
                 <a:latin typeface="Courier New" panose="02070309020205020404" pitchFamily="49" charset="0"/>
                 <a:cs typeface="Courier New" panose="02070309020205020404" pitchFamily="49" charset="0"/>
               </a:rPr>
-              <a:t>25 24 days 1799 days     C          1</a:t>
+              <a:t>21  7 days 1031 days     D          1</a:t>
             </a:r>
           </a:p>
           <a:p>
@@ -8838,7 +8540,7 @@
                 <a:latin typeface="Courier New" panose="02070309020205020404" pitchFamily="49" charset="0"/>
                 <a:cs typeface="Courier New" panose="02070309020205020404" pitchFamily="49" charset="0"/>
               </a:rPr>
-              <a:t>25     0   24     0          0</a:t>
+              <a:t>21     0    7     0          0</a:t>
             </a:r>
           </a:p>
           <a:p>
@@ -8847,8 +8549,17 @@
                 <a:latin typeface="Courier New" panose="02070309020205020404" pitchFamily="49" charset="0"/>
                 <a:cs typeface="Courier New" panose="02070309020205020404" pitchFamily="49" charset="0"/>
               </a:rPr>
-              <a:t>25    24 1799     0          1</a:t>
-            </a:r>
+              <a:t>21     7 1031     1          1</a:t>
+            </a:r>
+          </a:p>
+          <a:p>
+            <a:pPr marL="342900" indent="-342900">
+              <a:buAutoNum type="arabicPlain" startAt="21"/>
+            </a:pPr>
+            <a:endParaRPr lang="en-US" sz="1800" dirty="0">
+              <a:latin typeface="Courier New" panose="02070309020205020404" pitchFamily="49" charset="0"/>
+              <a:cs typeface="Courier New" panose="02070309020205020404" pitchFamily="49" charset="0"/>
+            </a:endParaRPr>
           </a:p>
         </p:txBody>
       </p:sp>
@@ -8929,7 +8640,7 @@
           <a:p>
             <a:r>
               <a:rPr lang="en-US" dirty="0"/>
-              <a:t>Patient #25</a:t>
+              <a:t>Patient #21</a:t>
             </a:r>
           </a:p>
         </p:txBody>
@@ -8937,7 +8648,7 @@
     </p:spTree>
     <p:extLst>
       <p:ext uri="{BB962C8B-B14F-4D97-AF65-F5344CB8AC3E}">
-        <p14:creationId xmlns:p14="http://schemas.microsoft.com/office/powerpoint/2010/main" val="2244761302"/>
+        <p14:creationId xmlns:p14="http://schemas.microsoft.com/office/powerpoint/2010/main" val="2830790376"/>
       </p:ext>
     </p:extLst>
   </p:cSld>
@@ -9071,7 +8782,7 @@
                 <a:latin typeface="Courier New" panose="02070309020205020404" pitchFamily="49" charset="0"/>
                 <a:cs typeface="Courier New" panose="02070309020205020404" pitchFamily="49" charset="0"/>
               </a:rPr>
-              <a:t>26 1969-05-01       &lt;NA&gt; 1973-03-01      0          0</a:t>
+              <a:t>22 1969-03-18 1969-03-29 1969-05-07      1          1</a:t>
             </a:r>
           </a:p>
           <a:p>
@@ -9095,7 +8806,7 @@
                 <a:latin typeface="Courier New" panose="02070309020205020404" pitchFamily="49" charset="0"/>
                 <a:cs typeface="Courier New" panose="02070309020205020404" pitchFamily="49" charset="0"/>
               </a:rPr>
-              <a:t>26 NA days 1400 days     C          0</a:t>
+              <a:t>22 11 days   50 days     D          1</a:t>
             </a:r>
           </a:p>
           <a:p>
@@ -9119,7 +8830,16 @@
                 <a:latin typeface="Courier New" panose="02070309020205020404" pitchFamily="49" charset="0"/>
                 <a:cs typeface="Courier New" panose="02070309020205020404" pitchFamily="49" charset="0"/>
               </a:rPr>
-              <a:t>26     0 1400     0          0</a:t>
+              <a:t>22     0   11     0          0</a:t>
+            </a:r>
+          </a:p>
+          <a:p>
+            <a:r>
+              <a:rPr lang="en-US" sz="1800" dirty="0">
+                <a:latin typeface="Courier New" panose="02070309020205020404" pitchFamily="49" charset="0"/>
+                <a:cs typeface="Courier New" panose="02070309020205020404" pitchFamily="49" charset="0"/>
+              </a:rPr>
+              <a:t>22    11   50     1          1</a:t>
             </a:r>
           </a:p>
         </p:txBody>
@@ -9201,7 +8921,7 @@
           <a:p>
             <a:r>
               <a:rPr lang="en-US" dirty="0"/>
-              <a:t>Patient #26</a:t>
+              <a:t>Patient #22</a:t>
             </a:r>
           </a:p>
         </p:txBody>
@@ -9209,7 +8929,7 @@
     </p:spTree>
     <p:extLst>
       <p:ext uri="{BB962C8B-B14F-4D97-AF65-F5344CB8AC3E}">
-        <p14:creationId xmlns:p14="http://schemas.microsoft.com/office/powerpoint/2010/main" val="185560491"/>
+        <p14:creationId xmlns:p14="http://schemas.microsoft.com/office/powerpoint/2010/main" val="2452209786"/>
       </p:ext>
     </p:extLst>
   </p:cSld>
@@ -9343,7 +9063,7 @@
                 <a:latin typeface="Courier New" panose="02070309020205020404" pitchFamily="49" charset="0"/>
                 <a:cs typeface="Courier New" panose="02070309020205020404" pitchFamily="49" charset="0"/>
               </a:rPr>
-              <a:t>27 1969-05-04       &lt;NA&gt; 1970-01-21      1          0</a:t>
+              <a:t>23 1969-04-11 1969-04-13 1971-04-13      1          1</a:t>
             </a:r>
           </a:p>
           <a:p>
@@ -9367,7 +9087,7 @@
                 <a:latin typeface="Courier New" panose="02070309020205020404" pitchFamily="49" charset="0"/>
                 <a:cs typeface="Courier New" panose="02070309020205020404" pitchFamily="49" charset="0"/>
               </a:rPr>
-              <a:t>27 NA days  262 days     D          0</a:t>
+              <a:t>23  2 days  732 days     D          1</a:t>
             </a:r>
           </a:p>
           <a:p>
@@ -9391,7 +9111,16 @@
                 <a:latin typeface="Courier New" panose="02070309020205020404" pitchFamily="49" charset="0"/>
                 <a:cs typeface="Courier New" panose="02070309020205020404" pitchFamily="49" charset="0"/>
               </a:rPr>
-              <a:t>27     0  262     1          0</a:t>
+              <a:t>23     0    2     0          0</a:t>
+            </a:r>
+          </a:p>
+          <a:p>
+            <a:r>
+              <a:rPr lang="en-US" sz="1800" dirty="0">
+                <a:latin typeface="Courier New" panose="02070309020205020404" pitchFamily="49" charset="0"/>
+                <a:cs typeface="Courier New" panose="02070309020205020404" pitchFamily="49" charset="0"/>
+              </a:rPr>
+              <a:t>23     2  732     1          1</a:t>
             </a:r>
           </a:p>
         </p:txBody>
@@ -9473,7 +9202,7 @@
           <a:p>
             <a:r>
               <a:rPr lang="en-US" dirty="0"/>
-              <a:t>Patient #27</a:t>
+              <a:t>Patient #23</a:t>
             </a:r>
           </a:p>
         </p:txBody>
@@ -9481,7 +9210,7 @@
     </p:spTree>
     <p:extLst>
       <p:ext uri="{BB962C8B-B14F-4D97-AF65-F5344CB8AC3E}">
-        <p14:creationId xmlns:p14="http://schemas.microsoft.com/office/powerpoint/2010/main" val="1134118722"/>
+        <p14:creationId xmlns:p14="http://schemas.microsoft.com/office/powerpoint/2010/main" val="1353099458"/>
       </p:ext>
     </p:extLst>
   </p:cSld>
@@ -9615,7 +9344,7 @@
                 <a:latin typeface="Courier New" panose="02070309020205020404" pitchFamily="49" charset="0"/>
                 <a:cs typeface="Courier New" panose="02070309020205020404" pitchFamily="49" charset="0"/>
               </a:rPr>
-              <a:t>28 1969-06-07 1969-08-16 1969-08-17      1          1</a:t>
+              <a:t>24 1969-04-25 1969-07-16 1969-11-29      1          1</a:t>
             </a:r>
           </a:p>
           <a:p>
@@ -9639,7 +9368,7 @@
                 <a:latin typeface="Courier New" panose="02070309020205020404" pitchFamily="49" charset="0"/>
                 <a:cs typeface="Courier New" panose="02070309020205020404" pitchFamily="49" charset="0"/>
               </a:rPr>
-              <a:t>28 70 days   71 days     D          1</a:t>
+              <a:t>24 82 days  218 days     D          1</a:t>
             </a:r>
           </a:p>
           <a:p>
@@ -9663,7 +9392,7 @@
                 <a:latin typeface="Courier New" panose="02070309020205020404" pitchFamily="49" charset="0"/>
                 <a:cs typeface="Courier New" panose="02070309020205020404" pitchFamily="49" charset="0"/>
               </a:rPr>
-              <a:t>28     0   70     0          0</a:t>
+              <a:t>24     0   82     0          0</a:t>
             </a:r>
           </a:p>
           <a:p>
@@ -9672,7 +9401,7 @@
                 <a:latin typeface="Courier New" panose="02070309020205020404" pitchFamily="49" charset="0"/>
                 <a:cs typeface="Courier New" panose="02070309020205020404" pitchFamily="49" charset="0"/>
               </a:rPr>
-              <a:t>28    70   71     1          1</a:t>
+              <a:t>24    82  218     1          1</a:t>
             </a:r>
           </a:p>
         </p:txBody>
@@ -9754,7 +9483,7 @@
           <a:p>
             <a:r>
               <a:rPr lang="en-US" dirty="0"/>
-              <a:t>Patient #28</a:t>
+              <a:t>Patient #24</a:t>
             </a:r>
           </a:p>
         </p:txBody>
@@ -9762,7 +9491,7 @@
     </p:spTree>
     <p:extLst>
       <p:ext uri="{BB962C8B-B14F-4D97-AF65-F5344CB8AC3E}">
-        <p14:creationId xmlns:p14="http://schemas.microsoft.com/office/powerpoint/2010/main" val="1099184777"/>
+        <p14:creationId xmlns:p14="http://schemas.microsoft.com/office/powerpoint/2010/main" val="1815124891"/>
       </p:ext>
     </p:extLst>
   </p:cSld>
@@ -10038,7 +9767,7 @@
                 <a:latin typeface="Courier New" panose="02070309020205020404" pitchFamily="49" charset="0"/>
                 <a:cs typeface="Courier New" panose="02070309020205020404" pitchFamily="49" charset="0"/>
               </a:rPr>
-              <a:t>29 1969-07-14       &lt;NA&gt; 1969-08-17      1          0</a:t>
+              <a:t>25 1969-04-28 1969-05-22 1974-04-01      0          1</a:t>
             </a:r>
           </a:p>
           <a:p>
@@ -10062,7 +9791,7 @@
                 <a:latin typeface="Courier New" panose="02070309020205020404" pitchFamily="49" charset="0"/>
                 <a:cs typeface="Courier New" panose="02070309020205020404" pitchFamily="49" charset="0"/>
               </a:rPr>
-              <a:t>29 NA days   34 days     D          0</a:t>
+              <a:t>25 24 days 1799 days     C          1</a:t>
             </a:r>
           </a:p>
           <a:p>
@@ -10086,7 +9815,16 @@
                 <a:latin typeface="Courier New" panose="02070309020205020404" pitchFamily="49" charset="0"/>
                 <a:cs typeface="Courier New" panose="02070309020205020404" pitchFamily="49" charset="0"/>
               </a:rPr>
-              <a:t>29     0   34     1          0</a:t>
+              <a:t>25     0   24     0          0</a:t>
+            </a:r>
+          </a:p>
+          <a:p>
+            <a:r>
+              <a:rPr lang="en-US" sz="1800" dirty="0">
+                <a:latin typeface="Courier New" panose="02070309020205020404" pitchFamily="49" charset="0"/>
+                <a:cs typeface="Courier New" panose="02070309020205020404" pitchFamily="49" charset="0"/>
+              </a:rPr>
+              <a:t>25    24 1799     0          1</a:t>
             </a:r>
           </a:p>
         </p:txBody>
@@ -10168,7 +9906,7 @@
           <a:p>
             <a:r>
               <a:rPr lang="en-US" dirty="0"/>
-              <a:t>Patient #29</a:t>
+              <a:t>Patient #25</a:t>
             </a:r>
           </a:p>
         </p:txBody>
@@ -10176,7 +9914,7 @@
     </p:spTree>
     <p:extLst>
       <p:ext uri="{BB962C8B-B14F-4D97-AF65-F5344CB8AC3E}">
-        <p14:creationId xmlns:p14="http://schemas.microsoft.com/office/powerpoint/2010/main" val="2485784403"/>
+        <p14:creationId xmlns:p14="http://schemas.microsoft.com/office/powerpoint/2010/main" val="2244761302"/>
       </p:ext>
     </p:extLst>
   </p:cSld>
@@ -10310,7 +10048,7 @@
                 <a:latin typeface="Courier New" panose="02070309020205020404" pitchFamily="49" charset="0"/>
                 <a:cs typeface="Courier New" panose="02070309020205020404" pitchFamily="49" charset="0"/>
               </a:rPr>
-              <a:t>30 1969-08-19 1969-09-03 1971-12-18      1          1</a:t>
+              <a:t>26 1969-05-01       &lt;NA&gt; 1973-03-01      0          0</a:t>
             </a:r>
           </a:p>
           <a:p>
@@ -10334,7 +10072,7 @@
                 <a:latin typeface="Courier New" panose="02070309020205020404" pitchFamily="49" charset="0"/>
                 <a:cs typeface="Courier New" panose="02070309020205020404" pitchFamily="49" charset="0"/>
               </a:rPr>
-              <a:t>30 15 days  851 days     D          1</a:t>
+              <a:t>26 NA days 1400 days     C          0</a:t>
             </a:r>
           </a:p>
           <a:p>
@@ -10358,16 +10096,7 @@
                 <a:latin typeface="Courier New" panose="02070309020205020404" pitchFamily="49" charset="0"/>
                 <a:cs typeface="Courier New" panose="02070309020205020404" pitchFamily="49" charset="0"/>
               </a:rPr>
-              <a:t>30     0   15     0          0</a:t>
-            </a:r>
-          </a:p>
-          <a:p>
-            <a:r>
-              <a:rPr lang="en-US" sz="1800" dirty="0">
-                <a:latin typeface="Courier New" panose="02070309020205020404" pitchFamily="49" charset="0"/>
-                <a:cs typeface="Courier New" panose="02070309020205020404" pitchFamily="49" charset="0"/>
-              </a:rPr>
-              <a:t>30    15  851     1          1</a:t>
+              <a:t>26     0 1400     0          0</a:t>
             </a:r>
           </a:p>
         </p:txBody>
@@ -10449,7 +10178,7 @@
           <a:p>
             <a:r>
               <a:rPr lang="en-US" dirty="0"/>
-              <a:t>Patient #30</a:t>
+              <a:t>Patient #26</a:t>
             </a:r>
           </a:p>
         </p:txBody>
@@ -10457,7 +10186,7 @@
     </p:spTree>
     <p:extLst>
       <p:ext uri="{BB962C8B-B14F-4D97-AF65-F5344CB8AC3E}">
-        <p14:creationId xmlns:p14="http://schemas.microsoft.com/office/powerpoint/2010/main" val="461925367"/>
+        <p14:creationId xmlns:p14="http://schemas.microsoft.com/office/powerpoint/2010/main" val="185560491"/>
       </p:ext>
     </p:extLst>
   </p:cSld>
@@ -10501,7 +10230,170 @@
           <a:p>
             <a:r>
               <a:rPr lang="en-US" dirty="0"/>
-              <a:t>Stanford transplant data, time-varying model</a:t>
+              <a:t>Stanford transplant data</a:t>
+            </a:r>
+          </a:p>
+        </p:txBody>
+      </p:sp>
+      <p:sp>
+        <p:nvSpPr>
+          <p:cNvPr id="3" name="Text Placeholder 2"/>
+          <p:cNvSpPr>
+            <a:spLocks noGrp="1"/>
+          </p:cNvSpPr>
+          <p:nvPr>
+            <p:ph type="body" idx="1"/>
+          </p:nvPr>
+        </p:nvSpPr>
+        <p:spPr/>
+        <p:txBody>
+          <a:bodyPr/>
+          <a:lstStyle/>
+          <a:p>
+            <a:r>
+              <a:rPr lang="en-US" sz="1800" dirty="0">
+                <a:latin typeface="Courier New" panose="02070309020205020404" pitchFamily="49" charset="0"/>
+                <a:cs typeface="Courier New" panose="02070309020205020404" pitchFamily="49" charset="0"/>
+              </a:rPr>
+              <a:t>id  </a:t>
+            </a:r>
+            <a:r>
+              <a:rPr lang="en-US" sz="1800" dirty="0" err="1">
+                <a:latin typeface="Courier New" panose="02070309020205020404" pitchFamily="49" charset="0"/>
+                <a:cs typeface="Courier New" panose="02070309020205020404" pitchFamily="49" charset="0"/>
+              </a:rPr>
+              <a:t>accept.dt</a:t>
+            </a:r>
+            <a:r>
+              <a:rPr lang="en-US" sz="1800" dirty="0">
+                <a:latin typeface="Courier New" panose="02070309020205020404" pitchFamily="49" charset="0"/>
+                <a:cs typeface="Courier New" panose="02070309020205020404" pitchFamily="49" charset="0"/>
+              </a:rPr>
+              <a:t>    </a:t>
+            </a:r>
+            <a:r>
+              <a:rPr lang="en-US" sz="1800" dirty="0" err="1">
+                <a:latin typeface="Courier New" panose="02070309020205020404" pitchFamily="49" charset="0"/>
+                <a:cs typeface="Courier New" panose="02070309020205020404" pitchFamily="49" charset="0"/>
+              </a:rPr>
+              <a:t>tx.date</a:t>
+            </a:r>
+            <a:r>
+              <a:rPr lang="en-US" sz="1800" dirty="0">
+                <a:latin typeface="Courier New" panose="02070309020205020404" pitchFamily="49" charset="0"/>
+                <a:cs typeface="Courier New" panose="02070309020205020404" pitchFamily="49" charset="0"/>
+              </a:rPr>
+              <a:t>    </a:t>
+            </a:r>
+            <a:r>
+              <a:rPr lang="en-US" sz="1800" dirty="0" err="1">
+                <a:latin typeface="Courier New" panose="02070309020205020404" pitchFamily="49" charset="0"/>
+                <a:cs typeface="Courier New" panose="02070309020205020404" pitchFamily="49" charset="0"/>
+              </a:rPr>
+              <a:t>fu.date</a:t>
+            </a:r>
+            <a:r>
+              <a:rPr lang="en-US" sz="1800" dirty="0">
+                <a:latin typeface="Courier New" panose="02070309020205020404" pitchFamily="49" charset="0"/>
+                <a:cs typeface="Courier New" panose="02070309020205020404" pitchFamily="49" charset="0"/>
+              </a:rPr>
+              <a:t> </a:t>
+            </a:r>
+            <a:r>
+              <a:rPr lang="en-US" sz="1800" dirty="0" err="1">
+                <a:latin typeface="Courier New" panose="02070309020205020404" pitchFamily="49" charset="0"/>
+                <a:cs typeface="Courier New" panose="02070309020205020404" pitchFamily="49" charset="0"/>
+              </a:rPr>
+              <a:t>fustat</a:t>
+            </a:r>
+            <a:r>
+              <a:rPr lang="en-US" sz="1800" dirty="0">
+                <a:latin typeface="Courier New" panose="02070309020205020404" pitchFamily="49" charset="0"/>
+                <a:cs typeface="Courier New" panose="02070309020205020404" pitchFamily="49" charset="0"/>
+              </a:rPr>
+              <a:t> transplant</a:t>
+            </a:r>
+          </a:p>
+          <a:p>
+            <a:r>
+              <a:rPr lang="en-US" sz="1800" dirty="0">
+                <a:latin typeface="Courier New" panose="02070309020205020404" pitchFamily="49" charset="0"/>
+                <a:cs typeface="Courier New" panose="02070309020205020404" pitchFamily="49" charset="0"/>
+              </a:rPr>
+              <a:t>27 1969-05-04       &lt;NA&gt; 1970-01-21      1          0</a:t>
+            </a:r>
+          </a:p>
+          <a:p>
+            <a:endParaRPr lang="en-US" sz="1800" dirty="0">
+              <a:latin typeface="Courier New" panose="02070309020205020404" pitchFamily="49" charset="0"/>
+              <a:cs typeface="Courier New" panose="02070309020205020404" pitchFamily="49" charset="0"/>
+            </a:endParaRPr>
+          </a:p>
+          <a:p>
+            <a:r>
+              <a:rPr lang="en-US" sz="1800" dirty="0">
+                <a:latin typeface="Courier New" panose="02070309020205020404" pitchFamily="49" charset="0"/>
+                <a:cs typeface="Courier New" panose="02070309020205020404" pitchFamily="49" charset="0"/>
+              </a:rPr>
+              <a:t>id   time1     time2 event transplant</a:t>
+            </a:r>
+          </a:p>
+          <a:p>
+            <a:r>
+              <a:rPr lang="en-US" sz="1800" dirty="0">
+                <a:latin typeface="Courier New" panose="02070309020205020404" pitchFamily="49" charset="0"/>
+                <a:cs typeface="Courier New" panose="02070309020205020404" pitchFamily="49" charset="0"/>
+              </a:rPr>
+              <a:t>27 NA days  262 days     D          0</a:t>
+            </a:r>
+          </a:p>
+          <a:p>
+            <a:endParaRPr lang="en-US" sz="1800" dirty="0">
+              <a:latin typeface="Courier New" panose="02070309020205020404" pitchFamily="49" charset="0"/>
+              <a:cs typeface="Courier New" panose="02070309020205020404" pitchFamily="49" charset="0"/>
+            </a:endParaRPr>
+          </a:p>
+          <a:p>
+            <a:r>
+              <a:rPr lang="en-US" sz="1800" dirty="0">
+                <a:latin typeface="Courier New" panose="02070309020205020404" pitchFamily="49" charset="0"/>
+                <a:cs typeface="Courier New" panose="02070309020205020404" pitchFamily="49" charset="0"/>
+              </a:rPr>
+              <a:t>id start stop event transplant</a:t>
+            </a:r>
+          </a:p>
+          <a:p>
+            <a:r>
+              <a:rPr lang="en-US" sz="1800" dirty="0">
+                <a:latin typeface="Courier New" panose="02070309020205020404" pitchFamily="49" charset="0"/>
+                <a:cs typeface="Courier New" panose="02070309020205020404" pitchFamily="49" charset="0"/>
+              </a:rPr>
+              <a:t>27     0  262     1          0</a:t>
+            </a:r>
+          </a:p>
+        </p:txBody>
+      </p:sp>
+      <p:sp>
+        <p:nvSpPr>
+          <p:cNvPr id="4" name="Footer Placeholder 3"/>
+          <p:cNvSpPr>
+            <a:spLocks noGrp="1"/>
+          </p:cNvSpPr>
+          <p:nvPr>
+            <p:ph type="ftr" sz="quarter" idx="10"/>
+          </p:nvPr>
+        </p:nvSpPr>
+        <p:spPr/>
+        <p:txBody>
+          <a:bodyPr/>
+          <a:lstStyle/>
+          <a:p>
+            <a:pPr>
+              <a:defRPr/>
+            </a:pPr>
+            <a:r>
+              <a:rPr lang="en-US" altLang="en-US" dirty="0"/>
+              <a:t>©2018 Steve Simon    http://TheAnalysisFactor.com</a:t>
             </a:r>
           </a:p>
         </p:txBody>
@@ -10536,6 +10428,949 @@
                 <a:defRPr/>
               </a:pPr>
               <a:t>42</a:t>
+            </a:fld>
+            <a:endParaRPr lang="en-US"/>
+          </a:p>
+        </p:txBody>
+      </p:sp>
+      <p:sp>
+        <p:nvSpPr>
+          <p:cNvPr id="6" name="Text Placeholder 5"/>
+          <p:cNvSpPr>
+            <a:spLocks noGrp="1"/>
+          </p:cNvSpPr>
+          <p:nvPr>
+            <p:ph type="body" sz="quarter" idx="12"/>
+          </p:nvPr>
+        </p:nvSpPr>
+        <p:spPr/>
+        <p:txBody>
+          <a:bodyPr/>
+          <a:lstStyle/>
+          <a:p>
+            <a:r>
+              <a:rPr lang="en-US" dirty="0"/>
+              <a:t>Patient #27</a:t>
+            </a:r>
+          </a:p>
+        </p:txBody>
+      </p:sp>
+    </p:spTree>
+    <p:extLst>
+      <p:ext uri="{BB962C8B-B14F-4D97-AF65-F5344CB8AC3E}">
+        <p14:creationId xmlns:p14="http://schemas.microsoft.com/office/powerpoint/2010/main" val="1134118722"/>
+      </p:ext>
+    </p:extLst>
+  </p:cSld>
+  <p:clrMapOvr>
+    <a:masterClrMapping/>
+  </p:clrMapOvr>
+</p:sld>
+</file>
+
+<file path=ppt/slides/slide43.xml><?xml version="1.0" encoding="utf-8"?>
+<p:sld xmlns:a="http://schemas.openxmlformats.org/drawingml/2006/main" xmlns:r="http://schemas.openxmlformats.org/officeDocument/2006/relationships" xmlns:p="http://schemas.openxmlformats.org/presentationml/2006/main">
+  <p:cSld>
+    <p:spTree>
+      <p:nvGrpSpPr>
+        <p:cNvPr id="1" name=""/>
+        <p:cNvGrpSpPr/>
+        <p:nvPr/>
+      </p:nvGrpSpPr>
+      <p:grpSpPr>
+        <a:xfrm>
+          <a:off x="0" y="0"/>
+          <a:ext cx="0" cy="0"/>
+          <a:chOff x="0" y="0"/>
+          <a:chExt cx="0" cy="0"/>
+        </a:xfrm>
+      </p:grpSpPr>
+      <p:sp>
+        <p:nvSpPr>
+          <p:cNvPr id="2" name="Title 1"/>
+          <p:cNvSpPr>
+            <a:spLocks noGrp="1"/>
+          </p:cNvSpPr>
+          <p:nvPr>
+            <p:ph type="title"/>
+          </p:nvPr>
+        </p:nvSpPr>
+        <p:spPr/>
+        <p:txBody>
+          <a:bodyPr/>
+          <a:lstStyle/>
+          <a:p>
+            <a:r>
+              <a:rPr lang="en-US" dirty="0"/>
+              <a:t>Stanford transplant data</a:t>
+            </a:r>
+          </a:p>
+        </p:txBody>
+      </p:sp>
+      <p:sp>
+        <p:nvSpPr>
+          <p:cNvPr id="3" name="Text Placeholder 2"/>
+          <p:cNvSpPr>
+            <a:spLocks noGrp="1"/>
+          </p:cNvSpPr>
+          <p:nvPr>
+            <p:ph type="body" idx="1"/>
+          </p:nvPr>
+        </p:nvSpPr>
+        <p:spPr/>
+        <p:txBody>
+          <a:bodyPr/>
+          <a:lstStyle/>
+          <a:p>
+            <a:r>
+              <a:rPr lang="en-US" sz="1800" dirty="0">
+                <a:latin typeface="Courier New" panose="02070309020205020404" pitchFamily="49" charset="0"/>
+                <a:cs typeface="Courier New" panose="02070309020205020404" pitchFamily="49" charset="0"/>
+              </a:rPr>
+              <a:t>id  </a:t>
+            </a:r>
+            <a:r>
+              <a:rPr lang="en-US" sz="1800" dirty="0" err="1">
+                <a:latin typeface="Courier New" panose="02070309020205020404" pitchFamily="49" charset="0"/>
+                <a:cs typeface="Courier New" panose="02070309020205020404" pitchFamily="49" charset="0"/>
+              </a:rPr>
+              <a:t>accept.dt</a:t>
+            </a:r>
+            <a:r>
+              <a:rPr lang="en-US" sz="1800" dirty="0">
+                <a:latin typeface="Courier New" panose="02070309020205020404" pitchFamily="49" charset="0"/>
+                <a:cs typeface="Courier New" panose="02070309020205020404" pitchFamily="49" charset="0"/>
+              </a:rPr>
+              <a:t>    </a:t>
+            </a:r>
+            <a:r>
+              <a:rPr lang="en-US" sz="1800" dirty="0" err="1">
+                <a:latin typeface="Courier New" panose="02070309020205020404" pitchFamily="49" charset="0"/>
+                <a:cs typeface="Courier New" panose="02070309020205020404" pitchFamily="49" charset="0"/>
+              </a:rPr>
+              <a:t>tx.date</a:t>
+            </a:r>
+            <a:r>
+              <a:rPr lang="en-US" sz="1800" dirty="0">
+                <a:latin typeface="Courier New" panose="02070309020205020404" pitchFamily="49" charset="0"/>
+                <a:cs typeface="Courier New" panose="02070309020205020404" pitchFamily="49" charset="0"/>
+              </a:rPr>
+              <a:t>    </a:t>
+            </a:r>
+            <a:r>
+              <a:rPr lang="en-US" sz="1800" dirty="0" err="1">
+                <a:latin typeface="Courier New" panose="02070309020205020404" pitchFamily="49" charset="0"/>
+                <a:cs typeface="Courier New" panose="02070309020205020404" pitchFamily="49" charset="0"/>
+              </a:rPr>
+              <a:t>fu.date</a:t>
+            </a:r>
+            <a:r>
+              <a:rPr lang="en-US" sz="1800" dirty="0">
+                <a:latin typeface="Courier New" panose="02070309020205020404" pitchFamily="49" charset="0"/>
+                <a:cs typeface="Courier New" panose="02070309020205020404" pitchFamily="49" charset="0"/>
+              </a:rPr>
+              <a:t> </a:t>
+            </a:r>
+            <a:r>
+              <a:rPr lang="en-US" sz="1800" dirty="0" err="1">
+                <a:latin typeface="Courier New" panose="02070309020205020404" pitchFamily="49" charset="0"/>
+                <a:cs typeface="Courier New" panose="02070309020205020404" pitchFamily="49" charset="0"/>
+              </a:rPr>
+              <a:t>fustat</a:t>
+            </a:r>
+            <a:r>
+              <a:rPr lang="en-US" sz="1800" dirty="0">
+                <a:latin typeface="Courier New" panose="02070309020205020404" pitchFamily="49" charset="0"/>
+                <a:cs typeface="Courier New" panose="02070309020205020404" pitchFamily="49" charset="0"/>
+              </a:rPr>
+              <a:t> transplant</a:t>
+            </a:r>
+          </a:p>
+          <a:p>
+            <a:r>
+              <a:rPr lang="en-US" sz="1800" dirty="0">
+                <a:latin typeface="Courier New" panose="02070309020205020404" pitchFamily="49" charset="0"/>
+                <a:cs typeface="Courier New" panose="02070309020205020404" pitchFamily="49" charset="0"/>
+              </a:rPr>
+              <a:t>28 1969-06-07 1969-08-16 1969-08-17      1          1</a:t>
+            </a:r>
+          </a:p>
+          <a:p>
+            <a:endParaRPr lang="en-US" sz="1800" dirty="0">
+              <a:latin typeface="Courier New" panose="02070309020205020404" pitchFamily="49" charset="0"/>
+              <a:cs typeface="Courier New" panose="02070309020205020404" pitchFamily="49" charset="0"/>
+            </a:endParaRPr>
+          </a:p>
+          <a:p>
+            <a:r>
+              <a:rPr lang="en-US" sz="1800" dirty="0">
+                <a:latin typeface="Courier New" panose="02070309020205020404" pitchFamily="49" charset="0"/>
+                <a:cs typeface="Courier New" panose="02070309020205020404" pitchFamily="49" charset="0"/>
+              </a:rPr>
+              <a:t>id   time1     time2 event transplant</a:t>
+            </a:r>
+          </a:p>
+          <a:p>
+            <a:r>
+              <a:rPr lang="en-US" sz="1800" dirty="0">
+                <a:latin typeface="Courier New" panose="02070309020205020404" pitchFamily="49" charset="0"/>
+                <a:cs typeface="Courier New" panose="02070309020205020404" pitchFamily="49" charset="0"/>
+              </a:rPr>
+              <a:t>28 70 days   71 days     D          1</a:t>
+            </a:r>
+          </a:p>
+          <a:p>
+            <a:endParaRPr lang="en-US" sz="1800" dirty="0">
+              <a:latin typeface="Courier New" panose="02070309020205020404" pitchFamily="49" charset="0"/>
+              <a:cs typeface="Courier New" panose="02070309020205020404" pitchFamily="49" charset="0"/>
+            </a:endParaRPr>
+          </a:p>
+          <a:p>
+            <a:r>
+              <a:rPr lang="en-US" sz="1800" dirty="0">
+                <a:latin typeface="Courier New" panose="02070309020205020404" pitchFamily="49" charset="0"/>
+                <a:cs typeface="Courier New" panose="02070309020205020404" pitchFamily="49" charset="0"/>
+              </a:rPr>
+              <a:t>id start stop event transplant</a:t>
+            </a:r>
+          </a:p>
+          <a:p>
+            <a:r>
+              <a:rPr lang="en-US" sz="1800" dirty="0">
+                <a:latin typeface="Courier New" panose="02070309020205020404" pitchFamily="49" charset="0"/>
+                <a:cs typeface="Courier New" panose="02070309020205020404" pitchFamily="49" charset="0"/>
+              </a:rPr>
+              <a:t>28     0   70     0          0</a:t>
+            </a:r>
+          </a:p>
+          <a:p>
+            <a:r>
+              <a:rPr lang="en-US" sz="1800" dirty="0">
+                <a:latin typeface="Courier New" panose="02070309020205020404" pitchFamily="49" charset="0"/>
+                <a:cs typeface="Courier New" panose="02070309020205020404" pitchFamily="49" charset="0"/>
+              </a:rPr>
+              <a:t>28    70   71     1          1</a:t>
+            </a:r>
+          </a:p>
+        </p:txBody>
+      </p:sp>
+      <p:sp>
+        <p:nvSpPr>
+          <p:cNvPr id="4" name="Footer Placeholder 3"/>
+          <p:cNvSpPr>
+            <a:spLocks noGrp="1"/>
+          </p:cNvSpPr>
+          <p:nvPr>
+            <p:ph type="ftr" sz="quarter" idx="10"/>
+          </p:nvPr>
+        </p:nvSpPr>
+        <p:spPr/>
+        <p:txBody>
+          <a:bodyPr/>
+          <a:lstStyle/>
+          <a:p>
+            <a:pPr>
+              <a:defRPr/>
+            </a:pPr>
+            <a:r>
+              <a:rPr lang="en-US" altLang="en-US" dirty="0"/>
+              <a:t>©2018 Steve Simon    http://TheAnalysisFactor.com</a:t>
+            </a:r>
+          </a:p>
+        </p:txBody>
+      </p:sp>
+      <p:sp>
+        <p:nvSpPr>
+          <p:cNvPr id="5" name="Slide Number Placeholder 4"/>
+          <p:cNvSpPr>
+            <a:spLocks noGrp="1"/>
+          </p:cNvSpPr>
+          <p:nvPr>
+            <p:ph type="sldNum" sz="quarter" idx="11"/>
+          </p:nvPr>
+        </p:nvSpPr>
+        <p:spPr/>
+        <p:txBody>
+          <a:bodyPr/>
+          <a:lstStyle/>
+          <a:p>
+            <a:pPr>
+              <a:defRPr/>
+            </a:pPr>
+            <a:endParaRPr lang="en-US"/>
+          </a:p>
+          <a:p>
+            <a:pPr>
+              <a:defRPr/>
+            </a:pPr>
+            <a:fld id="{E9A8CBA3-AA2B-46A6-BFA3-DCEBEAAB3F0A}" type="slidenum">
+              <a:rPr lang="en-US" smtClean="0"/>
+              <a:pPr>
+                <a:defRPr/>
+              </a:pPr>
+              <a:t>43</a:t>
+            </a:fld>
+            <a:endParaRPr lang="en-US"/>
+          </a:p>
+        </p:txBody>
+      </p:sp>
+      <p:sp>
+        <p:nvSpPr>
+          <p:cNvPr id="6" name="Text Placeholder 5"/>
+          <p:cNvSpPr>
+            <a:spLocks noGrp="1"/>
+          </p:cNvSpPr>
+          <p:nvPr>
+            <p:ph type="body" sz="quarter" idx="12"/>
+          </p:nvPr>
+        </p:nvSpPr>
+        <p:spPr/>
+        <p:txBody>
+          <a:bodyPr/>
+          <a:lstStyle/>
+          <a:p>
+            <a:r>
+              <a:rPr lang="en-US" dirty="0"/>
+              <a:t>Patient #28</a:t>
+            </a:r>
+          </a:p>
+        </p:txBody>
+      </p:sp>
+    </p:spTree>
+    <p:extLst>
+      <p:ext uri="{BB962C8B-B14F-4D97-AF65-F5344CB8AC3E}">
+        <p14:creationId xmlns:p14="http://schemas.microsoft.com/office/powerpoint/2010/main" val="1099184777"/>
+      </p:ext>
+    </p:extLst>
+  </p:cSld>
+  <p:clrMapOvr>
+    <a:masterClrMapping/>
+  </p:clrMapOvr>
+</p:sld>
+</file>
+
+<file path=ppt/slides/slide44.xml><?xml version="1.0" encoding="utf-8"?>
+<p:sld xmlns:a="http://schemas.openxmlformats.org/drawingml/2006/main" xmlns:r="http://schemas.openxmlformats.org/officeDocument/2006/relationships" xmlns:p="http://schemas.openxmlformats.org/presentationml/2006/main">
+  <p:cSld>
+    <p:spTree>
+      <p:nvGrpSpPr>
+        <p:cNvPr id="1" name=""/>
+        <p:cNvGrpSpPr/>
+        <p:nvPr/>
+      </p:nvGrpSpPr>
+      <p:grpSpPr>
+        <a:xfrm>
+          <a:off x="0" y="0"/>
+          <a:ext cx="0" cy="0"/>
+          <a:chOff x="0" y="0"/>
+          <a:chExt cx="0" cy="0"/>
+        </a:xfrm>
+      </p:grpSpPr>
+      <p:sp>
+        <p:nvSpPr>
+          <p:cNvPr id="2" name="Title 1"/>
+          <p:cNvSpPr>
+            <a:spLocks noGrp="1"/>
+          </p:cNvSpPr>
+          <p:nvPr>
+            <p:ph type="title"/>
+          </p:nvPr>
+        </p:nvSpPr>
+        <p:spPr/>
+        <p:txBody>
+          <a:bodyPr/>
+          <a:lstStyle/>
+          <a:p>
+            <a:r>
+              <a:rPr lang="en-US" dirty="0"/>
+              <a:t>Stanford transplant data</a:t>
+            </a:r>
+          </a:p>
+        </p:txBody>
+      </p:sp>
+      <p:sp>
+        <p:nvSpPr>
+          <p:cNvPr id="3" name="Text Placeholder 2"/>
+          <p:cNvSpPr>
+            <a:spLocks noGrp="1"/>
+          </p:cNvSpPr>
+          <p:nvPr>
+            <p:ph type="body" idx="1"/>
+          </p:nvPr>
+        </p:nvSpPr>
+        <p:spPr/>
+        <p:txBody>
+          <a:bodyPr/>
+          <a:lstStyle/>
+          <a:p>
+            <a:r>
+              <a:rPr lang="en-US" sz="1800" dirty="0">
+                <a:latin typeface="Courier New" panose="02070309020205020404" pitchFamily="49" charset="0"/>
+                <a:cs typeface="Courier New" panose="02070309020205020404" pitchFamily="49" charset="0"/>
+              </a:rPr>
+              <a:t>id  </a:t>
+            </a:r>
+            <a:r>
+              <a:rPr lang="en-US" sz="1800" dirty="0" err="1">
+                <a:latin typeface="Courier New" panose="02070309020205020404" pitchFamily="49" charset="0"/>
+                <a:cs typeface="Courier New" panose="02070309020205020404" pitchFamily="49" charset="0"/>
+              </a:rPr>
+              <a:t>accept.dt</a:t>
+            </a:r>
+            <a:r>
+              <a:rPr lang="en-US" sz="1800" dirty="0">
+                <a:latin typeface="Courier New" panose="02070309020205020404" pitchFamily="49" charset="0"/>
+                <a:cs typeface="Courier New" panose="02070309020205020404" pitchFamily="49" charset="0"/>
+              </a:rPr>
+              <a:t>    </a:t>
+            </a:r>
+            <a:r>
+              <a:rPr lang="en-US" sz="1800" dirty="0" err="1">
+                <a:latin typeface="Courier New" panose="02070309020205020404" pitchFamily="49" charset="0"/>
+                <a:cs typeface="Courier New" panose="02070309020205020404" pitchFamily="49" charset="0"/>
+              </a:rPr>
+              <a:t>tx.date</a:t>
+            </a:r>
+            <a:r>
+              <a:rPr lang="en-US" sz="1800" dirty="0">
+                <a:latin typeface="Courier New" panose="02070309020205020404" pitchFamily="49" charset="0"/>
+                <a:cs typeface="Courier New" panose="02070309020205020404" pitchFamily="49" charset="0"/>
+              </a:rPr>
+              <a:t>    </a:t>
+            </a:r>
+            <a:r>
+              <a:rPr lang="en-US" sz="1800" dirty="0" err="1">
+                <a:latin typeface="Courier New" panose="02070309020205020404" pitchFamily="49" charset="0"/>
+                <a:cs typeface="Courier New" panose="02070309020205020404" pitchFamily="49" charset="0"/>
+              </a:rPr>
+              <a:t>fu.date</a:t>
+            </a:r>
+            <a:r>
+              <a:rPr lang="en-US" sz="1800" dirty="0">
+                <a:latin typeface="Courier New" panose="02070309020205020404" pitchFamily="49" charset="0"/>
+                <a:cs typeface="Courier New" panose="02070309020205020404" pitchFamily="49" charset="0"/>
+              </a:rPr>
+              <a:t> </a:t>
+            </a:r>
+            <a:r>
+              <a:rPr lang="en-US" sz="1800" dirty="0" err="1">
+                <a:latin typeface="Courier New" panose="02070309020205020404" pitchFamily="49" charset="0"/>
+                <a:cs typeface="Courier New" panose="02070309020205020404" pitchFamily="49" charset="0"/>
+              </a:rPr>
+              <a:t>fustat</a:t>
+            </a:r>
+            <a:r>
+              <a:rPr lang="en-US" sz="1800" dirty="0">
+                <a:latin typeface="Courier New" panose="02070309020205020404" pitchFamily="49" charset="0"/>
+                <a:cs typeface="Courier New" panose="02070309020205020404" pitchFamily="49" charset="0"/>
+              </a:rPr>
+              <a:t> transplant</a:t>
+            </a:r>
+          </a:p>
+          <a:p>
+            <a:r>
+              <a:rPr lang="en-US" sz="1800" dirty="0">
+                <a:latin typeface="Courier New" panose="02070309020205020404" pitchFamily="49" charset="0"/>
+                <a:cs typeface="Courier New" panose="02070309020205020404" pitchFamily="49" charset="0"/>
+              </a:rPr>
+              <a:t>29 1969-07-14       &lt;NA&gt; 1969-08-17      1          0</a:t>
+            </a:r>
+          </a:p>
+          <a:p>
+            <a:endParaRPr lang="en-US" sz="1800" dirty="0">
+              <a:latin typeface="Courier New" panose="02070309020205020404" pitchFamily="49" charset="0"/>
+              <a:cs typeface="Courier New" panose="02070309020205020404" pitchFamily="49" charset="0"/>
+            </a:endParaRPr>
+          </a:p>
+          <a:p>
+            <a:r>
+              <a:rPr lang="en-US" sz="1800" dirty="0">
+                <a:latin typeface="Courier New" panose="02070309020205020404" pitchFamily="49" charset="0"/>
+                <a:cs typeface="Courier New" panose="02070309020205020404" pitchFamily="49" charset="0"/>
+              </a:rPr>
+              <a:t>id   time1     time2 event transplant</a:t>
+            </a:r>
+          </a:p>
+          <a:p>
+            <a:r>
+              <a:rPr lang="en-US" sz="1800" dirty="0">
+                <a:latin typeface="Courier New" panose="02070309020205020404" pitchFamily="49" charset="0"/>
+                <a:cs typeface="Courier New" panose="02070309020205020404" pitchFamily="49" charset="0"/>
+              </a:rPr>
+              <a:t>29 NA days   34 days     D          0</a:t>
+            </a:r>
+          </a:p>
+          <a:p>
+            <a:endParaRPr lang="en-US" sz="1800" dirty="0">
+              <a:latin typeface="Courier New" panose="02070309020205020404" pitchFamily="49" charset="0"/>
+              <a:cs typeface="Courier New" panose="02070309020205020404" pitchFamily="49" charset="0"/>
+            </a:endParaRPr>
+          </a:p>
+          <a:p>
+            <a:r>
+              <a:rPr lang="en-US" sz="1800" dirty="0">
+                <a:latin typeface="Courier New" panose="02070309020205020404" pitchFamily="49" charset="0"/>
+                <a:cs typeface="Courier New" panose="02070309020205020404" pitchFamily="49" charset="0"/>
+              </a:rPr>
+              <a:t>id start stop event transplant</a:t>
+            </a:r>
+          </a:p>
+          <a:p>
+            <a:r>
+              <a:rPr lang="en-US" sz="1800" dirty="0">
+                <a:latin typeface="Courier New" panose="02070309020205020404" pitchFamily="49" charset="0"/>
+                <a:cs typeface="Courier New" panose="02070309020205020404" pitchFamily="49" charset="0"/>
+              </a:rPr>
+              <a:t>29     0   34     1          0</a:t>
+            </a:r>
+          </a:p>
+        </p:txBody>
+      </p:sp>
+      <p:sp>
+        <p:nvSpPr>
+          <p:cNvPr id="4" name="Footer Placeholder 3"/>
+          <p:cNvSpPr>
+            <a:spLocks noGrp="1"/>
+          </p:cNvSpPr>
+          <p:nvPr>
+            <p:ph type="ftr" sz="quarter" idx="10"/>
+          </p:nvPr>
+        </p:nvSpPr>
+        <p:spPr/>
+        <p:txBody>
+          <a:bodyPr/>
+          <a:lstStyle/>
+          <a:p>
+            <a:pPr>
+              <a:defRPr/>
+            </a:pPr>
+            <a:r>
+              <a:rPr lang="en-US" altLang="en-US" dirty="0"/>
+              <a:t>©2018 Steve Simon    http://TheAnalysisFactor.com</a:t>
+            </a:r>
+          </a:p>
+        </p:txBody>
+      </p:sp>
+      <p:sp>
+        <p:nvSpPr>
+          <p:cNvPr id="5" name="Slide Number Placeholder 4"/>
+          <p:cNvSpPr>
+            <a:spLocks noGrp="1"/>
+          </p:cNvSpPr>
+          <p:nvPr>
+            <p:ph type="sldNum" sz="quarter" idx="11"/>
+          </p:nvPr>
+        </p:nvSpPr>
+        <p:spPr/>
+        <p:txBody>
+          <a:bodyPr/>
+          <a:lstStyle/>
+          <a:p>
+            <a:pPr>
+              <a:defRPr/>
+            </a:pPr>
+            <a:endParaRPr lang="en-US"/>
+          </a:p>
+          <a:p>
+            <a:pPr>
+              <a:defRPr/>
+            </a:pPr>
+            <a:fld id="{E9A8CBA3-AA2B-46A6-BFA3-DCEBEAAB3F0A}" type="slidenum">
+              <a:rPr lang="en-US" smtClean="0"/>
+              <a:pPr>
+                <a:defRPr/>
+              </a:pPr>
+              <a:t>44</a:t>
+            </a:fld>
+            <a:endParaRPr lang="en-US"/>
+          </a:p>
+        </p:txBody>
+      </p:sp>
+      <p:sp>
+        <p:nvSpPr>
+          <p:cNvPr id="6" name="Text Placeholder 5"/>
+          <p:cNvSpPr>
+            <a:spLocks noGrp="1"/>
+          </p:cNvSpPr>
+          <p:nvPr>
+            <p:ph type="body" sz="quarter" idx="12"/>
+          </p:nvPr>
+        </p:nvSpPr>
+        <p:spPr/>
+        <p:txBody>
+          <a:bodyPr/>
+          <a:lstStyle/>
+          <a:p>
+            <a:r>
+              <a:rPr lang="en-US" dirty="0"/>
+              <a:t>Patient #29</a:t>
+            </a:r>
+          </a:p>
+        </p:txBody>
+      </p:sp>
+    </p:spTree>
+    <p:extLst>
+      <p:ext uri="{BB962C8B-B14F-4D97-AF65-F5344CB8AC3E}">
+        <p14:creationId xmlns:p14="http://schemas.microsoft.com/office/powerpoint/2010/main" val="2485784403"/>
+      </p:ext>
+    </p:extLst>
+  </p:cSld>
+  <p:clrMapOvr>
+    <a:masterClrMapping/>
+  </p:clrMapOvr>
+</p:sld>
+</file>
+
+<file path=ppt/slides/slide45.xml><?xml version="1.0" encoding="utf-8"?>
+<p:sld xmlns:a="http://schemas.openxmlformats.org/drawingml/2006/main" xmlns:r="http://schemas.openxmlformats.org/officeDocument/2006/relationships" xmlns:p="http://schemas.openxmlformats.org/presentationml/2006/main">
+  <p:cSld>
+    <p:spTree>
+      <p:nvGrpSpPr>
+        <p:cNvPr id="1" name=""/>
+        <p:cNvGrpSpPr/>
+        <p:nvPr/>
+      </p:nvGrpSpPr>
+      <p:grpSpPr>
+        <a:xfrm>
+          <a:off x="0" y="0"/>
+          <a:ext cx="0" cy="0"/>
+          <a:chOff x="0" y="0"/>
+          <a:chExt cx="0" cy="0"/>
+        </a:xfrm>
+      </p:grpSpPr>
+      <p:sp>
+        <p:nvSpPr>
+          <p:cNvPr id="2" name="Title 1"/>
+          <p:cNvSpPr>
+            <a:spLocks noGrp="1"/>
+          </p:cNvSpPr>
+          <p:nvPr>
+            <p:ph type="title"/>
+          </p:nvPr>
+        </p:nvSpPr>
+        <p:spPr/>
+        <p:txBody>
+          <a:bodyPr/>
+          <a:lstStyle/>
+          <a:p>
+            <a:r>
+              <a:rPr lang="en-US" dirty="0"/>
+              <a:t>Stanford transplant data</a:t>
+            </a:r>
+          </a:p>
+        </p:txBody>
+      </p:sp>
+      <p:sp>
+        <p:nvSpPr>
+          <p:cNvPr id="3" name="Text Placeholder 2"/>
+          <p:cNvSpPr>
+            <a:spLocks noGrp="1"/>
+          </p:cNvSpPr>
+          <p:nvPr>
+            <p:ph type="body" idx="1"/>
+          </p:nvPr>
+        </p:nvSpPr>
+        <p:spPr/>
+        <p:txBody>
+          <a:bodyPr/>
+          <a:lstStyle/>
+          <a:p>
+            <a:r>
+              <a:rPr lang="en-US" sz="1800" dirty="0">
+                <a:latin typeface="Courier New" panose="02070309020205020404" pitchFamily="49" charset="0"/>
+                <a:cs typeface="Courier New" panose="02070309020205020404" pitchFamily="49" charset="0"/>
+              </a:rPr>
+              <a:t>id  </a:t>
+            </a:r>
+            <a:r>
+              <a:rPr lang="en-US" sz="1800" dirty="0" err="1">
+                <a:latin typeface="Courier New" panose="02070309020205020404" pitchFamily="49" charset="0"/>
+                <a:cs typeface="Courier New" panose="02070309020205020404" pitchFamily="49" charset="0"/>
+              </a:rPr>
+              <a:t>accept.dt</a:t>
+            </a:r>
+            <a:r>
+              <a:rPr lang="en-US" sz="1800" dirty="0">
+                <a:latin typeface="Courier New" panose="02070309020205020404" pitchFamily="49" charset="0"/>
+                <a:cs typeface="Courier New" panose="02070309020205020404" pitchFamily="49" charset="0"/>
+              </a:rPr>
+              <a:t>    </a:t>
+            </a:r>
+            <a:r>
+              <a:rPr lang="en-US" sz="1800" dirty="0" err="1">
+                <a:latin typeface="Courier New" panose="02070309020205020404" pitchFamily="49" charset="0"/>
+                <a:cs typeface="Courier New" panose="02070309020205020404" pitchFamily="49" charset="0"/>
+              </a:rPr>
+              <a:t>tx.date</a:t>
+            </a:r>
+            <a:r>
+              <a:rPr lang="en-US" sz="1800" dirty="0">
+                <a:latin typeface="Courier New" panose="02070309020205020404" pitchFamily="49" charset="0"/>
+                <a:cs typeface="Courier New" panose="02070309020205020404" pitchFamily="49" charset="0"/>
+              </a:rPr>
+              <a:t>    </a:t>
+            </a:r>
+            <a:r>
+              <a:rPr lang="en-US" sz="1800" dirty="0" err="1">
+                <a:latin typeface="Courier New" panose="02070309020205020404" pitchFamily="49" charset="0"/>
+                <a:cs typeface="Courier New" panose="02070309020205020404" pitchFamily="49" charset="0"/>
+              </a:rPr>
+              <a:t>fu.date</a:t>
+            </a:r>
+            <a:r>
+              <a:rPr lang="en-US" sz="1800" dirty="0">
+                <a:latin typeface="Courier New" panose="02070309020205020404" pitchFamily="49" charset="0"/>
+                <a:cs typeface="Courier New" panose="02070309020205020404" pitchFamily="49" charset="0"/>
+              </a:rPr>
+              <a:t> </a:t>
+            </a:r>
+            <a:r>
+              <a:rPr lang="en-US" sz="1800" dirty="0" err="1">
+                <a:latin typeface="Courier New" panose="02070309020205020404" pitchFamily="49" charset="0"/>
+                <a:cs typeface="Courier New" panose="02070309020205020404" pitchFamily="49" charset="0"/>
+              </a:rPr>
+              <a:t>fustat</a:t>
+            </a:r>
+            <a:r>
+              <a:rPr lang="en-US" sz="1800" dirty="0">
+                <a:latin typeface="Courier New" panose="02070309020205020404" pitchFamily="49" charset="0"/>
+                <a:cs typeface="Courier New" panose="02070309020205020404" pitchFamily="49" charset="0"/>
+              </a:rPr>
+              <a:t> transplant</a:t>
+            </a:r>
+          </a:p>
+          <a:p>
+            <a:r>
+              <a:rPr lang="en-US" sz="1800" dirty="0">
+                <a:latin typeface="Courier New" panose="02070309020205020404" pitchFamily="49" charset="0"/>
+                <a:cs typeface="Courier New" panose="02070309020205020404" pitchFamily="49" charset="0"/>
+              </a:rPr>
+              <a:t>30 1969-08-19 1969-09-03 1971-12-18      1          1</a:t>
+            </a:r>
+          </a:p>
+          <a:p>
+            <a:endParaRPr lang="en-US" sz="1800" dirty="0">
+              <a:latin typeface="Courier New" panose="02070309020205020404" pitchFamily="49" charset="0"/>
+              <a:cs typeface="Courier New" panose="02070309020205020404" pitchFamily="49" charset="0"/>
+            </a:endParaRPr>
+          </a:p>
+          <a:p>
+            <a:r>
+              <a:rPr lang="en-US" sz="1800" dirty="0">
+                <a:latin typeface="Courier New" panose="02070309020205020404" pitchFamily="49" charset="0"/>
+                <a:cs typeface="Courier New" panose="02070309020205020404" pitchFamily="49" charset="0"/>
+              </a:rPr>
+              <a:t>id   time1     time2 event transplant</a:t>
+            </a:r>
+          </a:p>
+          <a:p>
+            <a:r>
+              <a:rPr lang="en-US" sz="1800" dirty="0">
+                <a:latin typeface="Courier New" panose="02070309020205020404" pitchFamily="49" charset="0"/>
+                <a:cs typeface="Courier New" panose="02070309020205020404" pitchFamily="49" charset="0"/>
+              </a:rPr>
+              <a:t>30 15 days  851 days     D          1</a:t>
+            </a:r>
+          </a:p>
+          <a:p>
+            <a:endParaRPr lang="en-US" sz="1800" dirty="0">
+              <a:latin typeface="Courier New" panose="02070309020205020404" pitchFamily="49" charset="0"/>
+              <a:cs typeface="Courier New" panose="02070309020205020404" pitchFamily="49" charset="0"/>
+            </a:endParaRPr>
+          </a:p>
+          <a:p>
+            <a:r>
+              <a:rPr lang="en-US" sz="1800" dirty="0">
+                <a:latin typeface="Courier New" panose="02070309020205020404" pitchFamily="49" charset="0"/>
+                <a:cs typeface="Courier New" panose="02070309020205020404" pitchFamily="49" charset="0"/>
+              </a:rPr>
+              <a:t>id start stop event transplant</a:t>
+            </a:r>
+          </a:p>
+          <a:p>
+            <a:r>
+              <a:rPr lang="en-US" sz="1800" dirty="0">
+                <a:latin typeface="Courier New" panose="02070309020205020404" pitchFamily="49" charset="0"/>
+                <a:cs typeface="Courier New" panose="02070309020205020404" pitchFamily="49" charset="0"/>
+              </a:rPr>
+              <a:t>30     0   15     0          0</a:t>
+            </a:r>
+          </a:p>
+          <a:p>
+            <a:r>
+              <a:rPr lang="en-US" sz="1800" dirty="0">
+                <a:latin typeface="Courier New" panose="02070309020205020404" pitchFamily="49" charset="0"/>
+                <a:cs typeface="Courier New" panose="02070309020205020404" pitchFamily="49" charset="0"/>
+              </a:rPr>
+              <a:t>30    15  851     1          1</a:t>
+            </a:r>
+          </a:p>
+        </p:txBody>
+      </p:sp>
+      <p:sp>
+        <p:nvSpPr>
+          <p:cNvPr id="4" name="Footer Placeholder 3"/>
+          <p:cNvSpPr>
+            <a:spLocks noGrp="1"/>
+          </p:cNvSpPr>
+          <p:nvPr>
+            <p:ph type="ftr" sz="quarter" idx="10"/>
+          </p:nvPr>
+        </p:nvSpPr>
+        <p:spPr/>
+        <p:txBody>
+          <a:bodyPr/>
+          <a:lstStyle/>
+          <a:p>
+            <a:pPr>
+              <a:defRPr/>
+            </a:pPr>
+            <a:r>
+              <a:rPr lang="en-US" altLang="en-US" dirty="0"/>
+              <a:t>©2018 Steve Simon    http://TheAnalysisFactor.com</a:t>
+            </a:r>
+          </a:p>
+        </p:txBody>
+      </p:sp>
+      <p:sp>
+        <p:nvSpPr>
+          <p:cNvPr id="5" name="Slide Number Placeholder 4"/>
+          <p:cNvSpPr>
+            <a:spLocks noGrp="1"/>
+          </p:cNvSpPr>
+          <p:nvPr>
+            <p:ph type="sldNum" sz="quarter" idx="11"/>
+          </p:nvPr>
+        </p:nvSpPr>
+        <p:spPr/>
+        <p:txBody>
+          <a:bodyPr/>
+          <a:lstStyle/>
+          <a:p>
+            <a:pPr>
+              <a:defRPr/>
+            </a:pPr>
+            <a:endParaRPr lang="en-US"/>
+          </a:p>
+          <a:p>
+            <a:pPr>
+              <a:defRPr/>
+            </a:pPr>
+            <a:fld id="{E9A8CBA3-AA2B-46A6-BFA3-DCEBEAAB3F0A}" type="slidenum">
+              <a:rPr lang="en-US" smtClean="0"/>
+              <a:pPr>
+                <a:defRPr/>
+              </a:pPr>
+              <a:t>45</a:t>
+            </a:fld>
+            <a:endParaRPr lang="en-US"/>
+          </a:p>
+        </p:txBody>
+      </p:sp>
+      <p:sp>
+        <p:nvSpPr>
+          <p:cNvPr id="6" name="Text Placeholder 5"/>
+          <p:cNvSpPr>
+            <a:spLocks noGrp="1"/>
+          </p:cNvSpPr>
+          <p:nvPr>
+            <p:ph type="body" sz="quarter" idx="12"/>
+          </p:nvPr>
+        </p:nvSpPr>
+        <p:spPr/>
+        <p:txBody>
+          <a:bodyPr/>
+          <a:lstStyle/>
+          <a:p>
+            <a:r>
+              <a:rPr lang="en-US" dirty="0"/>
+              <a:t>Patient #30</a:t>
+            </a:r>
+          </a:p>
+        </p:txBody>
+      </p:sp>
+    </p:spTree>
+    <p:extLst>
+      <p:ext uri="{BB962C8B-B14F-4D97-AF65-F5344CB8AC3E}">
+        <p14:creationId xmlns:p14="http://schemas.microsoft.com/office/powerpoint/2010/main" val="461925367"/>
+      </p:ext>
+    </p:extLst>
+  </p:cSld>
+  <p:clrMapOvr>
+    <a:masterClrMapping/>
+  </p:clrMapOvr>
+</p:sld>
+</file>
+
+<file path=ppt/slides/slide46.xml><?xml version="1.0" encoding="utf-8"?>
+<p:sld xmlns:a="http://schemas.openxmlformats.org/drawingml/2006/main" xmlns:r="http://schemas.openxmlformats.org/officeDocument/2006/relationships" xmlns:p="http://schemas.openxmlformats.org/presentationml/2006/main">
+  <p:cSld>
+    <p:spTree>
+      <p:nvGrpSpPr>
+        <p:cNvPr id="1" name=""/>
+        <p:cNvGrpSpPr/>
+        <p:nvPr/>
+      </p:nvGrpSpPr>
+      <p:grpSpPr>
+        <a:xfrm>
+          <a:off x="0" y="0"/>
+          <a:ext cx="0" cy="0"/>
+          <a:chOff x="0" y="0"/>
+          <a:chExt cx="0" cy="0"/>
+        </a:xfrm>
+      </p:grpSpPr>
+      <p:sp>
+        <p:nvSpPr>
+          <p:cNvPr id="2" name="Title 1"/>
+          <p:cNvSpPr>
+            <a:spLocks noGrp="1"/>
+          </p:cNvSpPr>
+          <p:nvPr>
+            <p:ph type="title"/>
+          </p:nvPr>
+        </p:nvSpPr>
+        <p:spPr/>
+        <p:txBody>
+          <a:bodyPr/>
+          <a:lstStyle/>
+          <a:p>
+            <a:r>
+              <a:rPr lang="en-US" dirty="0"/>
+              <a:t>Stanford transplant data, time-varying model</a:t>
+            </a:r>
+          </a:p>
+        </p:txBody>
+      </p:sp>
+      <p:sp>
+        <p:nvSpPr>
+          <p:cNvPr id="5" name="Slide Number Placeholder 4"/>
+          <p:cNvSpPr>
+            <a:spLocks noGrp="1"/>
+          </p:cNvSpPr>
+          <p:nvPr>
+            <p:ph type="sldNum" sz="quarter" idx="11"/>
+          </p:nvPr>
+        </p:nvSpPr>
+        <p:spPr/>
+        <p:txBody>
+          <a:bodyPr/>
+          <a:lstStyle/>
+          <a:p>
+            <a:pPr>
+              <a:defRPr/>
+            </a:pPr>
+            <a:endParaRPr lang="en-US"/>
+          </a:p>
+          <a:p>
+            <a:pPr>
+              <a:defRPr/>
+            </a:pPr>
+            <a:fld id="{E9A8CBA3-AA2B-46A6-BFA3-DCEBEAAB3F0A}" type="slidenum">
+              <a:rPr lang="en-US" smtClean="0"/>
+              <a:pPr>
+                <a:defRPr/>
+              </a:pPr>
+              <a:t>46</a:t>
             </a:fld>
             <a:endParaRPr lang="en-US"/>
           </a:p>
@@ -10584,7 +11419,7 @@
 </p:sld>
 </file>
 
-<file path=ppt/slides/slide43.xml><?xml version="1.0" encoding="utf-8"?>
+<file path=ppt/slides/slide47.xml><?xml version="1.0" encoding="utf-8"?>
 <p:sld xmlns:a="http://schemas.openxmlformats.org/drawingml/2006/main" xmlns:r="http://schemas.openxmlformats.org/officeDocument/2006/relationships" xmlns:p="http://schemas.openxmlformats.org/presentationml/2006/main">
   <p:cSld>
     <p:spTree>
@@ -10709,7 +11544,7 @@
               <a:pPr>
                 <a:defRPr/>
               </a:pPr>
-              <a:t>43</a:t>
+              <a:t>47</a:t>
             </a:fld>
             <a:endParaRPr lang="en-US"/>
           </a:p>

</xml_diff>